<commit_message>
Calculated the COM for the Hip piece in MATLAB. Will calculate the moment of inertia for the hip next
</commit_message>
<xml_diff>
--- a/physicalRobot/MassSpecs/FBD.pptx
+++ b/physicalRobot/MassSpecs/FBD.pptx
@@ -7,7 +7,7 @@
   <p:sldIdLst>
     <p:sldId id="256" r:id="rId2"/>
   </p:sldIdLst>
-  <p:sldSz cx="12192000" cy="6858000"/>
+  <p:sldSz cx="12192000" cy="9144000"/>
   <p:notesSz cx="6858000" cy="9144000"/>
   <p:defaultTextStyle>
     <a:defPPr>
@@ -112,6 +112,10 @@
 </p:presentation>
 </file>
 
+<file path=ppt/revisionInfo.xml><?xml version="1.0" encoding="utf-8"?>
+<p1510:revInfo xmlns:a="http://schemas.openxmlformats.org/drawingml/2006/main" xmlns:r="http://schemas.openxmlformats.org/officeDocument/2006/relationships" xmlns:p1510="http://schemas.microsoft.com/office/powerpoint/2015/10/main"/>
+</file>
+
 <file path=ppt/slideLayouts/slideLayout1.xml><?xml version="1.0" encoding="utf-8"?>
 <p:sldLayout xmlns:a="http://schemas.openxmlformats.org/drawingml/2006/main" xmlns:r="http://schemas.openxmlformats.org/officeDocument/2006/relationships" xmlns:p="http://schemas.openxmlformats.org/presentationml/2006/main" type="title" preserve="1">
   <p:cSld name="Title Slide">
@@ -141,8 +145,8 @@
         </p:nvSpPr>
         <p:spPr>
           <a:xfrm>
-            <a:off x="1524000" y="1122363"/>
-            <a:ext cx="9144000" cy="2387600"/>
+            <a:off x="1524000" y="1496484"/>
+            <a:ext cx="9144000" cy="3183467"/>
           </a:xfrm>
         </p:spPr>
         <p:txBody>
@@ -172,8 +176,8 @@
         </p:nvSpPr>
         <p:spPr>
           <a:xfrm>
-            <a:off x="1524000" y="3602038"/>
-            <a:ext cx="9144000" cy="1655762"/>
+            <a:off x="1524000" y="4802717"/>
+            <a:ext cx="9144000" cy="2207683"/>
           </a:xfrm>
         </p:spPr>
         <p:txBody>
@@ -239,8 +243,8 @@
         </p:nvSpPr>
         <p:spPr>
           <a:xfrm>
-            <a:off x="838200" y="6356350"/>
-            <a:ext cx="2743200" cy="365125"/>
+            <a:off x="838200" y="8475134"/>
+            <a:ext cx="2743200" cy="486833"/>
           </a:xfrm>
           <a:prstGeom prst="rect">
             <a:avLst/>
@@ -250,70 +254,26 @@
           <a:bodyPr/>
           <a:lstStyle/>
           <a:p>
-            <a:pPr marL="0" marR="0" lvl="0" indent="0" algn="l" defTabSz="914400" rtl="0" eaLnBrk="1" fontAlgn="auto" latinLnBrk="0" hangingPunct="1">
-              <a:lnSpc>
-                <a:spcPct val="100000"/>
-              </a:lnSpc>
-              <a:spcBef>
-                <a:spcPts val="0"/>
-              </a:spcBef>
-              <a:spcAft>
-                <a:spcPts val="0"/>
-              </a:spcAft>
-              <a:buClrTx/>
-              <a:buSzTx/>
-              <a:buFontTx/>
-              <a:buNone/>
-              <a:tabLst/>
+            <a:pPr>
               <a:defRPr/>
             </a:pPr>
             <a:fld id="{107A54EE-FF42-4B1D-9F90-032BC404731E}" type="datetimeFigureOut">
-              <a:rPr kumimoji="0" lang="en-US" sz="1800" b="0" i="0" u="none" strike="noStrike" kern="1200" cap="none" spc="0" normalizeH="0" baseline="0" noProof="0" smtClean="0">
-                <a:ln>
-                  <a:noFill/>
-                </a:ln>
+              <a:rPr lang="en-US" smtClean="0">
                 <a:solidFill>
                   <a:prstClr val="black"/>
                 </a:solidFill>
-                <a:effectLst/>
-                <a:uLnTx/>
-                <a:uFillTx/>
                 <a:latin typeface="Calibri" panose="020F0502020204030204"/>
-                <a:ea typeface="+mn-ea"/>
-                <a:cs typeface="+mn-cs"/>
               </a:rPr>
-              <a:pPr marL="0" marR="0" lvl="0" indent="0" algn="l" defTabSz="914400" rtl="0" eaLnBrk="1" fontAlgn="auto" latinLnBrk="0" hangingPunct="1">
-                <a:lnSpc>
-                  <a:spcPct val="100000"/>
-                </a:lnSpc>
-                <a:spcBef>
-                  <a:spcPts val="0"/>
-                </a:spcBef>
-                <a:spcAft>
-                  <a:spcPts val="0"/>
-                </a:spcAft>
-                <a:buClrTx/>
-                <a:buSzTx/>
-                <a:buFontTx/>
-                <a:buNone/>
-                <a:tabLst/>
+              <a:pPr>
                 <a:defRPr/>
               </a:pPr>
-              <a:t>11/30/2017</a:t>
+              <a:t>12/1/2017</a:t>
             </a:fld>
-            <a:endParaRPr kumimoji="0" lang="en-US" sz="1800" b="0" i="0" u="none" strike="noStrike" kern="1200" cap="none" spc="0" normalizeH="0" baseline="0" noProof="0">
-              <a:ln>
-                <a:noFill/>
-              </a:ln>
+            <a:endParaRPr lang="en-US">
               <a:solidFill>
                 <a:prstClr val="black"/>
               </a:solidFill>
-              <a:effectLst/>
-              <a:uLnTx/>
-              <a:uFillTx/>
               <a:latin typeface="Calibri" panose="020F0502020204030204"/>
-              <a:ea typeface="+mn-ea"/>
-              <a:cs typeface="+mn-cs"/>
             </a:endParaRPr>
           </a:p>
         </p:txBody>
@@ -330,8 +290,8 @@
         </p:nvSpPr>
         <p:spPr>
           <a:xfrm>
-            <a:off x="4038600" y="6356350"/>
-            <a:ext cx="4114800" cy="365125"/>
+            <a:off x="4038600" y="8475134"/>
+            <a:ext cx="4114800" cy="486833"/>
           </a:xfrm>
           <a:prstGeom prst="rect">
             <a:avLst/>
@@ -341,36 +301,14 @@
           <a:bodyPr/>
           <a:lstStyle/>
           <a:p>
-            <a:pPr marL="0" marR="0" lvl="0" indent="0" algn="l" defTabSz="914400" rtl="0" eaLnBrk="1" fontAlgn="auto" latinLnBrk="0" hangingPunct="1">
-              <a:lnSpc>
-                <a:spcPct val="100000"/>
-              </a:lnSpc>
-              <a:spcBef>
-                <a:spcPts val="0"/>
-              </a:spcBef>
-              <a:spcAft>
-                <a:spcPts val="0"/>
-              </a:spcAft>
-              <a:buClrTx/>
-              <a:buSzTx/>
-              <a:buFontTx/>
-              <a:buNone/>
-              <a:tabLst/>
+            <a:pPr>
               <a:defRPr/>
             </a:pPr>
-            <a:endParaRPr kumimoji="0" lang="en-US" sz="1800" b="0" i="0" u="none" strike="noStrike" kern="1200" cap="none" spc="0" normalizeH="0" baseline="0" noProof="0" dirty="0">
-              <a:ln>
-                <a:noFill/>
-              </a:ln>
+            <a:endParaRPr lang="en-US" dirty="0">
               <a:solidFill>
                 <a:prstClr val="black"/>
               </a:solidFill>
-              <a:effectLst/>
-              <a:uLnTx/>
-              <a:uFillTx/>
               <a:latin typeface="Calibri" panose="020F0502020204030204"/>
-              <a:ea typeface="+mn-ea"/>
-              <a:cs typeface="+mn-cs"/>
             </a:endParaRPr>
           </a:p>
         </p:txBody>
@@ -387,8 +325,8 @@
         </p:nvSpPr>
         <p:spPr>
           <a:xfrm>
-            <a:off x="8610600" y="6356350"/>
-            <a:ext cx="2743200" cy="365125"/>
+            <a:off x="8610600" y="8475134"/>
+            <a:ext cx="2743200" cy="486833"/>
           </a:xfrm>
           <a:prstGeom prst="rect">
             <a:avLst/>
@@ -398,70 +336,26 @@
           <a:bodyPr/>
           <a:lstStyle/>
           <a:p>
-            <a:pPr marL="0" marR="0" lvl="0" indent="0" algn="l" defTabSz="914400" rtl="0" eaLnBrk="1" fontAlgn="auto" latinLnBrk="0" hangingPunct="1">
-              <a:lnSpc>
-                <a:spcPct val="100000"/>
-              </a:lnSpc>
-              <a:spcBef>
-                <a:spcPts val="0"/>
-              </a:spcBef>
-              <a:spcAft>
-                <a:spcPts val="0"/>
-              </a:spcAft>
-              <a:buClrTx/>
-              <a:buSzTx/>
-              <a:buFontTx/>
-              <a:buNone/>
-              <a:tabLst/>
+            <a:pPr algn="l">
               <a:defRPr/>
             </a:pPr>
             <a:fld id="{52144C99-8741-4102-B794-D10AFFB4C19C}" type="slidenum">
-              <a:rPr kumimoji="0" lang="en-US" sz="1800" b="0" i="0" u="none" strike="noStrike" kern="1200" cap="none" spc="0" normalizeH="0" baseline="0" noProof="0" smtClean="0">
-                <a:ln>
-                  <a:noFill/>
-                </a:ln>
+              <a:rPr lang="en-US" sz="1800" smtClean="0">
                 <a:solidFill>
                   <a:prstClr val="black"/>
                 </a:solidFill>
-                <a:effectLst/>
-                <a:uLnTx/>
-                <a:uFillTx/>
                 <a:latin typeface="Calibri" panose="020F0502020204030204"/>
-                <a:ea typeface="+mn-ea"/>
-                <a:cs typeface="+mn-cs"/>
               </a:rPr>
-              <a:pPr marL="0" marR="0" lvl="0" indent="0" algn="l" defTabSz="914400" rtl="0" eaLnBrk="1" fontAlgn="auto" latinLnBrk="0" hangingPunct="1">
-                <a:lnSpc>
-                  <a:spcPct val="100000"/>
-                </a:lnSpc>
-                <a:spcBef>
-                  <a:spcPts val="0"/>
-                </a:spcBef>
-                <a:spcAft>
-                  <a:spcPts val="0"/>
-                </a:spcAft>
-                <a:buClrTx/>
-                <a:buSzTx/>
-                <a:buFontTx/>
-                <a:buNone/>
-                <a:tabLst/>
+              <a:pPr algn="l">
                 <a:defRPr/>
               </a:pPr>
               <a:t>‹#›</a:t>
             </a:fld>
-            <a:endParaRPr kumimoji="0" lang="en-US" sz="1800" b="0" i="0" u="none" strike="noStrike" kern="1200" cap="none" spc="0" normalizeH="0" baseline="0" noProof="0" dirty="0">
-              <a:ln>
-                <a:noFill/>
-              </a:ln>
+            <a:endParaRPr lang="en-US" sz="1800" dirty="0">
               <a:solidFill>
                 <a:prstClr val="black"/>
               </a:solidFill>
-              <a:effectLst/>
-              <a:uLnTx/>
-              <a:uFillTx/>
               <a:latin typeface="Calibri" panose="020F0502020204030204"/>
-              <a:ea typeface="+mn-ea"/>
-              <a:cs typeface="+mn-cs"/>
             </a:endParaRPr>
           </a:p>
         </p:txBody>
@@ -474,8 +368,8 @@
         </p:nvSpPr>
         <p:spPr>
           <a:xfrm>
-            <a:off x="5153891" y="6391656"/>
-            <a:ext cx="7028583" cy="466344"/>
+            <a:off x="5153892" y="8522208"/>
+            <a:ext cx="7028583" cy="621792"/>
           </a:xfrm>
           <a:prstGeom prst="rect">
             <a:avLst/>
@@ -508,7 +402,7 @@
           <a:lstStyle/>
           <a:p>
             <a:pPr algn="ctr"/>
-            <a:endParaRPr lang="en-US"/>
+            <a:endParaRPr lang="en-US" sz="1800"/>
           </a:p>
         </p:txBody>
       </p:sp>
@@ -627,8 +521,8 @@
         </p:nvSpPr>
         <p:spPr>
           <a:xfrm>
-            <a:off x="838200" y="6356350"/>
-            <a:ext cx="2743200" cy="365125"/>
+            <a:off x="838200" y="8475134"/>
+            <a:ext cx="2743200" cy="486833"/>
           </a:xfrm>
           <a:prstGeom prst="rect">
             <a:avLst/>
@@ -638,70 +532,26 @@
           <a:bodyPr/>
           <a:lstStyle/>
           <a:p>
-            <a:pPr marL="0" marR="0" lvl="0" indent="0" algn="l" defTabSz="914400" rtl="0" eaLnBrk="1" fontAlgn="auto" latinLnBrk="0" hangingPunct="1">
-              <a:lnSpc>
-                <a:spcPct val="100000"/>
-              </a:lnSpc>
-              <a:spcBef>
-                <a:spcPts val="0"/>
-              </a:spcBef>
-              <a:spcAft>
-                <a:spcPts val="0"/>
-              </a:spcAft>
-              <a:buClrTx/>
-              <a:buSzTx/>
-              <a:buFontTx/>
-              <a:buNone/>
-              <a:tabLst/>
+            <a:pPr>
               <a:defRPr/>
             </a:pPr>
             <a:fld id="{107A54EE-FF42-4B1D-9F90-032BC404731E}" type="datetimeFigureOut">
-              <a:rPr kumimoji="0" lang="en-US" sz="1800" b="0" i="0" u="none" strike="noStrike" kern="1200" cap="none" spc="0" normalizeH="0" baseline="0" noProof="0" smtClean="0">
-                <a:ln>
-                  <a:noFill/>
-                </a:ln>
+              <a:rPr lang="en-US" smtClean="0">
                 <a:solidFill>
                   <a:prstClr val="black"/>
                 </a:solidFill>
-                <a:effectLst/>
-                <a:uLnTx/>
-                <a:uFillTx/>
                 <a:latin typeface="Calibri" panose="020F0502020204030204"/>
-                <a:ea typeface="+mn-ea"/>
-                <a:cs typeface="+mn-cs"/>
               </a:rPr>
-              <a:pPr marL="0" marR="0" lvl="0" indent="0" algn="l" defTabSz="914400" rtl="0" eaLnBrk="1" fontAlgn="auto" latinLnBrk="0" hangingPunct="1">
-                <a:lnSpc>
-                  <a:spcPct val="100000"/>
-                </a:lnSpc>
-                <a:spcBef>
-                  <a:spcPts val="0"/>
-                </a:spcBef>
-                <a:spcAft>
-                  <a:spcPts val="0"/>
-                </a:spcAft>
-                <a:buClrTx/>
-                <a:buSzTx/>
-                <a:buFontTx/>
-                <a:buNone/>
-                <a:tabLst/>
+              <a:pPr>
                 <a:defRPr/>
               </a:pPr>
-              <a:t>11/30/2017</a:t>
+              <a:t>12/1/2017</a:t>
             </a:fld>
-            <a:endParaRPr kumimoji="0" lang="en-US" sz="1800" b="0" i="0" u="none" strike="noStrike" kern="1200" cap="none" spc="0" normalizeH="0" baseline="0" noProof="0">
-              <a:ln>
-                <a:noFill/>
-              </a:ln>
+            <a:endParaRPr lang="en-US">
               <a:solidFill>
                 <a:prstClr val="black"/>
               </a:solidFill>
-              <a:effectLst/>
-              <a:uLnTx/>
-              <a:uFillTx/>
               <a:latin typeface="Calibri" panose="020F0502020204030204"/>
-              <a:ea typeface="+mn-ea"/>
-              <a:cs typeface="+mn-cs"/>
             </a:endParaRPr>
           </a:p>
         </p:txBody>
@@ -718,8 +568,8 @@
         </p:nvSpPr>
         <p:spPr>
           <a:xfrm>
-            <a:off x="4038600" y="6356350"/>
-            <a:ext cx="4114800" cy="365125"/>
+            <a:off x="4038600" y="8475134"/>
+            <a:ext cx="4114800" cy="486833"/>
           </a:xfrm>
           <a:prstGeom prst="rect">
             <a:avLst/>
@@ -729,36 +579,14 @@
           <a:bodyPr/>
           <a:lstStyle/>
           <a:p>
-            <a:pPr marL="0" marR="0" lvl="0" indent="0" algn="l" defTabSz="914400" rtl="0" eaLnBrk="1" fontAlgn="auto" latinLnBrk="0" hangingPunct="1">
-              <a:lnSpc>
-                <a:spcPct val="100000"/>
-              </a:lnSpc>
-              <a:spcBef>
-                <a:spcPts val="0"/>
-              </a:spcBef>
-              <a:spcAft>
-                <a:spcPts val="0"/>
-              </a:spcAft>
-              <a:buClrTx/>
-              <a:buSzTx/>
-              <a:buFontTx/>
-              <a:buNone/>
-              <a:tabLst/>
+            <a:pPr>
               <a:defRPr/>
             </a:pPr>
-            <a:endParaRPr kumimoji="0" lang="en-US" sz="1800" b="0" i="0" u="none" strike="noStrike" kern="1200" cap="none" spc="0" normalizeH="0" baseline="0" noProof="0">
-              <a:ln>
-                <a:noFill/>
-              </a:ln>
+            <a:endParaRPr lang="en-US">
               <a:solidFill>
                 <a:prstClr val="black"/>
               </a:solidFill>
-              <a:effectLst/>
-              <a:uLnTx/>
-              <a:uFillTx/>
               <a:latin typeface="Calibri" panose="020F0502020204030204"/>
-              <a:ea typeface="+mn-ea"/>
-              <a:cs typeface="+mn-cs"/>
             </a:endParaRPr>
           </a:p>
         </p:txBody>
@@ -775,8 +603,8 @@
         </p:nvSpPr>
         <p:spPr>
           <a:xfrm>
-            <a:off x="8610600" y="6356350"/>
-            <a:ext cx="2743200" cy="365125"/>
+            <a:off x="8610600" y="8475134"/>
+            <a:ext cx="2743200" cy="486833"/>
           </a:xfrm>
           <a:prstGeom prst="rect">
             <a:avLst/>
@@ -786,70 +614,26 @@
           <a:bodyPr/>
           <a:lstStyle/>
           <a:p>
-            <a:pPr marL="0" marR="0" lvl="0" indent="0" algn="l" defTabSz="914400" rtl="0" eaLnBrk="1" fontAlgn="auto" latinLnBrk="0" hangingPunct="1">
-              <a:lnSpc>
-                <a:spcPct val="100000"/>
-              </a:lnSpc>
-              <a:spcBef>
-                <a:spcPts val="0"/>
-              </a:spcBef>
-              <a:spcAft>
-                <a:spcPts val="0"/>
-              </a:spcAft>
-              <a:buClrTx/>
-              <a:buSzTx/>
-              <a:buFontTx/>
-              <a:buNone/>
-              <a:tabLst/>
+            <a:pPr algn="l">
               <a:defRPr/>
             </a:pPr>
             <a:fld id="{52144C99-8741-4102-B794-D10AFFB4C19C}" type="slidenum">
-              <a:rPr kumimoji="0" lang="en-US" sz="1800" b="0" i="0" u="none" strike="noStrike" kern="1200" cap="none" spc="0" normalizeH="0" baseline="0" noProof="0" smtClean="0">
-                <a:ln>
-                  <a:noFill/>
-                </a:ln>
+              <a:rPr lang="en-US" sz="1800" smtClean="0">
                 <a:solidFill>
                   <a:prstClr val="black"/>
                 </a:solidFill>
-                <a:effectLst/>
-                <a:uLnTx/>
-                <a:uFillTx/>
                 <a:latin typeface="Calibri" panose="020F0502020204030204"/>
-                <a:ea typeface="+mn-ea"/>
-                <a:cs typeface="+mn-cs"/>
               </a:rPr>
-              <a:pPr marL="0" marR="0" lvl="0" indent="0" algn="l" defTabSz="914400" rtl="0" eaLnBrk="1" fontAlgn="auto" latinLnBrk="0" hangingPunct="1">
-                <a:lnSpc>
-                  <a:spcPct val="100000"/>
-                </a:lnSpc>
-                <a:spcBef>
-                  <a:spcPts val="0"/>
-                </a:spcBef>
-                <a:spcAft>
-                  <a:spcPts val="0"/>
-                </a:spcAft>
-                <a:buClrTx/>
-                <a:buSzTx/>
-                <a:buFontTx/>
-                <a:buNone/>
-                <a:tabLst/>
+              <a:pPr algn="l">
                 <a:defRPr/>
               </a:pPr>
               <a:t>‹#›</a:t>
             </a:fld>
-            <a:endParaRPr kumimoji="0" lang="en-US" sz="1800" b="0" i="0" u="none" strike="noStrike" kern="1200" cap="none" spc="0" normalizeH="0" baseline="0" noProof="0">
-              <a:ln>
-                <a:noFill/>
-              </a:ln>
+            <a:endParaRPr lang="en-US" sz="1800">
               <a:solidFill>
                 <a:prstClr val="black"/>
               </a:solidFill>
-              <a:effectLst/>
-              <a:uLnTx/>
-              <a:uFillTx/>
               <a:latin typeface="Calibri" panose="020F0502020204030204"/>
-              <a:ea typeface="+mn-ea"/>
-              <a:cs typeface="+mn-cs"/>
             </a:endParaRPr>
           </a:p>
         </p:txBody>
@@ -896,8 +680,8 @@
         </p:nvSpPr>
         <p:spPr>
           <a:xfrm>
-            <a:off x="8724900" y="365125"/>
-            <a:ext cx="2628900" cy="5811838"/>
+            <a:off x="8724900" y="486834"/>
+            <a:ext cx="2628900" cy="7749117"/>
           </a:xfrm>
         </p:spPr>
         <p:txBody>
@@ -923,8 +707,8 @@
         </p:nvSpPr>
         <p:spPr>
           <a:xfrm>
-            <a:off x="838200" y="365125"/>
-            <a:ext cx="7734300" cy="5811838"/>
+            <a:off x="838200" y="486834"/>
+            <a:ext cx="7734300" cy="7749117"/>
           </a:xfrm>
         </p:spPr>
         <p:txBody>
@@ -979,8 +763,8 @@
         </p:nvSpPr>
         <p:spPr>
           <a:xfrm>
-            <a:off x="838200" y="6356350"/>
-            <a:ext cx="2743200" cy="365125"/>
+            <a:off x="838200" y="8475134"/>
+            <a:ext cx="2743200" cy="486833"/>
           </a:xfrm>
           <a:prstGeom prst="rect">
             <a:avLst/>
@@ -990,70 +774,26 @@
           <a:bodyPr/>
           <a:lstStyle/>
           <a:p>
-            <a:pPr marL="0" marR="0" lvl="0" indent="0" algn="l" defTabSz="914400" rtl="0" eaLnBrk="1" fontAlgn="auto" latinLnBrk="0" hangingPunct="1">
-              <a:lnSpc>
-                <a:spcPct val="100000"/>
-              </a:lnSpc>
-              <a:spcBef>
-                <a:spcPts val="0"/>
-              </a:spcBef>
-              <a:spcAft>
-                <a:spcPts val="0"/>
-              </a:spcAft>
-              <a:buClrTx/>
-              <a:buSzTx/>
-              <a:buFontTx/>
-              <a:buNone/>
-              <a:tabLst/>
+            <a:pPr>
               <a:defRPr/>
             </a:pPr>
             <a:fld id="{107A54EE-FF42-4B1D-9F90-032BC404731E}" type="datetimeFigureOut">
-              <a:rPr kumimoji="0" lang="en-US" sz="1800" b="0" i="0" u="none" strike="noStrike" kern="1200" cap="none" spc="0" normalizeH="0" baseline="0" noProof="0" smtClean="0">
-                <a:ln>
-                  <a:noFill/>
-                </a:ln>
+              <a:rPr lang="en-US" smtClean="0">
                 <a:solidFill>
                   <a:prstClr val="black"/>
                 </a:solidFill>
-                <a:effectLst/>
-                <a:uLnTx/>
-                <a:uFillTx/>
                 <a:latin typeface="Calibri" panose="020F0502020204030204"/>
-                <a:ea typeface="+mn-ea"/>
-                <a:cs typeface="+mn-cs"/>
               </a:rPr>
-              <a:pPr marL="0" marR="0" lvl="0" indent="0" algn="l" defTabSz="914400" rtl="0" eaLnBrk="1" fontAlgn="auto" latinLnBrk="0" hangingPunct="1">
-                <a:lnSpc>
-                  <a:spcPct val="100000"/>
-                </a:lnSpc>
-                <a:spcBef>
-                  <a:spcPts val="0"/>
-                </a:spcBef>
-                <a:spcAft>
-                  <a:spcPts val="0"/>
-                </a:spcAft>
-                <a:buClrTx/>
-                <a:buSzTx/>
-                <a:buFontTx/>
-                <a:buNone/>
-                <a:tabLst/>
+              <a:pPr>
                 <a:defRPr/>
               </a:pPr>
-              <a:t>11/30/2017</a:t>
+              <a:t>12/1/2017</a:t>
             </a:fld>
-            <a:endParaRPr kumimoji="0" lang="en-US" sz="1800" b="0" i="0" u="none" strike="noStrike" kern="1200" cap="none" spc="0" normalizeH="0" baseline="0" noProof="0">
-              <a:ln>
-                <a:noFill/>
-              </a:ln>
+            <a:endParaRPr lang="en-US">
               <a:solidFill>
                 <a:prstClr val="black"/>
               </a:solidFill>
-              <a:effectLst/>
-              <a:uLnTx/>
-              <a:uFillTx/>
               <a:latin typeface="Calibri" panose="020F0502020204030204"/>
-              <a:ea typeface="+mn-ea"/>
-              <a:cs typeface="+mn-cs"/>
             </a:endParaRPr>
           </a:p>
         </p:txBody>
@@ -1070,8 +810,8 @@
         </p:nvSpPr>
         <p:spPr>
           <a:xfrm>
-            <a:off x="4038600" y="6356350"/>
-            <a:ext cx="4114800" cy="365125"/>
+            <a:off x="4038600" y="8475134"/>
+            <a:ext cx="4114800" cy="486833"/>
           </a:xfrm>
           <a:prstGeom prst="rect">
             <a:avLst/>
@@ -1081,36 +821,14 @@
           <a:bodyPr/>
           <a:lstStyle/>
           <a:p>
-            <a:pPr marL="0" marR="0" lvl="0" indent="0" algn="l" defTabSz="914400" rtl="0" eaLnBrk="1" fontAlgn="auto" latinLnBrk="0" hangingPunct="1">
-              <a:lnSpc>
-                <a:spcPct val="100000"/>
-              </a:lnSpc>
-              <a:spcBef>
-                <a:spcPts val="0"/>
-              </a:spcBef>
-              <a:spcAft>
-                <a:spcPts val="0"/>
-              </a:spcAft>
-              <a:buClrTx/>
-              <a:buSzTx/>
-              <a:buFontTx/>
-              <a:buNone/>
-              <a:tabLst/>
+            <a:pPr>
               <a:defRPr/>
             </a:pPr>
-            <a:endParaRPr kumimoji="0" lang="en-US" sz="1800" b="0" i="0" u="none" strike="noStrike" kern="1200" cap="none" spc="0" normalizeH="0" baseline="0" noProof="0">
-              <a:ln>
-                <a:noFill/>
-              </a:ln>
+            <a:endParaRPr lang="en-US">
               <a:solidFill>
                 <a:prstClr val="black"/>
               </a:solidFill>
-              <a:effectLst/>
-              <a:uLnTx/>
-              <a:uFillTx/>
               <a:latin typeface="Calibri" panose="020F0502020204030204"/>
-              <a:ea typeface="+mn-ea"/>
-              <a:cs typeface="+mn-cs"/>
             </a:endParaRPr>
           </a:p>
         </p:txBody>
@@ -1127,8 +845,8 @@
         </p:nvSpPr>
         <p:spPr>
           <a:xfrm>
-            <a:off x="8610600" y="6356350"/>
-            <a:ext cx="2743200" cy="365125"/>
+            <a:off x="8610600" y="8475134"/>
+            <a:ext cx="2743200" cy="486833"/>
           </a:xfrm>
           <a:prstGeom prst="rect">
             <a:avLst/>
@@ -1138,70 +856,26 @@
           <a:bodyPr/>
           <a:lstStyle/>
           <a:p>
-            <a:pPr marL="0" marR="0" lvl="0" indent="0" algn="l" defTabSz="914400" rtl="0" eaLnBrk="1" fontAlgn="auto" latinLnBrk="0" hangingPunct="1">
-              <a:lnSpc>
-                <a:spcPct val="100000"/>
-              </a:lnSpc>
-              <a:spcBef>
-                <a:spcPts val="0"/>
-              </a:spcBef>
-              <a:spcAft>
-                <a:spcPts val="0"/>
-              </a:spcAft>
-              <a:buClrTx/>
-              <a:buSzTx/>
-              <a:buFontTx/>
-              <a:buNone/>
-              <a:tabLst/>
+            <a:pPr algn="l">
               <a:defRPr/>
             </a:pPr>
             <a:fld id="{52144C99-8741-4102-B794-D10AFFB4C19C}" type="slidenum">
-              <a:rPr kumimoji="0" lang="en-US" sz="1800" b="0" i="0" u="none" strike="noStrike" kern="1200" cap="none" spc="0" normalizeH="0" baseline="0" noProof="0" smtClean="0">
-                <a:ln>
-                  <a:noFill/>
-                </a:ln>
+              <a:rPr lang="en-US" sz="1800" smtClean="0">
                 <a:solidFill>
                   <a:prstClr val="black"/>
                 </a:solidFill>
-                <a:effectLst/>
-                <a:uLnTx/>
-                <a:uFillTx/>
                 <a:latin typeface="Calibri" panose="020F0502020204030204"/>
-                <a:ea typeface="+mn-ea"/>
-                <a:cs typeface="+mn-cs"/>
               </a:rPr>
-              <a:pPr marL="0" marR="0" lvl="0" indent="0" algn="l" defTabSz="914400" rtl="0" eaLnBrk="1" fontAlgn="auto" latinLnBrk="0" hangingPunct="1">
-                <a:lnSpc>
-                  <a:spcPct val="100000"/>
-                </a:lnSpc>
-                <a:spcBef>
-                  <a:spcPts val="0"/>
-                </a:spcBef>
-                <a:spcAft>
-                  <a:spcPts val="0"/>
-                </a:spcAft>
-                <a:buClrTx/>
-                <a:buSzTx/>
-                <a:buFontTx/>
-                <a:buNone/>
-                <a:tabLst/>
+              <a:pPr algn="l">
                 <a:defRPr/>
               </a:pPr>
               <a:t>‹#›</a:t>
             </a:fld>
-            <a:endParaRPr kumimoji="0" lang="en-US" sz="1800" b="0" i="0" u="none" strike="noStrike" kern="1200" cap="none" spc="0" normalizeH="0" baseline="0" noProof="0">
-              <a:ln>
-                <a:noFill/>
-              </a:ln>
+            <a:endParaRPr lang="en-US" sz="1800">
               <a:solidFill>
                 <a:prstClr val="black"/>
               </a:solidFill>
-              <a:effectLst/>
-              <a:uLnTx/>
-              <a:uFillTx/>
               <a:latin typeface="Calibri" panose="020F0502020204030204"/>
-              <a:ea typeface="+mn-ea"/>
-              <a:cs typeface="+mn-cs"/>
             </a:endParaRPr>
           </a:p>
         </p:txBody>
@@ -1248,8 +922,8 @@
         </p:nvSpPr>
         <p:spPr>
           <a:xfrm>
-            <a:off x="323850" y="148767"/>
-            <a:ext cx="11525250" cy="790575"/>
+            <a:off x="323850" y="198357"/>
+            <a:ext cx="11525250" cy="1054100"/>
           </a:xfrm>
         </p:spPr>
         <p:txBody>
@@ -1326,8 +1000,8 @@
         </p:nvSpPr>
         <p:spPr>
           <a:xfrm>
-            <a:off x="838200" y="6356350"/>
-            <a:ext cx="2743200" cy="365125"/>
+            <a:off x="838200" y="8475134"/>
+            <a:ext cx="2743200" cy="486833"/>
           </a:xfrm>
           <a:prstGeom prst="rect">
             <a:avLst/>
@@ -1337,70 +1011,26 @@
           <a:bodyPr/>
           <a:lstStyle/>
           <a:p>
-            <a:pPr marL="0" marR="0" lvl="0" indent="0" algn="l" defTabSz="914400" rtl="0" eaLnBrk="1" fontAlgn="auto" latinLnBrk="0" hangingPunct="1">
-              <a:lnSpc>
-                <a:spcPct val="100000"/>
-              </a:lnSpc>
-              <a:spcBef>
-                <a:spcPts val="0"/>
-              </a:spcBef>
-              <a:spcAft>
-                <a:spcPts val="0"/>
-              </a:spcAft>
-              <a:buClrTx/>
-              <a:buSzTx/>
-              <a:buFontTx/>
-              <a:buNone/>
-              <a:tabLst/>
+            <a:pPr>
               <a:defRPr/>
             </a:pPr>
             <a:fld id="{107A54EE-FF42-4B1D-9F90-032BC404731E}" type="datetimeFigureOut">
-              <a:rPr kumimoji="0" lang="en-US" sz="1800" b="0" i="0" u="none" strike="noStrike" kern="1200" cap="none" spc="0" normalizeH="0" baseline="0" noProof="0" smtClean="0">
-                <a:ln>
-                  <a:noFill/>
-                </a:ln>
+              <a:rPr lang="en-US" smtClean="0">
                 <a:solidFill>
                   <a:prstClr val="black"/>
                 </a:solidFill>
-                <a:effectLst/>
-                <a:uLnTx/>
-                <a:uFillTx/>
                 <a:latin typeface="Calibri" panose="020F0502020204030204"/>
-                <a:ea typeface="+mn-ea"/>
-                <a:cs typeface="+mn-cs"/>
               </a:rPr>
-              <a:pPr marL="0" marR="0" lvl="0" indent="0" algn="l" defTabSz="914400" rtl="0" eaLnBrk="1" fontAlgn="auto" latinLnBrk="0" hangingPunct="1">
-                <a:lnSpc>
-                  <a:spcPct val="100000"/>
-                </a:lnSpc>
-                <a:spcBef>
-                  <a:spcPts val="0"/>
-                </a:spcBef>
-                <a:spcAft>
-                  <a:spcPts val="0"/>
-                </a:spcAft>
-                <a:buClrTx/>
-                <a:buSzTx/>
-                <a:buFontTx/>
-                <a:buNone/>
-                <a:tabLst/>
+              <a:pPr>
                 <a:defRPr/>
               </a:pPr>
-              <a:t>11/30/2017</a:t>
+              <a:t>12/1/2017</a:t>
             </a:fld>
-            <a:endParaRPr kumimoji="0" lang="en-US" sz="1800" b="0" i="0" u="none" strike="noStrike" kern="1200" cap="none" spc="0" normalizeH="0" baseline="0" noProof="0">
-              <a:ln>
-                <a:noFill/>
-              </a:ln>
+            <a:endParaRPr lang="en-US">
               <a:solidFill>
                 <a:prstClr val="black"/>
               </a:solidFill>
-              <a:effectLst/>
-              <a:uLnTx/>
-              <a:uFillTx/>
               <a:latin typeface="Calibri" panose="020F0502020204030204"/>
-              <a:ea typeface="+mn-ea"/>
-              <a:cs typeface="+mn-cs"/>
             </a:endParaRPr>
           </a:p>
         </p:txBody>
@@ -1417,8 +1047,8 @@
         </p:nvSpPr>
         <p:spPr>
           <a:xfrm>
-            <a:off x="4038600" y="6356350"/>
-            <a:ext cx="4114800" cy="365125"/>
+            <a:off x="4038600" y="8475134"/>
+            <a:ext cx="4114800" cy="486833"/>
           </a:xfrm>
           <a:prstGeom prst="rect">
             <a:avLst/>
@@ -1428,36 +1058,14 @@
           <a:bodyPr/>
           <a:lstStyle/>
           <a:p>
-            <a:pPr marL="0" marR="0" lvl="0" indent="0" algn="l" defTabSz="914400" rtl="0" eaLnBrk="1" fontAlgn="auto" latinLnBrk="0" hangingPunct="1">
-              <a:lnSpc>
-                <a:spcPct val="100000"/>
-              </a:lnSpc>
-              <a:spcBef>
-                <a:spcPts val="0"/>
-              </a:spcBef>
-              <a:spcAft>
-                <a:spcPts val="0"/>
-              </a:spcAft>
-              <a:buClrTx/>
-              <a:buSzTx/>
-              <a:buFontTx/>
-              <a:buNone/>
-              <a:tabLst/>
+            <a:pPr>
               <a:defRPr/>
             </a:pPr>
-            <a:endParaRPr kumimoji="0" lang="en-US" sz="1800" b="0" i="0" u="none" strike="noStrike" kern="1200" cap="none" spc="0" normalizeH="0" baseline="0" noProof="0" dirty="0">
-              <a:ln>
-                <a:noFill/>
-              </a:ln>
+            <a:endParaRPr lang="en-US" dirty="0">
               <a:solidFill>
                 <a:prstClr val="black"/>
               </a:solidFill>
-              <a:effectLst/>
-              <a:uLnTx/>
-              <a:uFillTx/>
               <a:latin typeface="Calibri" panose="020F0502020204030204"/>
-              <a:ea typeface="+mn-ea"/>
-              <a:cs typeface="+mn-cs"/>
             </a:endParaRPr>
           </a:p>
         </p:txBody>
@@ -1474,8 +1082,8 @@
         </p:nvSpPr>
         <p:spPr>
           <a:xfrm>
-            <a:off x="8610600" y="6356350"/>
-            <a:ext cx="2743200" cy="365125"/>
+            <a:off x="8610600" y="8475134"/>
+            <a:ext cx="2743200" cy="486833"/>
           </a:xfrm>
           <a:prstGeom prst="rect">
             <a:avLst/>
@@ -1485,70 +1093,26 @@
           <a:bodyPr/>
           <a:lstStyle/>
           <a:p>
-            <a:pPr marL="0" marR="0" lvl="0" indent="0" algn="l" defTabSz="914400" rtl="0" eaLnBrk="1" fontAlgn="auto" latinLnBrk="0" hangingPunct="1">
-              <a:lnSpc>
-                <a:spcPct val="100000"/>
-              </a:lnSpc>
-              <a:spcBef>
-                <a:spcPts val="0"/>
-              </a:spcBef>
-              <a:spcAft>
-                <a:spcPts val="0"/>
-              </a:spcAft>
-              <a:buClrTx/>
-              <a:buSzTx/>
-              <a:buFontTx/>
-              <a:buNone/>
-              <a:tabLst/>
+            <a:pPr algn="l">
               <a:defRPr/>
             </a:pPr>
             <a:fld id="{52144C99-8741-4102-B794-D10AFFB4C19C}" type="slidenum">
-              <a:rPr kumimoji="0" lang="en-US" sz="1800" b="0" i="0" u="none" strike="noStrike" kern="1200" cap="none" spc="0" normalizeH="0" baseline="0" noProof="0" smtClean="0">
-                <a:ln>
-                  <a:noFill/>
-                </a:ln>
+              <a:rPr lang="en-US" sz="1800" smtClean="0">
                 <a:solidFill>
                   <a:prstClr val="black"/>
                 </a:solidFill>
-                <a:effectLst/>
-                <a:uLnTx/>
-                <a:uFillTx/>
                 <a:latin typeface="Calibri" panose="020F0502020204030204"/>
-                <a:ea typeface="+mn-ea"/>
-                <a:cs typeface="+mn-cs"/>
               </a:rPr>
-              <a:pPr marL="0" marR="0" lvl="0" indent="0" algn="l" defTabSz="914400" rtl="0" eaLnBrk="1" fontAlgn="auto" latinLnBrk="0" hangingPunct="1">
-                <a:lnSpc>
-                  <a:spcPct val="100000"/>
-                </a:lnSpc>
-                <a:spcBef>
-                  <a:spcPts val="0"/>
-                </a:spcBef>
-                <a:spcAft>
-                  <a:spcPts val="0"/>
-                </a:spcAft>
-                <a:buClrTx/>
-                <a:buSzTx/>
-                <a:buFontTx/>
-                <a:buNone/>
-                <a:tabLst/>
+              <a:pPr algn="l">
                 <a:defRPr/>
               </a:pPr>
               <a:t>‹#›</a:t>
             </a:fld>
-            <a:endParaRPr kumimoji="0" lang="en-US" sz="1800" b="0" i="0" u="none" strike="noStrike" kern="1200" cap="none" spc="0" normalizeH="0" baseline="0" noProof="0">
-              <a:ln>
-                <a:noFill/>
-              </a:ln>
+            <a:endParaRPr lang="en-US" sz="1800">
               <a:solidFill>
                 <a:prstClr val="black"/>
               </a:solidFill>
-              <a:effectLst/>
-              <a:uLnTx/>
-              <a:uFillTx/>
               <a:latin typeface="Calibri" panose="020F0502020204030204"/>
-              <a:ea typeface="+mn-ea"/>
-              <a:cs typeface="+mn-cs"/>
             </a:endParaRPr>
           </a:p>
         </p:txBody>
@@ -1563,8 +1127,8 @@
         </p:nvSpPr>
         <p:spPr>
           <a:xfrm>
-            <a:off x="5700737" y="6450483"/>
-            <a:ext cx="465834" cy="365125"/>
+            <a:off x="5700737" y="8600645"/>
+            <a:ext cx="465834" cy="486833"/>
           </a:xfrm>
           <a:prstGeom prst="rect">
             <a:avLst/>
@@ -1672,13 +1236,13 @@
               <a:defRPr/>
             </a:pPr>
             <a:fld id="{1CD50270-5DC5-482F-A4D7-C9F680EDD899}" type="slidenum">
-              <a:rPr lang="en-US" smtClean="0"/>
+              <a:rPr lang="en-US" sz="1600" smtClean="0"/>
               <a:pPr>
                 <a:defRPr/>
               </a:pPr>
               <a:t>‹#›</a:t>
             </a:fld>
-            <a:endParaRPr lang="en-US" dirty="0"/>
+            <a:endParaRPr lang="en-US" sz="1600" dirty="0"/>
           </a:p>
         </p:txBody>
       </p:sp>
@@ -1724,8 +1288,8 @@
         </p:nvSpPr>
         <p:spPr>
           <a:xfrm>
-            <a:off x="831850" y="1709738"/>
-            <a:ext cx="10515600" cy="2852737"/>
+            <a:off x="831850" y="2279652"/>
+            <a:ext cx="10515600" cy="3803649"/>
           </a:xfrm>
         </p:spPr>
         <p:txBody>
@@ -1755,8 +1319,8 @@
         </p:nvSpPr>
         <p:spPr>
           <a:xfrm>
-            <a:off x="831850" y="4589463"/>
-            <a:ext cx="10515600" cy="1500187"/>
+            <a:off x="831850" y="6119285"/>
+            <a:ext cx="10515600" cy="2000249"/>
           </a:xfrm>
         </p:spPr>
         <p:txBody>
@@ -1874,8 +1438,8 @@
         </p:nvSpPr>
         <p:spPr>
           <a:xfrm>
-            <a:off x="838200" y="6356350"/>
-            <a:ext cx="2743200" cy="365125"/>
+            <a:off x="838200" y="8475134"/>
+            <a:ext cx="2743200" cy="486833"/>
           </a:xfrm>
           <a:prstGeom prst="rect">
             <a:avLst/>
@@ -1885,70 +1449,26 @@
           <a:bodyPr/>
           <a:lstStyle/>
           <a:p>
-            <a:pPr marL="0" marR="0" lvl="0" indent="0" algn="l" defTabSz="914400" rtl="0" eaLnBrk="1" fontAlgn="auto" latinLnBrk="0" hangingPunct="1">
-              <a:lnSpc>
-                <a:spcPct val="100000"/>
-              </a:lnSpc>
-              <a:spcBef>
-                <a:spcPts val="0"/>
-              </a:spcBef>
-              <a:spcAft>
-                <a:spcPts val="0"/>
-              </a:spcAft>
-              <a:buClrTx/>
-              <a:buSzTx/>
-              <a:buFontTx/>
-              <a:buNone/>
-              <a:tabLst/>
+            <a:pPr>
               <a:defRPr/>
             </a:pPr>
             <a:fld id="{107A54EE-FF42-4B1D-9F90-032BC404731E}" type="datetimeFigureOut">
-              <a:rPr kumimoji="0" lang="en-US" sz="1800" b="0" i="0" u="none" strike="noStrike" kern="1200" cap="none" spc="0" normalizeH="0" baseline="0" noProof="0" smtClean="0">
-                <a:ln>
-                  <a:noFill/>
-                </a:ln>
+              <a:rPr lang="en-US" smtClean="0">
                 <a:solidFill>
                   <a:prstClr val="black"/>
                 </a:solidFill>
-                <a:effectLst/>
-                <a:uLnTx/>
-                <a:uFillTx/>
                 <a:latin typeface="Calibri" panose="020F0502020204030204"/>
-                <a:ea typeface="+mn-ea"/>
-                <a:cs typeface="+mn-cs"/>
               </a:rPr>
-              <a:pPr marL="0" marR="0" lvl="0" indent="0" algn="l" defTabSz="914400" rtl="0" eaLnBrk="1" fontAlgn="auto" latinLnBrk="0" hangingPunct="1">
-                <a:lnSpc>
-                  <a:spcPct val="100000"/>
-                </a:lnSpc>
-                <a:spcBef>
-                  <a:spcPts val="0"/>
-                </a:spcBef>
-                <a:spcAft>
-                  <a:spcPts val="0"/>
-                </a:spcAft>
-                <a:buClrTx/>
-                <a:buSzTx/>
-                <a:buFontTx/>
-                <a:buNone/>
-                <a:tabLst/>
+              <a:pPr>
                 <a:defRPr/>
               </a:pPr>
-              <a:t>11/30/2017</a:t>
+              <a:t>12/1/2017</a:t>
             </a:fld>
-            <a:endParaRPr kumimoji="0" lang="en-US" sz="1800" b="0" i="0" u="none" strike="noStrike" kern="1200" cap="none" spc="0" normalizeH="0" baseline="0" noProof="0">
-              <a:ln>
-                <a:noFill/>
-              </a:ln>
+            <a:endParaRPr lang="en-US">
               <a:solidFill>
                 <a:prstClr val="black"/>
               </a:solidFill>
-              <a:effectLst/>
-              <a:uLnTx/>
-              <a:uFillTx/>
               <a:latin typeface="Calibri" panose="020F0502020204030204"/>
-              <a:ea typeface="+mn-ea"/>
-              <a:cs typeface="+mn-cs"/>
             </a:endParaRPr>
           </a:p>
         </p:txBody>
@@ -1965,8 +1485,8 @@
         </p:nvSpPr>
         <p:spPr>
           <a:xfrm>
-            <a:off x="4038600" y="6356350"/>
-            <a:ext cx="4114800" cy="365125"/>
+            <a:off x="4038600" y="8475134"/>
+            <a:ext cx="4114800" cy="486833"/>
           </a:xfrm>
           <a:prstGeom prst="rect">
             <a:avLst/>
@@ -1976,36 +1496,14 @@
           <a:bodyPr/>
           <a:lstStyle/>
           <a:p>
-            <a:pPr marL="0" marR="0" lvl="0" indent="0" algn="l" defTabSz="914400" rtl="0" eaLnBrk="1" fontAlgn="auto" latinLnBrk="0" hangingPunct="1">
-              <a:lnSpc>
-                <a:spcPct val="100000"/>
-              </a:lnSpc>
-              <a:spcBef>
-                <a:spcPts val="0"/>
-              </a:spcBef>
-              <a:spcAft>
-                <a:spcPts val="0"/>
-              </a:spcAft>
-              <a:buClrTx/>
-              <a:buSzTx/>
-              <a:buFontTx/>
-              <a:buNone/>
-              <a:tabLst/>
+            <a:pPr>
               <a:defRPr/>
             </a:pPr>
-            <a:endParaRPr kumimoji="0" lang="en-US" sz="1800" b="0" i="0" u="none" strike="noStrike" kern="1200" cap="none" spc="0" normalizeH="0" baseline="0" noProof="0">
-              <a:ln>
-                <a:noFill/>
-              </a:ln>
+            <a:endParaRPr lang="en-US">
               <a:solidFill>
                 <a:prstClr val="black"/>
               </a:solidFill>
-              <a:effectLst/>
-              <a:uLnTx/>
-              <a:uFillTx/>
               <a:latin typeface="Calibri" panose="020F0502020204030204"/>
-              <a:ea typeface="+mn-ea"/>
-              <a:cs typeface="+mn-cs"/>
             </a:endParaRPr>
           </a:p>
         </p:txBody>
@@ -2022,8 +1520,8 @@
         </p:nvSpPr>
         <p:spPr>
           <a:xfrm>
-            <a:off x="8610600" y="6356350"/>
-            <a:ext cx="2743200" cy="365125"/>
+            <a:off x="8610600" y="8475134"/>
+            <a:ext cx="2743200" cy="486833"/>
           </a:xfrm>
           <a:prstGeom prst="rect">
             <a:avLst/>
@@ -2033,70 +1531,26 @@
           <a:bodyPr/>
           <a:lstStyle/>
           <a:p>
-            <a:pPr marL="0" marR="0" lvl="0" indent="0" algn="l" defTabSz="914400" rtl="0" eaLnBrk="1" fontAlgn="auto" latinLnBrk="0" hangingPunct="1">
-              <a:lnSpc>
-                <a:spcPct val="100000"/>
-              </a:lnSpc>
-              <a:spcBef>
-                <a:spcPts val="0"/>
-              </a:spcBef>
-              <a:spcAft>
-                <a:spcPts val="0"/>
-              </a:spcAft>
-              <a:buClrTx/>
-              <a:buSzTx/>
-              <a:buFontTx/>
-              <a:buNone/>
-              <a:tabLst/>
+            <a:pPr algn="l">
               <a:defRPr/>
             </a:pPr>
             <a:fld id="{52144C99-8741-4102-B794-D10AFFB4C19C}" type="slidenum">
-              <a:rPr kumimoji="0" lang="en-US" sz="1800" b="0" i="0" u="none" strike="noStrike" kern="1200" cap="none" spc="0" normalizeH="0" baseline="0" noProof="0" smtClean="0">
-                <a:ln>
-                  <a:noFill/>
-                </a:ln>
+              <a:rPr lang="en-US" sz="1800" smtClean="0">
                 <a:solidFill>
                   <a:prstClr val="black"/>
                 </a:solidFill>
-                <a:effectLst/>
-                <a:uLnTx/>
-                <a:uFillTx/>
                 <a:latin typeface="Calibri" panose="020F0502020204030204"/>
-                <a:ea typeface="+mn-ea"/>
-                <a:cs typeface="+mn-cs"/>
               </a:rPr>
-              <a:pPr marL="0" marR="0" lvl="0" indent="0" algn="l" defTabSz="914400" rtl="0" eaLnBrk="1" fontAlgn="auto" latinLnBrk="0" hangingPunct="1">
-                <a:lnSpc>
-                  <a:spcPct val="100000"/>
-                </a:lnSpc>
-                <a:spcBef>
-                  <a:spcPts val="0"/>
-                </a:spcBef>
-                <a:spcAft>
-                  <a:spcPts val="0"/>
-                </a:spcAft>
-                <a:buClrTx/>
-                <a:buSzTx/>
-                <a:buFontTx/>
-                <a:buNone/>
-                <a:tabLst/>
+              <a:pPr algn="l">
                 <a:defRPr/>
               </a:pPr>
               <a:t>‹#›</a:t>
             </a:fld>
-            <a:endParaRPr kumimoji="0" lang="en-US" sz="1800" b="0" i="0" u="none" strike="noStrike" kern="1200" cap="none" spc="0" normalizeH="0" baseline="0" noProof="0">
-              <a:ln>
-                <a:noFill/>
-              </a:ln>
+            <a:endParaRPr lang="en-US" sz="1800">
               <a:solidFill>
                 <a:prstClr val="black"/>
               </a:solidFill>
-              <a:effectLst/>
-              <a:uLnTx/>
-              <a:uFillTx/>
               <a:latin typeface="Calibri" panose="020F0502020204030204"/>
-              <a:ea typeface="+mn-ea"/>
-              <a:cs typeface="+mn-cs"/>
             </a:endParaRPr>
           </a:p>
         </p:txBody>
@@ -2111,8 +1565,8 @@
         </p:nvSpPr>
         <p:spPr>
           <a:xfrm>
-            <a:off x="5700737" y="6450483"/>
-            <a:ext cx="465834" cy="365125"/>
+            <a:off x="5700737" y="8600645"/>
+            <a:ext cx="465834" cy="486833"/>
           </a:xfrm>
           <a:prstGeom prst="rect">
             <a:avLst/>
@@ -2220,13 +1674,13 @@
               <a:defRPr/>
             </a:pPr>
             <a:fld id="{1CD50270-5DC5-482F-A4D7-C9F680EDD899}" type="slidenum">
-              <a:rPr lang="en-US" smtClean="0"/>
+              <a:rPr lang="en-US" sz="1600" smtClean="0"/>
               <a:pPr>
                 <a:defRPr/>
               </a:pPr>
               <a:t>‹#›</a:t>
             </a:fld>
-            <a:endParaRPr lang="en-US" dirty="0"/>
+            <a:endParaRPr lang="en-US" sz="1600" dirty="0"/>
           </a:p>
         </p:txBody>
       </p:sp>
@@ -2294,8 +1748,8 @@
         </p:nvSpPr>
         <p:spPr>
           <a:xfrm>
-            <a:off x="838200" y="1825625"/>
-            <a:ext cx="5181600" cy="4351338"/>
+            <a:off x="838200" y="2434167"/>
+            <a:ext cx="5181600" cy="5801784"/>
           </a:xfrm>
         </p:spPr>
         <p:txBody>
@@ -2350,8 +1804,8 @@
         </p:nvSpPr>
         <p:spPr>
           <a:xfrm>
-            <a:off x="6172200" y="1825625"/>
-            <a:ext cx="5181600" cy="4351338"/>
+            <a:off x="6172200" y="2434167"/>
+            <a:ext cx="5181600" cy="5801784"/>
           </a:xfrm>
         </p:spPr>
         <p:txBody>
@@ -2406,8 +1860,8 @@
         </p:nvSpPr>
         <p:spPr>
           <a:xfrm>
-            <a:off x="838200" y="6356350"/>
-            <a:ext cx="2743200" cy="365125"/>
+            <a:off x="838200" y="8475134"/>
+            <a:ext cx="2743200" cy="486833"/>
           </a:xfrm>
           <a:prstGeom prst="rect">
             <a:avLst/>
@@ -2417,70 +1871,26 @@
           <a:bodyPr/>
           <a:lstStyle/>
           <a:p>
-            <a:pPr marL="0" marR="0" lvl="0" indent="0" algn="l" defTabSz="914400" rtl="0" eaLnBrk="1" fontAlgn="auto" latinLnBrk="0" hangingPunct="1">
-              <a:lnSpc>
-                <a:spcPct val="100000"/>
-              </a:lnSpc>
-              <a:spcBef>
-                <a:spcPts val="0"/>
-              </a:spcBef>
-              <a:spcAft>
-                <a:spcPts val="0"/>
-              </a:spcAft>
-              <a:buClrTx/>
-              <a:buSzTx/>
-              <a:buFontTx/>
-              <a:buNone/>
-              <a:tabLst/>
+            <a:pPr>
               <a:defRPr/>
             </a:pPr>
             <a:fld id="{107A54EE-FF42-4B1D-9F90-032BC404731E}" type="datetimeFigureOut">
-              <a:rPr kumimoji="0" lang="en-US" sz="1800" b="0" i="0" u="none" strike="noStrike" kern="1200" cap="none" spc="0" normalizeH="0" baseline="0" noProof="0" smtClean="0">
-                <a:ln>
-                  <a:noFill/>
-                </a:ln>
+              <a:rPr lang="en-US" smtClean="0">
                 <a:solidFill>
                   <a:prstClr val="black"/>
                 </a:solidFill>
-                <a:effectLst/>
-                <a:uLnTx/>
-                <a:uFillTx/>
                 <a:latin typeface="Calibri" panose="020F0502020204030204"/>
-                <a:ea typeface="+mn-ea"/>
-                <a:cs typeface="+mn-cs"/>
               </a:rPr>
-              <a:pPr marL="0" marR="0" lvl="0" indent="0" algn="l" defTabSz="914400" rtl="0" eaLnBrk="1" fontAlgn="auto" latinLnBrk="0" hangingPunct="1">
-                <a:lnSpc>
-                  <a:spcPct val="100000"/>
-                </a:lnSpc>
-                <a:spcBef>
-                  <a:spcPts val="0"/>
-                </a:spcBef>
-                <a:spcAft>
-                  <a:spcPts val="0"/>
-                </a:spcAft>
-                <a:buClrTx/>
-                <a:buSzTx/>
-                <a:buFontTx/>
-                <a:buNone/>
-                <a:tabLst/>
+              <a:pPr>
                 <a:defRPr/>
               </a:pPr>
-              <a:t>11/30/2017</a:t>
+              <a:t>12/1/2017</a:t>
             </a:fld>
-            <a:endParaRPr kumimoji="0" lang="en-US" sz="1800" b="0" i="0" u="none" strike="noStrike" kern="1200" cap="none" spc="0" normalizeH="0" baseline="0" noProof="0">
-              <a:ln>
-                <a:noFill/>
-              </a:ln>
+            <a:endParaRPr lang="en-US">
               <a:solidFill>
                 <a:prstClr val="black"/>
               </a:solidFill>
-              <a:effectLst/>
-              <a:uLnTx/>
-              <a:uFillTx/>
               <a:latin typeface="Calibri" panose="020F0502020204030204"/>
-              <a:ea typeface="+mn-ea"/>
-              <a:cs typeface="+mn-cs"/>
             </a:endParaRPr>
           </a:p>
         </p:txBody>
@@ -2497,8 +1907,8 @@
         </p:nvSpPr>
         <p:spPr>
           <a:xfrm>
-            <a:off x="4038600" y="6356350"/>
-            <a:ext cx="4114800" cy="365125"/>
+            <a:off x="4038600" y="8475134"/>
+            <a:ext cx="4114800" cy="486833"/>
           </a:xfrm>
           <a:prstGeom prst="rect">
             <a:avLst/>
@@ -2508,36 +1918,14 @@
           <a:bodyPr/>
           <a:lstStyle/>
           <a:p>
-            <a:pPr marL="0" marR="0" lvl="0" indent="0" algn="l" defTabSz="914400" rtl="0" eaLnBrk="1" fontAlgn="auto" latinLnBrk="0" hangingPunct="1">
-              <a:lnSpc>
-                <a:spcPct val="100000"/>
-              </a:lnSpc>
-              <a:spcBef>
-                <a:spcPts val="0"/>
-              </a:spcBef>
-              <a:spcAft>
-                <a:spcPts val="0"/>
-              </a:spcAft>
-              <a:buClrTx/>
-              <a:buSzTx/>
-              <a:buFontTx/>
-              <a:buNone/>
-              <a:tabLst/>
+            <a:pPr>
               <a:defRPr/>
             </a:pPr>
-            <a:endParaRPr kumimoji="0" lang="en-US" sz="1800" b="0" i="0" u="none" strike="noStrike" kern="1200" cap="none" spc="0" normalizeH="0" baseline="0" noProof="0">
-              <a:ln>
-                <a:noFill/>
-              </a:ln>
+            <a:endParaRPr lang="en-US">
               <a:solidFill>
                 <a:prstClr val="black"/>
               </a:solidFill>
-              <a:effectLst/>
-              <a:uLnTx/>
-              <a:uFillTx/>
               <a:latin typeface="Calibri" panose="020F0502020204030204"/>
-              <a:ea typeface="+mn-ea"/>
-              <a:cs typeface="+mn-cs"/>
             </a:endParaRPr>
           </a:p>
         </p:txBody>
@@ -2554,8 +1942,8 @@
         </p:nvSpPr>
         <p:spPr>
           <a:xfrm>
-            <a:off x="8610600" y="6356350"/>
-            <a:ext cx="2743200" cy="365125"/>
+            <a:off x="8610600" y="8475134"/>
+            <a:ext cx="2743200" cy="486833"/>
           </a:xfrm>
           <a:prstGeom prst="rect">
             <a:avLst/>
@@ -2565,70 +1953,26 @@
           <a:bodyPr/>
           <a:lstStyle/>
           <a:p>
-            <a:pPr marL="0" marR="0" lvl="0" indent="0" algn="l" defTabSz="914400" rtl="0" eaLnBrk="1" fontAlgn="auto" latinLnBrk="0" hangingPunct="1">
-              <a:lnSpc>
-                <a:spcPct val="100000"/>
-              </a:lnSpc>
-              <a:spcBef>
-                <a:spcPts val="0"/>
-              </a:spcBef>
-              <a:spcAft>
-                <a:spcPts val="0"/>
-              </a:spcAft>
-              <a:buClrTx/>
-              <a:buSzTx/>
-              <a:buFontTx/>
-              <a:buNone/>
-              <a:tabLst/>
+            <a:pPr algn="l">
               <a:defRPr/>
             </a:pPr>
             <a:fld id="{52144C99-8741-4102-B794-D10AFFB4C19C}" type="slidenum">
-              <a:rPr kumimoji="0" lang="en-US" sz="1800" b="0" i="0" u="none" strike="noStrike" kern="1200" cap="none" spc="0" normalizeH="0" baseline="0" noProof="0" smtClean="0">
-                <a:ln>
-                  <a:noFill/>
-                </a:ln>
+              <a:rPr lang="en-US" sz="1800" smtClean="0">
                 <a:solidFill>
                   <a:prstClr val="black"/>
                 </a:solidFill>
-                <a:effectLst/>
-                <a:uLnTx/>
-                <a:uFillTx/>
                 <a:latin typeface="Calibri" panose="020F0502020204030204"/>
-                <a:ea typeface="+mn-ea"/>
-                <a:cs typeface="+mn-cs"/>
               </a:rPr>
-              <a:pPr marL="0" marR="0" lvl="0" indent="0" algn="l" defTabSz="914400" rtl="0" eaLnBrk="1" fontAlgn="auto" latinLnBrk="0" hangingPunct="1">
-                <a:lnSpc>
-                  <a:spcPct val="100000"/>
-                </a:lnSpc>
-                <a:spcBef>
-                  <a:spcPts val="0"/>
-                </a:spcBef>
-                <a:spcAft>
-                  <a:spcPts val="0"/>
-                </a:spcAft>
-                <a:buClrTx/>
-                <a:buSzTx/>
-                <a:buFontTx/>
-                <a:buNone/>
-                <a:tabLst/>
+              <a:pPr algn="l">
                 <a:defRPr/>
               </a:pPr>
               <a:t>‹#›</a:t>
             </a:fld>
-            <a:endParaRPr kumimoji="0" lang="en-US" sz="1800" b="0" i="0" u="none" strike="noStrike" kern="1200" cap="none" spc="0" normalizeH="0" baseline="0" noProof="0">
-              <a:ln>
-                <a:noFill/>
-              </a:ln>
+            <a:endParaRPr lang="en-US" sz="1800">
               <a:solidFill>
                 <a:prstClr val="black"/>
               </a:solidFill>
-              <a:effectLst/>
-              <a:uLnTx/>
-              <a:uFillTx/>
               <a:latin typeface="Calibri" panose="020F0502020204030204"/>
-              <a:ea typeface="+mn-ea"/>
-              <a:cs typeface="+mn-cs"/>
             </a:endParaRPr>
           </a:p>
         </p:txBody>
@@ -2643,8 +1987,8 @@
         </p:nvSpPr>
         <p:spPr>
           <a:xfrm>
-            <a:off x="5700737" y="6450483"/>
-            <a:ext cx="465834" cy="365125"/>
+            <a:off x="5700737" y="8600645"/>
+            <a:ext cx="465834" cy="486833"/>
           </a:xfrm>
           <a:prstGeom prst="rect">
             <a:avLst/>
@@ -2752,13 +2096,13 @@
               <a:defRPr/>
             </a:pPr>
             <a:fld id="{1CD50270-5DC5-482F-A4D7-C9F680EDD899}" type="slidenum">
-              <a:rPr lang="en-US" smtClean="0"/>
+              <a:rPr lang="en-US" sz="1600" smtClean="0"/>
               <a:pPr>
                 <a:defRPr/>
               </a:pPr>
               <a:t>‹#›</a:t>
             </a:fld>
-            <a:endParaRPr lang="en-US" dirty="0"/>
+            <a:endParaRPr lang="en-US" sz="1600" dirty="0"/>
           </a:p>
         </p:txBody>
       </p:sp>
@@ -2804,8 +2148,8 @@
         </p:nvSpPr>
         <p:spPr>
           <a:xfrm>
-            <a:off x="839788" y="365125"/>
-            <a:ext cx="10515600" cy="1325563"/>
+            <a:off x="839788" y="486834"/>
+            <a:ext cx="10515600" cy="1767417"/>
           </a:xfrm>
         </p:spPr>
         <p:txBody>
@@ -2831,8 +2175,8 @@
         </p:nvSpPr>
         <p:spPr>
           <a:xfrm>
-            <a:off x="839788" y="1681163"/>
-            <a:ext cx="5157787" cy="823912"/>
+            <a:off x="839789" y="2241551"/>
+            <a:ext cx="5157787" cy="1098549"/>
           </a:xfrm>
         </p:spPr>
         <p:txBody>
@@ -2896,8 +2240,8 @@
         </p:nvSpPr>
         <p:spPr>
           <a:xfrm>
-            <a:off x="839788" y="2505075"/>
-            <a:ext cx="5157787" cy="3684588"/>
+            <a:off x="839789" y="3340100"/>
+            <a:ext cx="5157787" cy="4912784"/>
           </a:xfrm>
         </p:spPr>
         <p:txBody>
@@ -2952,8 +2296,8 @@
         </p:nvSpPr>
         <p:spPr>
           <a:xfrm>
-            <a:off x="6172200" y="1681163"/>
-            <a:ext cx="5183188" cy="823912"/>
+            <a:off x="6172200" y="2241551"/>
+            <a:ext cx="5183188" cy="1098549"/>
           </a:xfrm>
         </p:spPr>
         <p:txBody>
@@ -3017,8 +2361,8 @@
         </p:nvSpPr>
         <p:spPr>
           <a:xfrm>
-            <a:off x="6172200" y="2505075"/>
-            <a:ext cx="5183188" cy="3684588"/>
+            <a:off x="6172200" y="3340100"/>
+            <a:ext cx="5183188" cy="4912784"/>
           </a:xfrm>
         </p:spPr>
         <p:txBody>
@@ -3073,8 +2417,8 @@
         </p:nvSpPr>
         <p:spPr>
           <a:xfrm>
-            <a:off x="838200" y="6356350"/>
-            <a:ext cx="2743200" cy="365125"/>
+            <a:off x="838200" y="8475134"/>
+            <a:ext cx="2743200" cy="486833"/>
           </a:xfrm>
           <a:prstGeom prst="rect">
             <a:avLst/>
@@ -3084,70 +2428,26 @@
           <a:bodyPr/>
           <a:lstStyle/>
           <a:p>
-            <a:pPr marL="0" marR="0" lvl="0" indent="0" algn="l" defTabSz="914400" rtl="0" eaLnBrk="1" fontAlgn="auto" latinLnBrk="0" hangingPunct="1">
-              <a:lnSpc>
-                <a:spcPct val="100000"/>
-              </a:lnSpc>
-              <a:spcBef>
-                <a:spcPts val="0"/>
-              </a:spcBef>
-              <a:spcAft>
-                <a:spcPts val="0"/>
-              </a:spcAft>
-              <a:buClrTx/>
-              <a:buSzTx/>
-              <a:buFontTx/>
-              <a:buNone/>
-              <a:tabLst/>
+            <a:pPr>
               <a:defRPr/>
             </a:pPr>
             <a:fld id="{107A54EE-FF42-4B1D-9F90-032BC404731E}" type="datetimeFigureOut">
-              <a:rPr kumimoji="0" lang="en-US" sz="1800" b="0" i="0" u="none" strike="noStrike" kern="1200" cap="none" spc="0" normalizeH="0" baseline="0" noProof="0" smtClean="0">
-                <a:ln>
-                  <a:noFill/>
-                </a:ln>
+              <a:rPr lang="en-US" smtClean="0">
                 <a:solidFill>
                   <a:prstClr val="black"/>
                 </a:solidFill>
-                <a:effectLst/>
-                <a:uLnTx/>
-                <a:uFillTx/>
                 <a:latin typeface="Calibri" panose="020F0502020204030204"/>
-                <a:ea typeface="+mn-ea"/>
-                <a:cs typeface="+mn-cs"/>
               </a:rPr>
-              <a:pPr marL="0" marR="0" lvl="0" indent="0" algn="l" defTabSz="914400" rtl="0" eaLnBrk="1" fontAlgn="auto" latinLnBrk="0" hangingPunct="1">
-                <a:lnSpc>
-                  <a:spcPct val="100000"/>
-                </a:lnSpc>
-                <a:spcBef>
-                  <a:spcPts val="0"/>
-                </a:spcBef>
-                <a:spcAft>
-                  <a:spcPts val="0"/>
-                </a:spcAft>
-                <a:buClrTx/>
-                <a:buSzTx/>
-                <a:buFontTx/>
-                <a:buNone/>
-                <a:tabLst/>
+              <a:pPr>
                 <a:defRPr/>
               </a:pPr>
-              <a:t>11/30/2017</a:t>
+              <a:t>12/1/2017</a:t>
             </a:fld>
-            <a:endParaRPr kumimoji="0" lang="en-US" sz="1800" b="0" i="0" u="none" strike="noStrike" kern="1200" cap="none" spc="0" normalizeH="0" baseline="0" noProof="0">
-              <a:ln>
-                <a:noFill/>
-              </a:ln>
+            <a:endParaRPr lang="en-US">
               <a:solidFill>
                 <a:prstClr val="black"/>
               </a:solidFill>
-              <a:effectLst/>
-              <a:uLnTx/>
-              <a:uFillTx/>
               <a:latin typeface="Calibri" panose="020F0502020204030204"/>
-              <a:ea typeface="+mn-ea"/>
-              <a:cs typeface="+mn-cs"/>
             </a:endParaRPr>
           </a:p>
         </p:txBody>
@@ -3164,8 +2464,8 @@
         </p:nvSpPr>
         <p:spPr>
           <a:xfrm>
-            <a:off x="4038600" y="6356350"/>
-            <a:ext cx="4114800" cy="365125"/>
+            <a:off x="4038600" y="8475134"/>
+            <a:ext cx="4114800" cy="486833"/>
           </a:xfrm>
           <a:prstGeom prst="rect">
             <a:avLst/>
@@ -3175,36 +2475,14 @@
           <a:bodyPr/>
           <a:lstStyle/>
           <a:p>
-            <a:pPr marL="0" marR="0" lvl="0" indent="0" algn="l" defTabSz="914400" rtl="0" eaLnBrk="1" fontAlgn="auto" latinLnBrk="0" hangingPunct="1">
-              <a:lnSpc>
-                <a:spcPct val="100000"/>
-              </a:lnSpc>
-              <a:spcBef>
-                <a:spcPts val="0"/>
-              </a:spcBef>
-              <a:spcAft>
-                <a:spcPts val="0"/>
-              </a:spcAft>
-              <a:buClrTx/>
-              <a:buSzTx/>
-              <a:buFontTx/>
-              <a:buNone/>
-              <a:tabLst/>
+            <a:pPr>
               <a:defRPr/>
             </a:pPr>
-            <a:endParaRPr kumimoji="0" lang="en-US" sz="1800" b="0" i="0" u="none" strike="noStrike" kern="1200" cap="none" spc="0" normalizeH="0" baseline="0" noProof="0" dirty="0">
-              <a:ln>
-                <a:noFill/>
-              </a:ln>
+            <a:endParaRPr lang="en-US" dirty="0">
               <a:solidFill>
                 <a:prstClr val="black"/>
               </a:solidFill>
-              <a:effectLst/>
-              <a:uLnTx/>
-              <a:uFillTx/>
               <a:latin typeface="Calibri" panose="020F0502020204030204"/>
-              <a:ea typeface="+mn-ea"/>
-              <a:cs typeface="+mn-cs"/>
             </a:endParaRPr>
           </a:p>
         </p:txBody>
@@ -3221,8 +2499,8 @@
         </p:nvSpPr>
         <p:spPr>
           <a:xfrm>
-            <a:off x="8610600" y="6356350"/>
-            <a:ext cx="2743200" cy="365125"/>
+            <a:off x="8610600" y="8475134"/>
+            <a:ext cx="2743200" cy="486833"/>
           </a:xfrm>
           <a:prstGeom prst="rect">
             <a:avLst/>
@@ -3232,70 +2510,26 @@
           <a:bodyPr/>
           <a:lstStyle/>
           <a:p>
-            <a:pPr marL="0" marR="0" lvl="0" indent="0" algn="l" defTabSz="914400" rtl="0" eaLnBrk="1" fontAlgn="auto" latinLnBrk="0" hangingPunct="1">
-              <a:lnSpc>
-                <a:spcPct val="100000"/>
-              </a:lnSpc>
-              <a:spcBef>
-                <a:spcPts val="0"/>
-              </a:spcBef>
-              <a:spcAft>
-                <a:spcPts val="0"/>
-              </a:spcAft>
-              <a:buClrTx/>
-              <a:buSzTx/>
-              <a:buFontTx/>
-              <a:buNone/>
-              <a:tabLst/>
+            <a:pPr algn="l">
               <a:defRPr/>
             </a:pPr>
             <a:fld id="{52144C99-8741-4102-B794-D10AFFB4C19C}" type="slidenum">
-              <a:rPr kumimoji="0" lang="en-US" sz="1800" b="0" i="0" u="none" strike="noStrike" kern="1200" cap="none" spc="0" normalizeH="0" baseline="0" noProof="0" smtClean="0">
-                <a:ln>
-                  <a:noFill/>
-                </a:ln>
+              <a:rPr lang="en-US" sz="1800" smtClean="0">
                 <a:solidFill>
                   <a:prstClr val="black"/>
                 </a:solidFill>
-                <a:effectLst/>
-                <a:uLnTx/>
-                <a:uFillTx/>
                 <a:latin typeface="Calibri" panose="020F0502020204030204"/>
-                <a:ea typeface="+mn-ea"/>
-                <a:cs typeface="+mn-cs"/>
               </a:rPr>
-              <a:pPr marL="0" marR="0" lvl="0" indent="0" algn="l" defTabSz="914400" rtl="0" eaLnBrk="1" fontAlgn="auto" latinLnBrk="0" hangingPunct="1">
-                <a:lnSpc>
-                  <a:spcPct val="100000"/>
-                </a:lnSpc>
-                <a:spcBef>
-                  <a:spcPts val="0"/>
-                </a:spcBef>
-                <a:spcAft>
-                  <a:spcPts val="0"/>
-                </a:spcAft>
-                <a:buClrTx/>
-                <a:buSzTx/>
-                <a:buFontTx/>
-                <a:buNone/>
-                <a:tabLst/>
+              <a:pPr algn="l">
                 <a:defRPr/>
               </a:pPr>
               <a:t>‹#›</a:t>
             </a:fld>
-            <a:endParaRPr kumimoji="0" lang="en-US" sz="1800" b="0" i="0" u="none" strike="noStrike" kern="1200" cap="none" spc="0" normalizeH="0" baseline="0" noProof="0">
-              <a:ln>
-                <a:noFill/>
-              </a:ln>
+            <a:endParaRPr lang="en-US" sz="1800">
               <a:solidFill>
                 <a:prstClr val="black"/>
               </a:solidFill>
-              <a:effectLst/>
-              <a:uLnTx/>
-              <a:uFillTx/>
               <a:latin typeface="Calibri" panose="020F0502020204030204"/>
-              <a:ea typeface="+mn-ea"/>
-              <a:cs typeface="+mn-cs"/>
             </a:endParaRPr>
           </a:p>
         </p:txBody>
@@ -3310,8 +2544,8 @@
         </p:nvSpPr>
         <p:spPr>
           <a:xfrm>
-            <a:off x="5700737" y="6450483"/>
-            <a:ext cx="465834" cy="365125"/>
+            <a:off x="5700737" y="8600645"/>
+            <a:ext cx="465834" cy="486833"/>
           </a:xfrm>
           <a:prstGeom prst="rect">
             <a:avLst/>
@@ -3419,13 +2653,13 @@
               <a:defRPr/>
             </a:pPr>
             <a:fld id="{1CD50270-5DC5-482F-A4D7-C9F680EDD899}" type="slidenum">
-              <a:rPr lang="en-US" smtClean="0"/>
+              <a:rPr lang="en-US" sz="1600" smtClean="0"/>
               <a:pPr>
                 <a:defRPr/>
               </a:pPr>
               <a:t>‹#›</a:t>
             </a:fld>
-            <a:endParaRPr lang="en-US" dirty="0"/>
+            <a:endParaRPr lang="en-US" sz="1600" dirty="0"/>
           </a:p>
         </p:txBody>
       </p:sp>
@@ -3493,8 +2727,8 @@
         </p:nvSpPr>
         <p:spPr>
           <a:xfrm>
-            <a:off x="838200" y="6356350"/>
-            <a:ext cx="2743200" cy="365125"/>
+            <a:off x="838200" y="8475134"/>
+            <a:ext cx="2743200" cy="486833"/>
           </a:xfrm>
           <a:prstGeom prst="rect">
             <a:avLst/>
@@ -3504,70 +2738,26 @@
           <a:bodyPr/>
           <a:lstStyle/>
           <a:p>
-            <a:pPr marL="0" marR="0" lvl="0" indent="0" algn="l" defTabSz="914400" rtl="0" eaLnBrk="1" fontAlgn="auto" latinLnBrk="0" hangingPunct="1">
-              <a:lnSpc>
-                <a:spcPct val="100000"/>
-              </a:lnSpc>
-              <a:spcBef>
-                <a:spcPts val="0"/>
-              </a:spcBef>
-              <a:spcAft>
-                <a:spcPts val="0"/>
-              </a:spcAft>
-              <a:buClrTx/>
-              <a:buSzTx/>
-              <a:buFontTx/>
-              <a:buNone/>
-              <a:tabLst/>
+            <a:pPr>
               <a:defRPr/>
             </a:pPr>
             <a:fld id="{107A54EE-FF42-4B1D-9F90-032BC404731E}" type="datetimeFigureOut">
-              <a:rPr kumimoji="0" lang="en-US" sz="1800" b="0" i="0" u="none" strike="noStrike" kern="1200" cap="none" spc="0" normalizeH="0" baseline="0" noProof="0" smtClean="0">
-                <a:ln>
-                  <a:noFill/>
-                </a:ln>
+              <a:rPr lang="en-US" smtClean="0">
                 <a:solidFill>
                   <a:prstClr val="black"/>
                 </a:solidFill>
-                <a:effectLst/>
-                <a:uLnTx/>
-                <a:uFillTx/>
                 <a:latin typeface="Calibri" panose="020F0502020204030204"/>
-                <a:ea typeface="+mn-ea"/>
-                <a:cs typeface="+mn-cs"/>
               </a:rPr>
-              <a:pPr marL="0" marR="0" lvl="0" indent="0" algn="l" defTabSz="914400" rtl="0" eaLnBrk="1" fontAlgn="auto" latinLnBrk="0" hangingPunct="1">
-                <a:lnSpc>
-                  <a:spcPct val="100000"/>
-                </a:lnSpc>
-                <a:spcBef>
-                  <a:spcPts val="0"/>
-                </a:spcBef>
-                <a:spcAft>
-                  <a:spcPts val="0"/>
-                </a:spcAft>
-                <a:buClrTx/>
-                <a:buSzTx/>
-                <a:buFontTx/>
-                <a:buNone/>
-                <a:tabLst/>
+              <a:pPr>
                 <a:defRPr/>
               </a:pPr>
-              <a:t>11/30/2017</a:t>
+              <a:t>12/1/2017</a:t>
             </a:fld>
-            <a:endParaRPr kumimoji="0" lang="en-US" sz="1800" b="0" i="0" u="none" strike="noStrike" kern="1200" cap="none" spc="0" normalizeH="0" baseline="0" noProof="0">
-              <a:ln>
-                <a:noFill/>
-              </a:ln>
+            <a:endParaRPr lang="en-US">
               <a:solidFill>
                 <a:prstClr val="black"/>
               </a:solidFill>
-              <a:effectLst/>
-              <a:uLnTx/>
-              <a:uFillTx/>
               <a:latin typeface="Calibri" panose="020F0502020204030204"/>
-              <a:ea typeface="+mn-ea"/>
-              <a:cs typeface="+mn-cs"/>
             </a:endParaRPr>
           </a:p>
         </p:txBody>
@@ -3584,8 +2774,8 @@
         </p:nvSpPr>
         <p:spPr>
           <a:xfrm>
-            <a:off x="4038600" y="6356350"/>
-            <a:ext cx="4114800" cy="365125"/>
+            <a:off x="4038600" y="8475134"/>
+            <a:ext cx="4114800" cy="486833"/>
           </a:xfrm>
           <a:prstGeom prst="rect">
             <a:avLst/>
@@ -3595,36 +2785,14 @@
           <a:bodyPr/>
           <a:lstStyle/>
           <a:p>
-            <a:pPr marL="0" marR="0" lvl="0" indent="0" algn="l" defTabSz="914400" rtl="0" eaLnBrk="1" fontAlgn="auto" latinLnBrk="0" hangingPunct="1">
-              <a:lnSpc>
-                <a:spcPct val="100000"/>
-              </a:lnSpc>
-              <a:spcBef>
-                <a:spcPts val="0"/>
-              </a:spcBef>
-              <a:spcAft>
-                <a:spcPts val="0"/>
-              </a:spcAft>
-              <a:buClrTx/>
-              <a:buSzTx/>
-              <a:buFontTx/>
-              <a:buNone/>
-              <a:tabLst/>
+            <a:pPr>
               <a:defRPr/>
             </a:pPr>
-            <a:endParaRPr kumimoji="0" lang="en-US" sz="1800" b="0" i="0" u="none" strike="noStrike" kern="1200" cap="none" spc="0" normalizeH="0" baseline="0" noProof="0">
-              <a:ln>
-                <a:noFill/>
-              </a:ln>
+            <a:endParaRPr lang="en-US">
               <a:solidFill>
                 <a:prstClr val="black"/>
               </a:solidFill>
-              <a:effectLst/>
-              <a:uLnTx/>
-              <a:uFillTx/>
               <a:latin typeface="Calibri" panose="020F0502020204030204"/>
-              <a:ea typeface="+mn-ea"/>
-              <a:cs typeface="+mn-cs"/>
             </a:endParaRPr>
           </a:p>
         </p:txBody>
@@ -3641,8 +2809,8 @@
         </p:nvSpPr>
         <p:spPr>
           <a:xfrm>
-            <a:off x="8610600" y="6356350"/>
-            <a:ext cx="2743200" cy="365125"/>
+            <a:off x="8610600" y="8475134"/>
+            <a:ext cx="2743200" cy="486833"/>
           </a:xfrm>
           <a:prstGeom prst="rect">
             <a:avLst/>
@@ -3652,70 +2820,26 @@
           <a:bodyPr/>
           <a:lstStyle/>
           <a:p>
-            <a:pPr marL="0" marR="0" lvl="0" indent="0" algn="l" defTabSz="914400" rtl="0" eaLnBrk="1" fontAlgn="auto" latinLnBrk="0" hangingPunct="1">
-              <a:lnSpc>
-                <a:spcPct val="100000"/>
-              </a:lnSpc>
-              <a:spcBef>
-                <a:spcPts val="0"/>
-              </a:spcBef>
-              <a:spcAft>
-                <a:spcPts val="0"/>
-              </a:spcAft>
-              <a:buClrTx/>
-              <a:buSzTx/>
-              <a:buFontTx/>
-              <a:buNone/>
-              <a:tabLst/>
+            <a:pPr algn="l">
               <a:defRPr/>
             </a:pPr>
             <a:fld id="{52144C99-8741-4102-B794-D10AFFB4C19C}" type="slidenum">
-              <a:rPr kumimoji="0" lang="en-US" sz="1800" b="0" i="0" u="none" strike="noStrike" kern="1200" cap="none" spc="0" normalizeH="0" baseline="0" noProof="0" smtClean="0">
-                <a:ln>
-                  <a:noFill/>
-                </a:ln>
+              <a:rPr lang="en-US" sz="1800" smtClean="0">
                 <a:solidFill>
                   <a:prstClr val="black"/>
                 </a:solidFill>
-                <a:effectLst/>
-                <a:uLnTx/>
-                <a:uFillTx/>
                 <a:latin typeface="Calibri" panose="020F0502020204030204"/>
-                <a:ea typeface="+mn-ea"/>
-                <a:cs typeface="+mn-cs"/>
               </a:rPr>
-              <a:pPr marL="0" marR="0" lvl="0" indent="0" algn="l" defTabSz="914400" rtl="0" eaLnBrk="1" fontAlgn="auto" latinLnBrk="0" hangingPunct="1">
-                <a:lnSpc>
-                  <a:spcPct val="100000"/>
-                </a:lnSpc>
-                <a:spcBef>
-                  <a:spcPts val="0"/>
-                </a:spcBef>
-                <a:spcAft>
-                  <a:spcPts val="0"/>
-                </a:spcAft>
-                <a:buClrTx/>
-                <a:buSzTx/>
-                <a:buFontTx/>
-                <a:buNone/>
-                <a:tabLst/>
+              <a:pPr algn="l">
                 <a:defRPr/>
               </a:pPr>
               <a:t>‹#›</a:t>
             </a:fld>
-            <a:endParaRPr kumimoji="0" lang="en-US" sz="1800" b="0" i="0" u="none" strike="noStrike" kern="1200" cap="none" spc="0" normalizeH="0" baseline="0" noProof="0">
-              <a:ln>
-                <a:noFill/>
-              </a:ln>
+            <a:endParaRPr lang="en-US" sz="1800">
               <a:solidFill>
                 <a:prstClr val="black"/>
               </a:solidFill>
-              <a:effectLst/>
-              <a:uLnTx/>
-              <a:uFillTx/>
               <a:latin typeface="Calibri" panose="020F0502020204030204"/>
-              <a:ea typeface="+mn-ea"/>
-              <a:cs typeface="+mn-cs"/>
             </a:endParaRPr>
           </a:p>
         </p:txBody>
@@ -3730,8 +2854,8 @@
         </p:nvSpPr>
         <p:spPr>
           <a:xfrm>
-            <a:off x="5700737" y="6450483"/>
-            <a:ext cx="465834" cy="365125"/>
+            <a:off x="5700737" y="8600645"/>
+            <a:ext cx="465834" cy="486833"/>
           </a:xfrm>
           <a:prstGeom prst="rect">
             <a:avLst/>
@@ -3839,13 +2963,13 @@
               <a:defRPr/>
             </a:pPr>
             <a:fld id="{1CD50270-5DC5-482F-A4D7-C9F680EDD899}" type="slidenum">
-              <a:rPr lang="en-US" smtClean="0"/>
+              <a:rPr lang="en-US" sz="1600" smtClean="0"/>
               <a:pPr>
                 <a:defRPr/>
               </a:pPr>
               <a:t>‹#›</a:t>
             </a:fld>
-            <a:endParaRPr lang="en-US" dirty="0"/>
+            <a:endParaRPr lang="en-US" sz="1600" dirty="0"/>
           </a:p>
         </p:txBody>
       </p:sp>
@@ -3891,8 +3015,8 @@
         </p:nvSpPr>
         <p:spPr>
           <a:xfrm>
-            <a:off x="838200" y="6356350"/>
-            <a:ext cx="2743200" cy="365125"/>
+            <a:off x="838200" y="8475134"/>
+            <a:ext cx="2743200" cy="486833"/>
           </a:xfrm>
           <a:prstGeom prst="rect">
             <a:avLst/>
@@ -3902,70 +3026,26 @@
           <a:bodyPr/>
           <a:lstStyle/>
           <a:p>
-            <a:pPr marL="0" marR="0" lvl="0" indent="0" algn="l" defTabSz="914400" rtl="0" eaLnBrk="1" fontAlgn="auto" latinLnBrk="0" hangingPunct="1">
-              <a:lnSpc>
-                <a:spcPct val="100000"/>
-              </a:lnSpc>
-              <a:spcBef>
-                <a:spcPts val="0"/>
-              </a:spcBef>
-              <a:spcAft>
-                <a:spcPts val="0"/>
-              </a:spcAft>
-              <a:buClrTx/>
-              <a:buSzTx/>
-              <a:buFontTx/>
-              <a:buNone/>
-              <a:tabLst/>
+            <a:pPr>
               <a:defRPr/>
             </a:pPr>
             <a:fld id="{107A54EE-FF42-4B1D-9F90-032BC404731E}" type="datetimeFigureOut">
-              <a:rPr kumimoji="0" lang="en-US" sz="1800" b="0" i="0" u="none" strike="noStrike" kern="1200" cap="none" spc="0" normalizeH="0" baseline="0" noProof="0" smtClean="0">
-                <a:ln>
-                  <a:noFill/>
-                </a:ln>
+              <a:rPr lang="en-US" smtClean="0">
                 <a:solidFill>
                   <a:prstClr val="black"/>
                 </a:solidFill>
-                <a:effectLst/>
-                <a:uLnTx/>
-                <a:uFillTx/>
                 <a:latin typeface="Calibri" panose="020F0502020204030204"/>
-                <a:ea typeface="+mn-ea"/>
-                <a:cs typeface="+mn-cs"/>
               </a:rPr>
-              <a:pPr marL="0" marR="0" lvl="0" indent="0" algn="l" defTabSz="914400" rtl="0" eaLnBrk="1" fontAlgn="auto" latinLnBrk="0" hangingPunct="1">
-                <a:lnSpc>
-                  <a:spcPct val="100000"/>
-                </a:lnSpc>
-                <a:spcBef>
-                  <a:spcPts val="0"/>
-                </a:spcBef>
-                <a:spcAft>
-                  <a:spcPts val="0"/>
-                </a:spcAft>
-                <a:buClrTx/>
-                <a:buSzTx/>
-                <a:buFontTx/>
-                <a:buNone/>
-                <a:tabLst/>
+              <a:pPr>
                 <a:defRPr/>
               </a:pPr>
-              <a:t>11/30/2017</a:t>
+              <a:t>12/1/2017</a:t>
             </a:fld>
-            <a:endParaRPr kumimoji="0" lang="en-US" sz="1800" b="0" i="0" u="none" strike="noStrike" kern="1200" cap="none" spc="0" normalizeH="0" baseline="0" noProof="0">
-              <a:ln>
-                <a:noFill/>
-              </a:ln>
+            <a:endParaRPr lang="en-US">
               <a:solidFill>
                 <a:prstClr val="black"/>
               </a:solidFill>
-              <a:effectLst/>
-              <a:uLnTx/>
-              <a:uFillTx/>
               <a:latin typeface="Calibri" panose="020F0502020204030204"/>
-              <a:ea typeface="+mn-ea"/>
-              <a:cs typeface="+mn-cs"/>
             </a:endParaRPr>
           </a:p>
         </p:txBody>
@@ -3982,8 +3062,8 @@
         </p:nvSpPr>
         <p:spPr>
           <a:xfrm>
-            <a:off x="4038600" y="6356350"/>
-            <a:ext cx="4114800" cy="365125"/>
+            <a:off x="4038600" y="8475134"/>
+            <a:ext cx="4114800" cy="486833"/>
           </a:xfrm>
           <a:prstGeom prst="rect">
             <a:avLst/>
@@ -3993,36 +3073,14 @@
           <a:bodyPr/>
           <a:lstStyle/>
           <a:p>
-            <a:pPr marL="0" marR="0" lvl="0" indent="0" algn="l" defTabSz="914400" rtl="0" eaLnBrk="1" fontAlgn="auto" latinLnBrk="0" hangingPunct="1">
-              <a:lnSpc>
-                <a:spcPct val="100000"/>
-              </a:lnSpc>
-              <a:spcBef>
-                <a:spcPts val="0"/>
-              </a:spcBef>
-              <a:spcAft>
-                <a:spcPts val="0"/>
-              </a:spcAft>
-              <a:buClrTx/>
-              <a:buSzTx/>
-              <a:buFontTx/>
-              <a:buNone/>
-              <a:tabLst/>
+            <a:pPr>
               <a:defRPr/>
             </a:pPr>
-            <a:endParaRPr kumimoji="0" lang="en-US" sz="1800" b="0" i="0" u="none" strike="noStrike" kern="1200" cap="none" spc="0" normalizeH="0" baseline="0" noProof="0">
-              <a:ln>
-                <a:noFill/>
-              </a:ln>
+            <a:endParaRPr lang="en-US">
               <a:solidFill>
                 <a:prstClr val="black"/>
               </a:solidFill>
-              <a:effectLst/>
-              <a:uLnTx/>
-              <a:uFillTx/>
               <a:latin typeface="Calibri" panose="020F0502020204030204"/>
-              <a:ea typeface="+mn-ea"/>
-              <a:cs typeface="+mn-cs"/>
             </a:endParaRPr>
           </a:p>
         </p:txBody>
@@ -4039,8 +3097,8 @@
         </p:nvSpPr>
         <p:spPr>
           <a:xfrm>
-            <a:off x="8610600" y="6356350"/>
-            <a:ext cx="2743200" cy="365125"/>
+            <a:off x="8610600" y="8475134"/>
+            <a:ext cx="2743200" cy="486833"/>
           </a:xfrm>
           <a:prstGeom prst="rect">
             <a:avLst/>
@@ -4050,70 +3108,26 @@
           <a:bodyPr/>
           <a:lstStyle/>
           <a:p>
-            <a:pPr marL="0" marR="0" lvl="0" indent="0" algn="l" defTabSz="914400" rtl="0" eaLnBrk="1" fontAlgn="auto" latinLnBrk="0" hangingPunct="1">
-              <a:lnSpc>
-                <a:spcPct val="100000"/>
-              </a:lnSpc>
-              <a:spcBef>
-                <a:spcPts val="0"/>
-              </a:spcBef>
-              <a:spcAft>
-                <a:spcPts val="0"/>
-              </a:spcAft>
-              <a:buClrTx/>
-              <a:buSzTx/>
-              <a:buFontTx/>
-              <a:buNone/>
-              <a:tabLst/>
+            <a:pPr algn="l">
               <a:defRPr/>
             </a:pPr>
             <a:fld id="{52144C99-8741-4102-B794-D10AFFB4C19C}" type="slidenum">
-              <a:rPr kumimoji="0" lang="en-US" sz="1800" b="0" i="0" u="none" strike="noStrike" kern="1200" cap="none" spc="0" normalizeH="0" baseline="0" noProof="0" smtClean="0">
-                <a:ln>
-                  <a:noFill/>
-                </a:ln>
+              <a:rPr lang="en-US" sz="1800" smtClean="0">
                 <a:solidFill>
                   <a:prstClr val="black"/>
                 </a:solidFill>
-                <a:effectLst/>
-                <a:uLnTx/>
-                <a:uFillTx/>
                 <a:latin typeface="Calibri" panose="020F0502020204030204"/>
-                <a:ea typeface="+mn-ea"/>
-                <a:cs typeface="+mn-cs"/>
               </a:rPr>
-              <a:pPr marL="0" marR="0" lvl="0" indent="0" algn="l" defTabSz="914400" rtl="0" eaLnBrk="1" fontAlgn="auto" latinLnBrk="0" hangingPunct="1">
-                <a:lnSpc>
-                  <a:spcPct val="100000"/>
-                </a:lnSpc>
-                <a:spcBef>
-                  <a:spcPts val="0"/>
-                </a:spcBef>
-                <a:spcAft>
-                  <a:spcPts val="0"/>
-                </a:spcAft>
-                <a:buClrTx/>
-                <a:buSzTx/>
-                <a:buFontTx/>
-                <a:buNone/>
-                <a:tabLst/>
+              <a:pPr algn="l">
                 <a:defRPr/>
               </a:pPr>
               <a:t>‹#›</a:t>
             </a:fld>
-            <a:endParaRPr kumimoji="0" lang="en-US" sz="1800" b="0" i="0" u="none" strike="noStrike" kern="1200" cap="none" spc="0" normalizeH="0" baseline="0" noProof="0">
-              <a:ln>
-                <a:noFill/>
-              </a:ln>
+            <a:endParaRPr lang="en-US" sz="1800">
               <a:solidFill>
                 <a:prstClr val="black"/>
               </a:solidFill>
-              <a:effectLst/>
-              <a:uLnTx/>
-              <a:uFillTx/>
               <a:latin typeface="Calibri" panose="020F0502020204030204"/>
-              <a:ea typeface="+mn-ea"/>
-              <a:cs typeface="+mn-cs"/>
             </a:endParaRPr>
           </a:p>
         </p:txBody>
@@ -4128,8 +3142,8 @@
         </p:nvSpPr>
         <p:spPr>
           <a:xfrm>
-            <a:off x="5700737" y="6450483"/>
-            <a:ext cx="465834" cy="365125"/>
+            <a:off x="5700737" y="8600645"/>
+            <a:ext cx="465834" cy="486833"/>
           </a:xfrm>
           <a:prstGeom prst="rect">
             <a:avLst/>
@@ -4237,13 +3251,13 @@
               <a:defRPr/>
             </a:pPr>
             <a:fld id="{1CD50270-5DC5-482F-A4D7-C9F680EDD899}" type="slidenum">
-              <a:rPr lang="en-US" smtClean="0"/>
+              <a:rPr lang="en-US" sz="1600" smtClean="0"/>
               <a:pPr>
                 <a:defRPr/>
               </a:pPr>
               <a:t>‹#›</a:t>
             </a:fld>
-            <a:endParaRPr lang="en-US" dirty="0"/>
+            <a:endParaRPr lang="en-US" sz="1600" dirty="0"/>
           </a:p>
         </p:txBody>
       </p:sp>
@@ -4289,8 +3303,8 @@
         </p:nvSpPr>
         <p:spPr>
           <a:xfrm>
-            <a:off x="839788" y="457200"/>
-            <a:ext cx="3932237" cy="1600200"/>
+            <a:off x="839789" y="609600"/>
+            <a:ext cx="3932237" cy="2133600"/>
           </a:xfrm>
         </p:spPr>
         <p:txBody>
@@ -4320,8 +3334,8 @@
         </p:nvSpPr>
         <p:spPr>
           <a:xfrm>
-            <a:off x="5183188" y="987425"/>
-            <a:ext cx="6172200" cy="4873625"/>
+            <a:off x="5183188" y="1316567"/>
+            <a:ext cx="6172200" cy="6498167"/>
           </a:xfrm>
         </p:spPr>
         <p:txBody>
@@ -4404,8 +3418,8 @@
         </p:nvSpPr>
         <p:spPr>
           <a:xfrm>
-            <a:off x="839788" y="2057400"/>
-            <a:ext cx="3932237" cy="3811588"/>
+            <a:off x="839789" y="2743200"/>
+            <a:ext cx="3932237" cy="5082117"/>
           </a:xfrm>
         </p:spPr>
         <p:txBody>
@@ -4469,8 +3483,8 @@
         </p:nvSpPr>
         <p:spPr>
           <a:xfrm>
-            <a:off x="838200" y="6356350"/>
-            <a:ext cx="2743200" cy="365125"/>
+            <a:off x="838200" y="8475134"/>
+            <a:ext cx="2743200" cy="486833"/>
           </a:xfrm>
           <a:prstGeom prst="rect">
             <a:avLst/>
@@ -4480,70 +3494,26 @@
           <a:bodyPr/>
           <a:lstStyle/>
           <a:p>
-            <a:pPr marL="0" marR="0" lvl="0" indent="0" algn="l" defTabSz="914400" rtl="0" eaLnBrk="1" fontAlgn="auto" latinLnBrk="0" hangingPunct="1">
-              <a:lnSpc>
-                <a:spcPct val="100000"/>
-              </a:lnSpc>
-              <a:spcBef>
-                <a:spcPts val="0"/>
-              </a:spcBef>
-              <a:spcAft>
-                <a:spcPts val="0"/>
-              </a:spcAft>
-              <a:buClrTx/>
-              <a:buSzTx/>
-              <a:buFontTx/>
-              <a:buNone/>
-              <a:tabLst/>
+            <a:pPr>
               <a:defRPr/>
             </a:pPr>
             <a:fld id="{107A54EE-FF42-4B1D-9F90-032BC404731E}" type="datetimeFigureOut">
-              <a:rPr kumimoji="0" lang="en-US" sz="1800" b="0" i="0" u="none" strike="noStrike" kern="1200" cap="none" spc="0" normalizeH="0" baseline="0" noProof="0" smtClean="0">
-                <a:ln>
-                  <a:noFill/>
-                </a:ln>
+              <a:rPr lang="en-US" smtClean="0">
                 <a:solidFill>
                   <a:prstClr val="black"/>
                 </a:solidFill>
-                <a:effectLst/>
-                <a:uLnTx/>
-                <a:uFillTx/>
                 <a:latin typeface="Calibri" panose="020F0502020204030204"/>
-                <a:ea typeface="+mn-ea"/>
-                <a:cs typeface="+mn-cs"/>
               </a:rPr>
-              <a:pPr marL="0" marR="0" lvl="0" indent="0" algn="l" defTabSz="914400" rtl="0" eaLnBrk="1" fontAlgn="auto" latinLnBrk="0" hangingPunct="1">
-                <a:lnSpc>
-                  <a:spcPct val="100000"/>
-                </a:lnSpc>
-                <a:spcBef>
-                  <a:spcPts val="0"/>
-                </a:spcBef>
-                <a:spcAft>
-                  <a:spcPts val="0"/>
-                </a:spcAft>
-                <a:buClrTx/>
-                <a:buSzTx/>
-                <a:buFontTx/>
-                <a:buNone/>
-                <a:tabLst/>
+              <a:pPr>
                 <a:defRPr/>
               </a:pPr>
-              <a:t>11/30/2017</a:t>
+              <a:t>12/1/2017</a:t>
             </a:fld>
-            <a:endParaRPr kumimoji="0" lang="en-US" sz="1800" b="0" i="0" u="none" strike="noStrike" kern="1200" cap="none" spc="0" normalizeH="0" baseline="0" noProof="0">
-              <a:ln>
-                <a:noFill/>
-              </a:ln>
+            <a:endParaRPr lang="en-US">
               <a:solidFill>
                 <a:prstClr val="black"/>
               </a:solidFill>
-              <a:effectLst/>
-              <a:uLnTx/>
-              <a:uFillTx/>
               <a:latin typeface="Calibri" panose="020F0502020204030204"/>
-              <a:ea typeface="+mn-ea"/>
-              <a:cs typeface="+mn-cs"/>
             </a:endParaRPr>
           </a:p>
         </p:txBody>
@@ -4560,8 +3530,8 @@
         </p:nvSpPr>
         <p:spPr>
           <a:xfrm>
-            <a:off x="4038600" y="6356350"/>
-            <a:ext cx="4114800" cy="365125"/>
+            <a:off x="4038600" y="8475134"/>
+            <a:ext cx="4114800" cy="486833"/>
           </a:xfrm>
           <a:prstGeom prst="rect">
             <a:avLst/>
@@ -4571,36 +3541,14 @@
           <a:bodyPr/>
           <a:lstStyle/>
           <a:p>
-            <a:pPr marL="0" marR="0" lvl="0" indent="0" algn="l" defTabSz="914400" rtl="0" eaLnBrk="1" fontAlgn="auto" latinLnBrk="0" hangingPunct="1">
-              <a:lnSpc>
-                <a:spcPct val="100000"/>
-              </a:lnSpc>
-              <a:spcBef>
-                <a:spcPts val="0"/>
-              </a:spcBef>
-              <a:spcAft>
-                <a:spcPts val="0"/>
-              </a:spcAft>
-              <a:buClrTx/>
-              <a:buSzTx/>
-              <a:buFontTx/>
-              <a:buNone/>
-              <a:tabLst/>
+            <a:pPr>
               <a:defRPr/>
             </a:pPr>
-            <a:endParaRPr kumimoji="0" lang="en-US" sz="1800" b="0" i="0" u="none" strike="noStrike" kern="1200" cap="none" spc="0" normalizeH="0" baseline="0" noProof="0">
-              <a:ln>
-                <a:noFill/>
-              </a:ln>
+            <a:endParaRPr lang="en-US">
               <a:solidFill>
                 <a:prstClr val="black"/>
               </a:solidFill>
-              <a:effectLst/>
-              <a:uLnTx/>
-              <a:uFillTx/>
               <a:latin typeface="Calibri" panose="020F0502020204030204"/>
-              <a:ea typeface="+mn-ea"/>
-              <a:cs typeface="+mn-cs"/>
             </a:endParaRPr>
           </a:p>
         </p:txBody>
@@ -4617,8 +3565,8 @@
         </p:nvSpPr>
         <p:spPr>
           <a:xfrm>
-            <a:off x="8610600" y="6356350"/>
-            <a:ext cx="2743200" cy="365125"/>
+            <a:off x="8610600" y="8475134"/>
+            <a:ext cx="2743200" cy="486833"/>
           </a:xfrm>
           <a:prstGeom prst="rect">
             <a:avLst/>
@@ -4628,70 +3576,26 @@
           <a:bodyPr/>
           <a:lstStyle/>
           <a:p>
-            <a:pPr marL="0" marR="0" lvl="0" indent="0" algn="l" defTabSz="914400" rtl="0" eaLnBrk="1" fontAlgn="auto" latinLnBrk="0" hangingPunct="1">
-              <a:lnSpc>
-                <a:spcPct val="100000"/>
-              </a:lnSpc>
-              <a:spcBef>
-                <a:spcPts val="0"/>
-              </a:spcBef>
-              <a:spcAft>
-                <a:spcPts val="0"/>
-              </a:spcAft>
-              <a:buClrTx/>
-              <a:buSzTx/>
-              <a:buFontTx/>
-              <a:buNone/>
-              <a:tabLst/>
+            <a:pPr algn="l">
               <a:defRPr/>
             </a:pPr>
             <a:fld id="{52144C99-8741-4102-B794-D10AFFB4C19C}" type="slidenum">
-              <a:rPr kumimoji="0" lang="en-US" sz="1800" b="0" i="0" u="none" strike="noStrike" kern="1200" cap="none" spc="0" normalizeH="0" baseline="0" noProof="0" smtClean="0">
-                <a:ln>
-                  <a:noFill/>
-                </a:ln>
+              <a:rPr lang="en-US" sz="1800" smtClean="0">
                 <a:solidFill>
                   <a:prstClr val="black"/>
                 </a:solidFill>
-                <a:effectLst/>
-                <a:uLnTx/>
-                <a:uFillTx/>
                 <a:latin typeface="Calibri" panose="020F0502020204030204"/>
-                <a:ea typeface="+mn-ea"/>
-                <a:cs typeface="+mn-cs"/>
               </a:rPr>
-              <a:pPr marL="0" marR="0" lvl="0" indent="0" algn="l" defTabSz="914400" rtl="0" eaLnBrk="1" fontAlgn="auto" latinLnBrk="0" hangingPunct="1">
-                <a:lnSpc>
-                  <a:spcPct val="100000"/>
-                </a:lnSpc>
-                <a:spcBef>
-                  <a:spcPts val="0"/>
-                </a:spcBef>
-                <a:spcAft>
-                  <a:spcPts val="0"/>
-                </a:spcAft>
-                <a:buClrTx/>
-                <a:buSzTx/>
-                <a:buFontTx/>
-                <a:buNone/>
-                <a:tabLst/>
+              <a:pPr algn="l">
                 <a:defRPr/>
               </a:pPr>
               <a:t>‹#›</a:t>
             </a:fld>
-            <a:endParaRPr kumimoji="0" lang="en-US" sz="1800" b="0" i="0" u="none" strike="noStrike" kern="1200" cap="none" spc="0" normalizeH="0" baseline="0" noProof="0">
-              <a:ln>
-                <a:noFill/>
-              </a:ln>
+            <a:endParaRPr lang="en-US" sz="1800">
               <a:solidFill>
                 <a:prstClr val="black"/>
               </a:solidFill>
-              <a:effectLst/>
-              <a:uLnTx/>
-              <a:uFillTx/>
               <a:latin typeface="Calibri" panose="020F0502020204030204"/>
-              <a:ea typeface="+mn-ea"/>
-              <a:cs typeface="+mn-cs"/>
             </a:endParaRPr>
           </a:p>
         </p:txBody>
@@ -4738,8 +3642,8 @@
         </p:nvSpPr>
         <p:spPr>
           <a:xfrm>
-            <a:off x="839788" y="457200"/>
-            <a:ext cx="3932237" cy="1600200"/>
+            <a:off x="839789" y="609600"/>
+            <a:ext cx="3932237" cy="2133600"/>
           </a:xfrm>
         </p:spPr>
         <p:txBody>
@@ -4769,8 +3673,8 @@
         </p:nvSpPr>
         <p:spPr>
           <a:xfrm>
-            <a:off x="5183188" y="987425"/>
-            <a:ext cx="6172200" cy="4873625"/>
+            <a:off x="5183188" y="1316567"/>
+            <a:ext cx="6172200" cy="6498167"/>
           </a:xfrm>
         </p:spPr>
         <p:txBody>
@@ -4833,8 +3737,8 @@
         </p:nvSpPr>
         <p:spPr>
           <a:xfrm>
-            <a:off x="839788" y="2057400"/>
-            <a:ext cx="3932237" cy="3811588"/>
+            <a:off x="839789" y="2743200"/>
+            <a:ext cx="3932237" cy="5082117"/>
           </a:xfrm>
         </p:spPr>
         <p:txBody>
@@ -4898,8 +3802,8 @@
         </p:nvSpPr>
         <p:spPr>
           <a:xfrm>
-            <a:off x="838200" y="6356350"/>
-            <a:ext cx="2743200" cy="365125"/>
+            <a:off x="838200" y="8475134"/>
+            <a:ext cx="2743200" cy="486833"/>
           </a:xfrm>
           <a:prstGeom prst="rect">
             <a:avLst/>
@@ -4909,70 +3813,26 @@
           <a:bodyPr/>
           <a:lstStyle/>
           <a:p>
-            <a:pPr marL="0" marR="0" lvl="0" indent="0" algn="l" defTabSz="914400" rtl="0" eaLnBrk="1" fontAlgn="auto" latinLnBrk="0" hangingPunct="1">
-              <a:lnSpc>
-                <a:spcPct val="100000"/>
-              </a:lnSpc>
-              <a:spcBef>
-                <a:spcPts val="0"/>
-              </a:spcBef>
-              <a:spcAft>
-                <a:spcPts val="0"/>
-              </a:spcAft>
-              <a:buClrTx/>
-              <a:buSzTx/>
-              <a:buFontTx/>
-              <a:buNone/>
-              <a:tabLst/>
+            <a:pPr>
               <a:defRPr/>
             </a:pPr>
             <a:fld id="{107A54EE-FF42-4B1D-9F90-032BC404731E}" type="datetimeFigureOut">
-              <a:rPr kumimoji="0" lang="en-US" sz="1800" b="0" i="0" u="none" strike="noStrike" kern="1200" cap="none" spc="0" normalizeH="0" baseline="0" noProof="0" smtClean="0">
-                <a:ln>
-                  <a:noFill/>
-                </a:ln>
+              <a:rPr lang="en-US" smtClean="0">
                 <a:solidFill>
                   <a:prstClr val="black"/>
                 </a:solidFill>
-                <a:effectLst/>
-                <a:uLnTx/>
-                <a:uFillTx/>
                 <a:latin typeface="Calibri" panose="020F0502020204030204"/>
-                <a:ea typeface="+mn-ea"/>
-                <a:cs typeface="+mn-cs"/>
               </a:rPr>
-              <a:pPr marL="0" marR="0" lvl="0" indent="0" algn="l" defTabSz="914400" rtl="0" eaLnBrk="1" fontAlgn="auto" latinLnBrk="0" hangingPunct="1">
-                <a:lnSpc>
-                  <a:spcPct val="100000"/>
-                </a:lnSpc>
-                <a:spcBef>
-                  <a:spcPts val="0"/>
-                </a:spcBef>
-                <a:spcAft>
-                  <a:spcPts val="0"/>
-                </a:spcAft>
-                <a:buClrTx/>
-                <a:buSzTx/>
-                <a:buFontTx/>
-                <a:buNone/>
-                <a:tabLst/>
+              <a:pPr>
                 <a:defRPr/>
               </a:pPr>
-              <a:t>11/30/2017</a:t>
+              <a:t>12/1/2017</a:t>
             </a:fld>
-            <a:endParaRPr kumimoji="0" lang="en-US" sz="1800" b="0" i="0" u="none" strike="noStrike" kern="1200" cap="none" spc="0" normalizeH="0" baseline="0" noProof="0">
-              <a:ln>
-                <a:noFill/>
-              </a:ln>
+            <a:endParaRPr lang="en-US">
               <a:solidFill>
                 <a:prstClr val="black"/>
               </a:solidFill>
-              <a:effectLst/>
-              <a:uLnTx/>
-              <a:uFillTx/>
               <a:latin typeface="Calibri" panose="020F0502020204030204"/>
-              <a:ea typeface="+mn-ea"/>
-              <a:cs typeface="+mn-cs"/>
             </a:endParaRPr>
           </a:p>
         </p:txBody>
@@ -4989,8 +3849,8 @@
         </p:nvSpPr>
         <p:spPr>
           <a:xfrm>
-            <a:off x="4038600" y="6356350"/>
-            <a:ext cx="4114800" cy="365125"/>
+            <a:off x="4038600" y="8475134"/>
+            <a:ext cx="4114800" cy="486833"/>
           </a:xfrm>
           <a:prstGeom prst="rect">
             <a:avLst/>
@@ -5000,36 +3860,14 @@
           <a:bodyPr/>
           <a:lstStyle/>
           <a:p>
-            <a:pPr marL="0" marR="0" lvl="0" indent="0" algn="l" defTabSz="914400" rtl="0" eaLnBrk="1" fontAlgn="auto" latinLnBrk="0" hangingPunct="1">
-              <a:lnSpc>
-                <a:spcPct val="100000"/>
-              </a:lnSpc>
-              <a:spcBef>
-                <a:spcPts val="0"/>
-              </a:spcBef>
-              <a:spcAft>
-                <a:spcPts val="0"/>
-              </a:spcAft>
-              <a:buClrTx/>
-              <a:buSzTx/>
-              <a:buFontTx/>
-              <a:buNone/>
-              <a:tabLst/>
+            <a:pPr>
               <a:defRPr/>
             </a:pPr>
-            <a:endParaRPr kumimoji="0" lang="en-US" sz="1800" b="0" i="0" u="none" strike="noStrike" kern="1200" cap="none" spc="0" normalizeH="0" baseline="0" noProof="0">
-              <a:ln>
-                <a:noFill/>
-              </a:ln>
+            <a:endParaRPr lang="en-US">
               <a:solidFill>
                 <a:prstClr val="black"/>
               </a:solidFill>
-              <a:effectLst/>
-              <a:uLnTx/>
-              <a:uFillTx/>
               <a:latin typeface="Calibri" panose="020F0502020204030204"/>
-              <a:ea typeface="+mn-ea"/>
-              <a:cs typeface="+mn-cs"/>
             </a:endParaRPr>
           </a:p>
         </p:txBody>
@@ -5046,8 +3884,8 @@
         </p:nvSpPr>
         <p:spPr>
           <a:xfrm>
-            <a:off x="8610600" y="6356350"/>
-            <a:ext cx="2743200" cy="365125"/>
+            <a:off x="8610600" y="8475134"/>
+            <a:ext cx="2743200" cy="486833"/>
           </a:xfrm>
           <a:prstGeom prst="rect">
             <a:avLst/>
@@ -5057,70 +3895,26 @@
           <a:bodyPr/>
           <a:lstStyle/>
           <a:p>
-            <a:pPr marL="0" marR="0" lvl="0" indent="0" algn="l" defTabSz="914400" rtl="0" eaLnBrk="1" fontAlgn="auto" latinLnBrk="0" hangingPunct="1">
-              <a:lnSpc>
-                <a:spcPct val="100000"/>
-              </a:lnSpc>
-              <a:spcBef>
-                <a:spcPts val="0"/>
-              </a:spcBef>
-              <a:spcAft>
-                <a:spcPts val="0"/>
-              </a:spcAft>
-              <a:buClrTx/>
-              <a:buSzTx/>
-              <a:buFontTx/>
-              <a:buNone/>
-              <a:tabLst/>
+            <a:pPr algn="l">
               <a:defRPr/>
             </a:pPr>
             <a:fld id="{52144C99-8741-4102-B794-D10AFFB4C19C}" type="slidenum">
-              <a:rPr kumimoji="0" lang="en-US" sz="1800" b="0" i="0" u="none" strike="noStrike" kern="1200" cap="none" spc="0" normalizeH="0" baseline="0" noProof="0" smtClean="0">
-                <a:ln>
-                  <a:noFill/>
-                </a:ln>
+              <a:rPr lang="en-US" sz="1800" smtClean="0">
                 <a:solidFill>
                   <a:prstClr val="black"/>
                 </a:solidFill>
-                <a:effectLst/>
-                <a:uLnTx/>
-                <a:uFillTx/>
                 <a:latin typeface="Calibri" panose="020F0502020204030204"/>
-                <a:ea typeface="+mn-ea"/>
-                <a:cs typeface="+mn-cs"/>
               </a:rPr>
-              <a:pPr marL="0" marR="0" lvl="0" indent="0" algn="l" defTabSz="914400" rtl="0" eaLnBrk="1" fontAlgn="auto" latinLnBrk="0" hangingPunct="1">
-                <a:lnSpc>
-                  <a:spcPct val="100000"/>
-                </a:lnSpc>
-                <a:spcBef>
-                  <a:spcPts val="0"/>
-                </a:spcBef>
-                <a:spcAft>
-                  <a:spcPts val="0"/>
-                </a:spcAft>
-                <a:buClrTx/>
-                <a:buSzTx/>
-                <a:buFontTx/>
-                <a:buNone/>
-                <a:tabLst/>
+              <a:pPr algn="l">
                 <a:defRPr/>
               </a:pPr>
               <a:t>‹#›</a:t>
             </a:fld>
-            <a:endParaRPr kumimoji="0" lang="en-US" sz="1800" b="0" i="0" u="none" strike="noStrike" kern="1200" cap="none" spc="0" normalizeH="0" baseline="0" noProof="0">
-              <a:ln>
-                <a:noFill/>
-              </a:ln>
+            <a:endParaRPr lang="en-US" sz="1800">
               <a:solidFill>
                 <a:prstClr val="black"/>
               </a:solidFill>
-              <a:effectLst/>
-              <a:uLnTx/>
-              <a:uFillTx/>
               <a:latin typeface="Calibri" panose="020F0502020204030204"/>
-              <a:ea typeface="+mn-ea"/>
-              <a:cs typeface="+mn-cs"/>
             </a:endParaRPr>
           </a:p>
         </p:txBody>
@@ -5168,8 +3962,8 @@
         </p:nvSpPr>
         <p:spPr>
           <a:xfrm>
-            <a:off x="0" y="6391656"/>
-            <a:ext cx="12191999" cy="466344"/>
+            <a:off x="1" y="8522208"/>
+            <a:ext cx="12191999" cy="621792"/>
           </a:xfrm>
           <a:prstGeom prst="rect">
             <a:avLst/>
@@ -5202,7 +3996,7 @@
           <a:lstStyle/>
           <a:p>
             <a:pPr algn="ctr"/>
-            <a:endParaRPr lang="en-US"/>
+            <a:endParaRPr lang="en-US" sz="1800"/>
           </a:p>
         </p:txBody>
       </p:sp>
@@ -5218,8 +4012,8 @@
         </p:nvSpPr>
         <p:spPr>
           <a:xfrm>
-            <a:off x="323850" y="97967"/>
-            <a:ext cx="11525250" cy="790575"/>
+            <a:off x="323850" y="130623"/>
+            <a:ext cx="11525250" cy="1054100"/>
           </a:xfrm>
           <a:prstGeom prst="rect">
             <a:avLst/>
@@ -5247,8 +4041,8 @@
         </p:nvSpPr>
         <p:spPr>
           <a:xfrm>
-            <a:off x="838200" y="1214989"/>
-            <a:ext cx="10515600" cy="4856163"/>
+            <a:off x="838200" y="1619986"/>
+            <a:ext cx="10515600" cy="6474884"/>
           </a:xfrm>
           <a:prstGeom prst="rect">
             <a:avLst/>
@@ -5305,7 +4099,7 @@
         </p:nvSpPr>
         <p:spPr>
           <a:xfrm>
-            <a:off x="4641850" y="6471542"/>
+            <a:off x="4641850" y="8628724"/>
             <a:ext cx="7480300" cy="307777"/>
           </a:xfrm>
           <a:prstGeom prst="rect">
@@ -5367,8 +4161,8 @@
         </p:nvSpPr>
         <p:spPr>
           <a:xfrm>
-            <a:off x="5700737" y="6450483"/>
-            <a:ext cx="465834" cy="365125"/>
+            <a:off x="5700737" y="8600645"/>
+            <a:ext cx="465834" cy="486833"/>
           </a:xfrm>
           <a:prstGeom prst="rect">
             <a:avLst/>
@@ -5401,36 +4195,6 @@
           </a:p>
         </p:txBody>
       </p:sp>
-      <p:pic>
-        <p:nvPicPr>
-          <p:cNvPr id="9" name="Picture 8"/>
-          <p:cNvPicPr>
-            <a:picLocks noChangeAspect="1"/>
-          </p:cNvPicPr>
-          <p:nvPr/>
-        </p:nvPicPr>
-        <p:blipFill>
-          <a:blip r:embed="rId13">
-            <a:extLst>
-              <a:ext uri="{28A0092B-C50C-407E-A947-70E740481C1C}">
-                <a14:useLocalDpi xmlns:a14="http://schemas.microsoft.com/office/drawing/2010/main" val="0"/>
-              </a:ext>
-            </a:extLst>
-          </a:blip>
-          <a:stretch>
-            <a:fillRect/>
-          </a:stretch>
-        </p:blipFill>
-        <p:spPr>
-          <a:xfrm>
-            <a:off x="27709" y="6399398"/>
-            <a:ext cx="5451762" cy="467294"/>
-          </a:xfrm>
-          <a:prstGeom prst="rect">
-            <a:avLst/>
-          </a:prstGeom>
-        </p:spPr>
-      </p:pic>
     </p:spTree>
     <p:extLst>
       <p:ext uri="{BB962C8B-B14F-4D97-AF65-F5344CB8AC3E}">
@@ -5766,7 +4530,7 @@
         </p:nvGrpSpPr>
         <p:grpSpPr>
           <a:xfrm>
-            <a:off x="4593626" y="1945447"/>
+            <a:off x="4593627" y="3338822"/>
             <a:ext cx="3232151" cy="221571"/>
             <a:chOff x="2952297" y="1958068"/>
             <a:chExt cx="3232151" cy="221571"/>
@@ -5934,7 +4698,7 @@
         </p:nvGrpSpPr>
         <p:grpSpPr>
           <a:xfrm rot="5400000">
-            <a:off x="7538226" y="1593028"/>
+            <a:off x="7538227" y="2986403"/>
             <a:ext cx="4487865" cy="221571"/>
             <a:chOff x="2952297" y="1958068"/>
             <a:chExt cx="4487865" cy="221571"/>
@@ -6116,7 +4880,7 @@
         </p:blipFill>
         <p:spPr>
           <a:xfrm>
-            <a:off x="6304215" y="1898743"/>
+            <a:off x="6304215" y="3292117"/>
             <a:ext cx="307876" cy="308400"/>
           </a:xfrm>
           <a:prstGeom prst="rect">
@@ -6152,7 +4916,7 @@
         </p:blipFill>
         <p:spPr>
           <a:xfrm>
-            <a:off x="9627651" y="2910530"/>
+            <a:off x="9627651" y="4303904"/>
             <a:ext cx="307876" cy="308400"/>
           </a:xfrm>
           <a:prstGeom prst="rect">
@@ -6174,7 +4938,7 @@
         </p:nvGrpSpPr>
         <p:grpSpPr>
           <a:xfrm>
-            <a:off x="892366" y="191999"/>
+            <a:off x="892367" y="1585374"/>
             <a:ext cx="2281539" cy="4565639"/>
             <a:chOff x="833176" y="541564"/>
             <a:chExt cx="1557144" cy="3116036"/>
@@ -6391,7 +5155,7 @@
         </p:nvSpPr>
         <p:spPr>
           <a:xfrm>
-            <a:off x="2496143" y="1946582"/>
+            <a:off x="2496143" y="3339956"/>
             <a:ext cx="220436" cy="220436"/>
           </a:xfrm>
           <a:prstGeom prst="ellipse">
@@ -6443,7 +5207,7 @@
         </p:nvSpPr>
         <p:spPr>
           <a:xfrm>
-            <a:off x="1193135" y="648867"/>
+            <a:off x="1193135" y="2042241"/>
             <a:ext cx="220436" cy="220436"/>
           </a:xfrm>
           <a:prstGeom prst="ellipse">
@@ -6509,7 +5273,7 @@
         </p:blipFill>
         <p:spPr>
           <a:xfrm>
-            <a:off x="1572656" y="2127379"/>
+            <a:off x="2029372" y="2655987"/>
             <a:ext cx="307876" cy="308400"/>
           </a:xfrm>
           <a:prstGeom prst="rect">
@@ -6531,7 +5295,7 @@
         </p:nvGrpSpPr>
         <p:grpSpPr>
           <a:xfrm>
-            <a:off x="4593626" y="4637088"/>
+            <a:off x="4593627" y="6030463"/>
             <a:ext cx="3232151" cy="221571"/>
             <a:chOff x="2952297" y="1958068"/>
             <a:chExt cx="3232151" cy="221571"/>
@@ -6713,7 +5477,7 @@
         </p:blipFill>
         <p:spPr>
           <a:xfrm>
-            <a:off x="6055968" y="4590384"/>
+            <a:off x="6055968" y="5983758"/>
             <a:ext cx="285694" cy="286180"/>
           </a:xfrm>
           <a:prstGeom prst="rect">
@@ -6735,7 +5499,7 @@
         </p:nvGrpSpPr>
         <p:grpSpPr>
           <a:xfrm>
-            <a:off x="4689332" y="1356085"/>
+            <a:off x="4689332" y="2749459"/>
             <a:ext cx="1064658" cy="702116"/>
             <a:chOff x="3550559" y="715991"/>
             <a:chExt cx="679014" cy="447793"/>
@@ -6829,8 +5593,8 @@
             </a:fontRef>
           </p:style>
         </p:cxnSp>
-        <mc:AlternateContent xmlns:mc="http://schemas.openxmlformats.org/markup-compatibility/2006">
-          <mc:Choice xmlns:a14="http://schemas.microsoft.com/office/drawing/2010/main" Requires="a14">
+        <mc:AlternateContent xmlns:mc="http://schemas.openxmlformats.org/markup-compatibility/2006" xmlns:a14="http://schemas.microsoft.com/office/drawing/2010/main">
+          <mc:Choice Requires="a14">
             <p:sp>
               <p:nvSpPr>
                 <p:cNvPr id="59" name="TextBox 58">
@@ -6859,6 +5623,7 @@
                 </a:bodyPr>
                 <a:lstStyle/>
                 <a:p>
+                  <a:pPr/>
                   <a14:m>
                     <m:oMathPara xmlns:m="http://schemas.openxmlformats.org/officeDocument/2006/math">
                       <m:oMathParaPr>
@@ -6868,14 +5633,14 @@
                         <m:sSub>
                           <m:sSubPr>
                             <m:ctrlPr>
-                              <a:rPr lang="en-US" sz="2000" b="0" i="1" smtClean="0">
+                              <a:rPr lang="en-US" sz="2000" i="1">
                                 <a:latin typeface="Cambria Math" panose="02040503050406030204" pitchFamily="18" charset="0"/>
                               </a:rPr>
                             </m:ctrlPr>
                           </m:sSubPr>
                           <m:e>
                             <m:r>
-                              <a:rPr lang="en-US" sz="2000" b="0" i="1" smtClean="0">
+                              <a:rPr lang="en-US" sz="2000" i="1">
                                 <a:latin typeface="Cambria Math" panose="02040503050406030204" pitchFamily="18" charset="0"/>
                               </a:rPr>
                               <m:t>𝑥</m:t>
@@ -6883,7 +5648,7 @@
                           </m:e>
                           <m:sub>
                             <m:r>
-                              <a:rPr lang="en-US" sz="2000" b="0" i="1" smtClean="0">
+                              <a:rPr lang="en-US" sz="2000" i="1">
                                 <a:latin typeface="Cambria Math" panose="02040503050406030204" pitchFamily="18" charset="0"/>
                               </a:rPr>
                               <m:t>2</m:t>
@@ -6898,7 +5663,7 @@
               </p:txBody>
             </p:sp>
           </mc:Choice>
-          <mc:Fallback>
+          <mc:Fallback xmlns="">
             <p:sp>
               <p:nvSpPr>
                 <p:cNvPr id="59" name="TextBox 58">
@@ -6943,8 +5708,8 @@
             </p:sp>
           </mc:Fallback>
         </mc:AlternateContent>
-        <mc:AlternateContent xmlns:mc="http://schemas.openxmlformats.org/markup-compatibility/2006">
-          <mc:Choice xmlns:a14="http://schemas.microsoft.com/office/drawing/2010/main" Requires="a14">
+        <mc:AlternateContent xmlns:mc="http://schemas.openxmlformats.org/markup-compatibility/2006" xmlns:a14="http://schemas.microsoft.com/office/drawing/2010/main">
+          <mc:Choice Requires="a14">
             <p:sp>
               <p:nvSpPr>
                 <p:cNvPr id="60" name="TextBox 59">
@@ -6973,6 +5738,7 @@
                 </a:bodyPr>
                 <a:lstStyle/>
                 <a:p>
+                  <a:pPr/>
                   <a14:m>
                     <m:oMathPara xmlns:m="http://schemas.openxmlformats.org/officeDocument/2006/math">
                       <m:oMathParaPr>
@@ -6982,14 +5748,14 @@
                         <m:sSub>
                           <m:sSubPr>
                             <m:ctrlPr>
-                              <a:rPr lang="en-US" sz="2000" b="0" i="1" smtClean="0">
+                              <a:rPr lang="en-US" sz="2000" i="1">
                                 <a:latin typeface="Cambria Math" panose="02040503050406030204" pitchFamily="18" charset="0"/>
                               </a:rPr>
                             </m:ctrlPr>
                           </m:sSubPr>
                           <m:e>
                             <m:r>
-                              <a:rPr lang="en-US" sz="2000" b="0" i="1" smtClean="0">
+                              <a:rPr lang="en-US" sz="2000" i="1">
                                 <a:latin typeface="Cambria Math" panose="02040503050406030204" pitchFamily="18" charset="0"/>
                               </a:rPr>
                               <m:t>𝑦</m:t>
@@ -6997,7 +5763,7 @@
                           </m:e>
                           <m:sub>
                             <m:r>
-                              <a:rPr lang="en-US" sz="2000" b="0" i="1" smtClean="0">
+                              <a:rPr lang="en-US" sz="2000" i="1">
                                 <a:latin typeface="Cambria Math" panose="02040503050406030204" pitchFamily="18" charset="0"/>
                               </a:rPr>
                               <m:t>2</m:t>
@@ -7012,7 +5778,7 @@
               </p:txBody>
             </p:sp>
           </mc:Choice>
-          <mc:Fallback>
+          <mc:Fallback xmlns="">
             <p:sp>
               <p:nvSpPr>
                 <p:cNvPr id="60" name="TextBox 59">
@@ -7072,7 +5838,7 @@
         </p:nvGrpSpPr>
         <p:grpSpPr>
           <a:xfrm>
-            <a:off x="4689334" y="4045190"/>
+            <a:off x="4689334" y="5438564"/>
             <a:ext cx="1064658" cy="702116"/>
             <a:chOff x="3550559" y="715991"/>
             <a:chExt cx="679014" cy="447793"/>
@@ -7166,8 +5932,8 @@
             </a:fontRef>
           </p:style>
         </p:cxnSp>
-        <mc:AlternateContent xmlns:mc="http://schemas.openxmlformats.org/markup-compatibility/2006">
-          <mc:Choice xmlns:a14="http://schemas.microsoft.com/office/drawing/2010/main" Requires="a14">
+        <mc:AlternateContent xmlns:mc="http://schemas.openxmlformats.org/markup-compatibility/2006" xmlns:a14="http://schemas.microsoft.com/office/drawing/2010/main">
+          <mc:Choice Requires="a14">
             <p:sp>
               <p:nvSpPr>
                 <p:cNvPr id="67" name="TextBox 66">
@@ -7196,6 +5962,7 @@
                 </a:bodyPr>
                 <a:lstStyle/>
                 <a:p>
+                  <a:pPr/>
                   <a14:m>
                     <m:oMathPara xmlns:m="http://schemas.openxmlformats.org/officeDocument/2006/math">
                       <m:oMathParaPr>
@@ -7205,14 +5972,14 @@
                         <m:sSub>
                           <m:sSubPr>
                             <m:ctrlPr>
-                              <a:rPr lang="en-US" sz="2000" b="0" i="1" smtClean="0">
+                              <a:rPr lang="en-US" sz="2000" i="1">
                                 <a:latin typeface="Cambria Math" panose="02040503050406030204" pitchFamily="18" charset="0"/>
                               </a:rPr>
                             </m:ctrlPr>
                           </m:sSubPr>
                           <m:e>
                             <m:r>
-                              <a:rPr lang="en-US" sz="2000" b="0" i="1" smtClean="0">
+                              <a:rPr lang="en-US" sz="2000" i="1">
                                 <a:latin typeface="Cambria Math" panose="02040503050406030204" pitchFamily="18" charset="0"/>
                               </a:rPr>
                               <m:t>𝑥</m:t>
@@ -7220,7 +5987,7 @@
                           </m:e>
                           <m:sub>
                             <m:r>
-                              <a:rPr lang="en-US" sz="2000" b="0" i="1" smtClean="0">
+                              <a:rPr lang="en-US" sz="2000" i="1">
                                 <a:latin typeface="Cambria Math" panose="02040503050406030204" pitchFamily="18" charset="0"/>
                               </a:rPr>
                               <m:t>3</m:t>
@@ -7235,7 +6002,7 @@
               </p:txBody>
             </p:sp>
           </mc:Choice>
-          <mc:Fallback>
+          <mc:Fallback xmlns="">
             <p:sp>
               <p:nvSpPr>
                 <p:cNvPr id="67" name="TextBox 66">
@@ -7280,8 +6047,8 @@
             </p:sp>
           </mc:Fallback>
         </mc:AlternateContent>
-        <mc:AlternateContent xmlns:mc="http://schemas.openxmlformats.org/markup-compatibility/2006">
-          <mc:Choice xmlns:a14="http://schemas.microsoft.com/office/drawing/2010/main" Requires="a14">
+        <mc:AlternateContent xmlns:mc="http://schemas.openxmlformats.org/markup-compatibility/2006" xmlns:a14="http://schemas.microsoft.com/office/drawing/2010/main">
+          <mc:Choice Requires="a14">
             <p:sp>
               <p:nvSpPr>
                 <p:cNvPr id="68" name="TextBox 67">
@@ -7310,6 +6077,7 @@
                 </a:bodyPr>
                 <a:lstStyle/>
                 <a:p>
+                  <a:pPr/>
                   <a14:m>
                     <m:oMathPara xmlns:m="http://schemas.openxmlformats.org/officeDocument/2006/math">
                       <m:oMathParaPr>
@@ -7319,14 +6087,14 @@
                         <m:sSub>
                           <m:sSubPr>
                             <m:ctrlPr>
-                              <a:rPr lang="en-US" sz="2000" b="0" i="1" smtClean="0">
+                              <a:rPr lang="en-US" sz="2000" i="1">
                                 <a:latin typeface="Cambria Math" panose="02040503050406030204" pitchFamily="18" charset="0"/>
                               </a:rPr>
                             </m:ctrlPr>
                           </m:sSubPr>
                           <m:e>
                             <m:r>
-                              <a:rPr lang="en-US" sz="2000" b="0" i="1" smtClean="0">
+                              <a:rPr lang="en-US" sz="2000" i="1">
                                 <a:latin typeface="Cambria Math" panose="02040503050406030204" pitchFamily="18" charset="0"/>
                               </a:rPr>
                               <m:t>𝑦</m:t>
@@ -7334,7 +6102,7 @@
                           </m:e>
                           <m:sub>
                             <m:r>
-                              <a:rPr lang="en-US" sz="2000" b="0" i="1" smtClean="0">
+                              <a:rPr lang="en-US" sz="2000" i="1">
                                 <a:latin typeface="Cambria Math" panose="02040503050406030204" pitchFamily="18" charset="0"/>
                               </a:rPr>
                               <m:t>3</m:t>
@@ -7349,7 +6117,7 @@
               </p:txBody>
             </p:sp>
           </mc:Choice>
-          <mc:Fallback>
+          <mc:Fallback xmlns="">
             <p:sp>
               <p:nvSpPr>
                 <p:cNvPr id="68" name="TextBox 67">
@@ -7409,7 +6177,7 @@
         </p:nvGrpSpPr>
         <p:grpSpPr>
           <a:xfrm rot="5400000">
-            <a:off x="9685529" y="-419290"/>
+            <a:off x="9685529" y="974085"/>
             <a:ext cx="827886" cy="788259"/>
             <a:chOff x="3550559" y="712497"/>
             <a:chExt cx="528006" cy="502733"/>
@@ -7503,8 +6271,8 @@
             </a:fontRef>
           </p:style>
         </p:cxnSp>
-        <mc:AlternateContent xmlns:mc="http://schemas.openxmlformats.org/markup-compatibility/2006">
-          <mc:Choice xmlns:a14="http://schemas.microsoft.com/office/drawing/2010/main" Requires="a14">
+        <mc:AlternateContent xmlns:mc="http://schemas.openxmlformats.org/markup-compatibility/2006" xmlns:a14="http://schemas.microsoft.com/office/drawing/2010/main">
+          <mc:Choice Requires="a14">
             <p:sp>
               <p:nvSpPr>
                 <p:cNvPr id="72" name="TextBox 71">
@@ -7533,6 +6301,7 @@
                 </a:bodyPr>
                 <a:lstStyle/>
                 <a:p>
+                  <a:pPr/>
                   <a14:m>
                     <m:oMathPara xmlns:m="http://schemas.openxmlformats.org/officeDocument/2006/math">
                       <m:oMathParaPr>
@@ -7542,14 +6311,14 @@
                         <m:sSub>
                           <m:sSubPr>
                             <m:ctrlPr>
-                              <a:rPr lang="en-US" sz="2000" b="0" i="1" smtClean="0">
+                              <a:rPr lang="en-US" sz="2000" i="1">
                                 <a:latin typeface="Cambria Math" panose="02040503050406030204" pitchFamily="18" charset="0"/>
                               </a:rPr>
                             </m:ctrlPr>
                           </m:sSubPr>
                           <m:e>
                             <m:r>
-                              <a:rPr lang="en-US" sz="2000" b="0" i="1" smtClean="0">
+                              <a:rPr lang="en-US" sz="2000" i="1">
                                 <a:latin typeface="Cambria Math" panose="02040503050406030204" pitchFamily="18" charset="0"/>
                               </a:rPr>
                               <m:t>𝑥</m:t>
@@ -7557,7 +6326,7 @@
                           </m:e>
                           <m:sub>
                             <m:r>
-                              <a:rPr lang="en-US" sz="2000" b="0" i="1" smtClean="0">
+                              <a:rPr lang="en-US" sz="2000" i="1">
                                 <a:latin typeface="Cambria Math" panose="02040503050406030204" pitchFamily="18" charset="0"/>
                               </a:rPr>
                               <m:t>4</m:t>
@@ -7572,7 +6341,7 @@
               </p:txBody>
             </p:sp>
           </mc:Choice>
-          <mc:Fallback>
+          <mc:Fallback xmlns="">
             <p:sp>
               <p:nvSpPr>
                 <p:cNvPr id="72" name="TextBox 71">
@@ -7617,8 +6386,8 @@
             </p:sp>
           </mc:Fallback>
         </mc:AlternateContent>
-        <mc:AlternateContent xmlns:mc="http://schemas.openxmlformats.org/markup-compatibility/2006">
-          <mc:Choice xmlns:a14="http://schemas.microsoft.com/office/drawing/2010/main" Requires="a14">
+        <mc:AlternateContent xmlns:mc="http://schemas.openxmlformats.org/markup-compatibility/2006" xmlns:a14="http://schemas.microsoft.com/office/drawing/2010/main">
+          <mc:Choice Requires="a14">
             <p:sp>
               <p:nvSpPr>
                 <p:cNvPr id="73" name="TextBox 72">
@@ -7647,6 +6416,7 @@
                 </a:bodyPr>
                 <a:lstStyle/>
                 <a:p>
+                  <a:pPr/>
                   <a14:m>
                     <m:oMathPara xmlns:m="http://schemas.openxmlformats.org/officeDocument/2006/math">
                       <m:oMathParaPr>
@@ -7656,14 +6426,14 @@
                         <m:sSub>
                           <m:sSubPr>
                             <m:ctrlPr>
-                              <a:rPr lang="en-US" sz="2000" b="0" i="1" smtClean="0">
+                              <a:rPr lang="en-US" sz="2000" i="1">
                                 <a:latin typeface="Cambria Math" panose="02040503050406030204" pitchFamily="18" charset="0"/>
                               </a:rPr>
                             </m:ctrlPr>
                           </m:sSubPr>
                           <m:e>
                             <m:r>
-                              <a:rPr lang="en-US" sz="2000" b="0" i="1" smtClean="0">
+                              <a:rPr lang="en-US" sz="2000" i="1">
                                 <a:latin typeface="Cambria Math" panose="02040503050406030204" pitchFamily="18" charset="0"/>
                               </a:rPr>
                               <m:t>𝑦</m:t>
@@ -7671,7 +6441,7 @@
                           </m:e>
                           <m:sub>
                             <m:r>
-                              <a:rPr lang="en-US" sz="2000" b="0" i="1" smtClean="0">
+                              <a:rPr lang="en-US" sz="2000" i="1">
                                 <a:latin typeface="Cambria Math" panose="02040503050406030204" pitchFamily="18" charset="0"/>
                               </a:rPr>
                               <m:t>4</m:t>
@@ -7686,7 +6456,7 @@
               </p:txBody>
             </p:sp>
           </mc:Choice>
-          <mc:Fallback>
+          <mc:Fallback xmlns="">
             <p:sp>
               <p:nvSpPr>
                 <p:cNvPr id="73" name="TextBox 72">
@@ -7732,369 +6502,6 @@
           </mc:Fallback>
         </mc:AlternateContent>
       </p:grpSp>
-      <p:grpSp>
-        <p:nvGrpSpPr>
-          <p:cNvPr id="74" name="Group 73">
-            <a:extLst>
-              <a:ext uri="{FF2B5EF4-FFF2-40B4-BE49-F238E27FC236}">
-                <a16:creationId xmlns:a16="http://schemas.microsoft.com/office/drawing/2014/main" id="{DE8524DC-374B-4A00-977A-7F4BFF9C68E7}"/>
-              </a:ext>
-            </a:extLst>
-          </p:cNvPr>
-          <p:cNvGrpSpPr/>
-          <p:nvPr/>
-        </p:nvGrpSpPr>
-        <p:grpSpPr>
-          <a:xfrm rot="2700000">
-            <a:off x="929224" y="241990"/>
-            <a:ext cx="1083337" cy="866959"/>
-            <a:chOff x="3253969" y="778072"/>
-            <a:chExt cx="690927" cy="552926"/>
-          </a:xfrm>
-        </p:grpSpPr>
-        <p:cxnSp>
-          <p:nvCxnSpPr>
-            <p:cNvPr id="75" name="Straight Connector 74">
-              <a:extLst>
-                <a:ext uri="{FF2B5EF4-FFF2-40B4-BE49-F238E27FC236}">
-                  <a16:creationId xmlns:a16="http://schemas.microsoft.com/office/drawing/2014/main" id="{B0F73C56-CF85-4BFF-AEEA-BFBC987FA7A7}"/>
-                </a:ext>
-              </a:extLst>
-            </p:cNvPr>
-            <p:cNvCxnSpPr>
-              <a:cxnSpLocks/>
-            </p:cNvCxnSpPr>
-            <p:nvPr/>
-          </p:nvCxnSpPr>
-          <p:spPr>
-            <a:xfrm flipV="1">
-              <a:off x="3563259" y="818695"/>
-              <a:ext cx="0" cy="345087"/>
-            </a:xfrm>
-            <a:prstGeom prst="line">
-              <a:avLst/>
-            </a:prstGeom>
-            <a:ln w="28575">
-              <a:solidFill>
-                <a:schemeClr val="bg1"/>
-              </a:solidFill>
-              <a:tailEnd type="triangle" w="med" len="med"/>
-            </a:ln>
-          </p:spPr>
-          <p:style>
-            <a:lnRef idx="1">
-              <a:schemeClr val="accent1"/>
-            </a:lnRef>
-            <a:fillRef idx="0">
-              <a:schemeClr val="accent1"/>
-            </a:fillRef>
-            <a:effectRef idx="0">
-              <a:schemeClr val="accent1"/>
-            </a:effectRef>
-            <a:fontRef idx="minor">
-              <a:schemeClr val="tx1"/>
-            </a:fontRef>
-          </p:style>
-        </p:cxnSp>
-        <p:cxnSp>
-          <p:nvCxnSpPr>
-            <p:cNvPr id="76" name="Straight Connector 75">
-              <a:extLst>
-                <a:ext uri="{FF2B5EF4-FFF2-40B4-BE49-F238E27FC236}">
-                  <a16:creationId xmlns:a16="http://schemas.microsoft.com/office/drawing/2014/main" id="{FDF42893-C054-4B38-A4BB-E2110E8820EB}"/>
-                </a:ext>
-              </a:extLst>
-            </p:cNvPr>
-            <p:cNvCxnSpPr>
-              <a:cxnSpLocks/>
-            </p:cNvCxnSpPr>
-            <p:nvPr/>
-          </p:nvCxnSpPr>
-          <p:spPr>
-            <a:xfrm flipV="1">
-              <a:off x="3550559" y="1163783"/>
-              <a:ext cx="354098" cy="1"/>
-            </a:xfrm>
-            <a:prstGeom prst="line">
-              <a:avLst/>
-            </a:prstGeom>
-            <a:ln w="28575">
-              <a:solidFill>
-                <a:schemeClr val="bg1"/>
-              </a:solidFill>
-              <a:tailEnd type="triangle" w="med" len="med"/>
-            </a:ln>
-          </p:spPr>
-          <p:style>
-            <a:lnRef idx="1">
-              <a:schemeClr val="accent1"/>
-            </a:lnRef>
-            <a:fillRef idx="0">
-              <a:schemeClr val="accent1"/>
-            </a:fillRef>
-            <a:effectRef idx="0">
-              <a:schemeClr val="accent1"/>
-            </a:effectRef>
-            <a:fontRef idx="minor">
-              <a:schemeClr val="tx1"/>
-            </a:fontRef>
-          </p:style>
-        </p:cxnSp>
-        <mc:AlternateContent xmlns:mc="http://schemas.openxmlformats.org/markup-compatibility/2006">
-          <mc:Choice xmlns:a14="http://schemas.microsoft.com/office/drawing/2010/main" Requires="a14">
-            <p:sp>
-              <p:nvSpPr>
-                <p:cNvPr id="77" name="TextBox 76">
-                  <a:extLst>
-                    <a:ext uri="{FF2B5EF4-FFF2-40B4-BE49-F238E27FC236}">
-                      <a16:creationId xmlns:a16="http://schemas.microsoft.com/office/drawing/2014/main" id="{9AC6BFD9-DF4A-493F-952B-5F3C24500479}"/>
-                    </a:ext>
-                  </a:extLst>
-                </p:cNvPr>
-                <p:cNvSpPr txBox="1"/>
-                <p:nvPr/>
-              </p:nvSpPr>
-              <p:spPr>
-                <a:xfrm>
-                  <a:off x="3590798" y="1134705"/>
-                  <a:ext cx="354098" cy="196293"/>
-                </a:xfrm>
-                <a:prstGeom prst="rect">
-                  <a:avLst/>
-                </a:prstGeom>
-                <a:noFill/>
-              </p:spPr>
-              <p:txBody>
-                <a:bodyPr wrap="square" lIns="0" tIns="0" rIns="0" bIns="0" rtlCol="0">
-                  <a:spAutoFit/>
-                </a:bodyPr>
-                <a:lstStyle/>
-                <a:p>
-                  <a14:m>
-                    <m:oMathPara xmlns:m="http://schemas.openxmlformats.org/officeDocument/2006/math">
-                      <m:oMathParaPr>
-                        <m:jc m:val="centerGroup"/>
-                      </m:oMathParaPr>
-                      <m:oMath xmlns:m="http://schemas.openxmlformats.org/officeDocument/2006/math">
-                        <m:sSub>
-                          <m:sSubPr>
-                            <m:ctrlPr>
-                              <a:rPr lang="en-US" sz="2000" b="0" i="1" smtClean="0">
-                                <a:solidFill>
-                                  <a:schemeClr val="bg1"/>
-                                </a:solidFill>
-                                <a:latin typeface="Cambria Math" panose="02040503050406030204" pitchFamily="18" charset="0"/>
-                              </a:rPr>
-                            </m:ctrlPr>
-                          </m:sSubPr>
-                          <m:e>
-                            <m:r>
-                              <a:rPr lang="en-US" sz="2000" b="0" i="1" smtClean="0">
-                                <a:solidFill>
-                                  <a:schemeClr val="bg1"/>
-                                </a:solidFill>
-                                <a:latin typeface="Cambria Math" panose="02040503050406030204" pitchFamily="18" charset="0"/>
-                              </a:rPr>
-                              <m:t>𝑥</m:t>
-                            </m:r>
-                          </m:e>
-                          <m:sub>
-                            <m:r>
-                              <a:rPr lang="en-US" sz="2000" b="0" i="1" smtClean="0">
-                                <a:solidFill>
-                                  <a:schemeClr val="bg1"/>
-                                </a:solidFill>
-                                <a:latin typeface="Cambria Math" panose="02040503050406030204" pitchFamily="18" charset="0"/>
-                              </a:rPr>
-                              <m:t>1</m:t>
-                            </m:r>
-                          </m:sub>
-                        </m:sSub>
-                      </m:oMath>
-                    </m:oMathPara>
-                  </a14:m>
-                  <a:endParaRPr lang="en-US" sz="2000" dirty="0">
-                    <a:solidFill>
-                      <a:schemeClr val="bg1"/>
-                    </a:solidFill>
-                  </a:endParaRPr>
-                </a:p>
-              </p:txBody>
-            </p:sp>
-          </mc:Choice>
-          <mc:Fallback>
-            <p:sp>
-              <p:nvSpPr>
-                <p:cNvPr id="77" name="TextBox 76">
-                  <a:extLst>
-                    <a:ext uri="{FF2B5EF4-FFF2-40B4-BE49-F238E27FC236}">
-                      <a16:creationId xmlns:a16="http://schemas.microsoft.com/office/drawing/2014/main" id="{9AC6BFD9-DF4A-493F-952B-5F3C24500479}"/>
-                    </a:ext>
-                  </a:extLst>
-                </p:cNvPr>
-                <p:cNvSpPr txBox="1">
-                  <a:spLocks noRot="1" noChangeAspect="1" noMove="1" noResize="1" noEditPoints="1" noAdjustHandles="1" noChangeArrowheads="1" noChangeShapeType="1" noTextEdit="1"/>
-                </p:cNvSpPr>
-                <p:nvPr/>
-              </p:nvSpPr>
-              <p:spPr>
-                <a:xfrm>
-                  <a:off x="3590798" y="1134705"/>
-                  <a:ext cx="354098" cy="196293"/>
-                </a:xfrm>
-                <a:prstGeom prst="rect">
-                  <a:avLst/>
-                </a:prstGeom>
-                <a:blipFill>
-                  <a:blip r:embed="rId9"/>
-                  <a:stretch>
-                    <a:fillRect/>
-                  </a:stretch>
-                </a:blipFill>
-              </p:spPr>
-              <p:txBody>
-                <a:bodyPr/>
-                <a:lstStyle/>
-                <a:p>
-                  <a:r>
-                    <a:rPr lang="en-US">
-                      <a:noFill/>
-                    </a:rPr>
-                    <a:t> </a:t>
-                  </a:r>
-                </a:p>
-              </p:txBody>
-            </p:sp>
-          </mc:Fallback>
-        </mc:AlternateContent>
-        <mc:AlternateContent xmlns:mc="http://schemas.openxmlformats.org/markup-compatibility/2006">
-          <mc:Choice xmlns:a14="http://schemas.microsoft.com/office/drawing/2010/main" Requires="a14">
-            <p:sp>
-              <p:nvSpPr>
-                <p:cNvPr id="78" name="TextBox 77">
-                  <a:extLst>
-                    <a:ext uri="{FF2B5EF4-FFF2-40B4-BE49-F238E27FC236}">
-                      <a16:creationId xmlns:a16="http://schemas.microsoft.com/office/drawing/2014/main" id="{B522EE97-89C0-4553-86EC-06F9DA2C2E2F}"/>
-                    </a:ext>
-                  </a:extLst>
-                </p:cNvPr>
-                <p:cNvSpPr txBox="1"/>
-                <p:nvPr/>
-              </p:nvSpPr>
-              <p:spPr>
-                <a:xfrm>
-                  <a:off x="3253969" y="778072"/>
-                  <a:ext cx="354098" cy="196293"/>
-                </a:xfrm>
-                <a:prstGeom prst="rect">
-                  <a:avLst/>
-                </a:prstGeom>
-                <a:noFill/>
-              </p:spPr>
-              <p:txBody>
-                <a:bodyPr wrap="square" lIns="0" tIns="0" rIns="0" bIns="0" rtlCol="0">
-                  <a:spAutoFit/>
-                </a:bodyPr>
-                <a:lstStyle/>
-                <a:p>
-                  <a14:m>
-                    <m:oMathPara xmlns:m="http://schemas.openxmlformats.org/officeDocument/2006/math">
-                      <m:oMathParaPr>
-                        <m:jc m:val="centerGroup"/>
-                      </m:oMathParaPr>
-                      <m:oMath xmlns:m="http://schemas.openxmlformats.org/officeDocument/2006/math">
-                        <m:sSub>
-                          <m:sSubPr>
-                            <m:ctrlPr>
-                              <a:rPr lang="en-US" sz="2000" b="0" i="1" smtClean="0">
-                                <a:solidFill>
-                                  <a:schemeClr val="bg1"/>
-                                </a:solidFill>
-                                <a:latin typeface="Cambria Math" panose="02040503050406030204" pitchFamily="18" charset="0"/>
-                              </a:rPr>
-                            </m:ctrlPr>
-                          </m:sSubPr>
-                          <m:e>
-                            <m:r>
-                              <a:rPr lang="en-US" sz="2000" b="0" i="1" smtClean="0">
-                                <a:solidFill>
-                                  <a:schemeClr val="bg1"/>
-                                </a:solidFill>
-                                <a:latin typeface="Cambria Math" panose="02040503050406030204" pitchFamily="18" charset="0"/>
-                              </a:rPr>
-                              <m:t>𝑦</m:t>
-                            </m:r>
-                          </m:e>
-                          <m:sub>
-                            <m:r>
-                              <a:rPr lang="en-US" sz="2000" b="0" i="1" smtClean="0">
-                                <a:solidFill>
-                                  <a:schemeClr val="bg1"/>
-                                </a:solidFill>
-                                <a:latin typeface="Cambria Math" panose="02040503050406030204" pitchFamily="18" charset="0"/>
-                              </a:rPr>
-                              <m:t>1</m:t>
-                            </m:r>
-                          </m:sub>
-                        </m:sSub>
-                      </m:oMath>
-                    </m:oMathPara>
-                  </a14:m>
-                  <a:endParaRPr lang="en-US" sz="2000" dirty="0">
-                    <a:solidFill>
-                      <a:schemeClr val="bg1"/>
-                    </a:solidFill>
-                  </a:endParaRPr>
-                </a:p>
-              </p:txBody>
-            </p:sp>
-          </mc:Choice>
-          <mc:Fallback>
-            <p:sp>
-              <p:nvSpPr>
-                <p:cNvPr id="78" name="TextBox 77">
-                  <a:extLst>
-                    <a:ext uri="{FF2B5EF4-FFF2-40B4-BE49-F238E27FC236}">
-                      <a16:creationId xmlns:a16="http://schemas.microsoft.com/office/drawing/2014/main" id="{B522EE97-89C0-4553-86EC-06F9DA2C2E2F}"/>
-                    </a:ext>
-                  </a:extLst>
-                </p:cNvPr>
-                <p:cNvSpPr txBox="1">
-                  <a:spLocks noRot="1" noChangeAspect="1" noMove="1" noResize="1" noEditPoints="1" noAdjustHandles="1" noChangeArrowheads="1" noChangeShapeType="1" noTextEdit="1"/>
-                </p:cNvSpPr>
-                <p:nvPr/>
-              </p:nvSpPr>
-              <p:spPr>
-                <a:xfrm>
-                  <a:off x="3253969" y="778072"/>
-                  <a:ext cx="354098" cy="196293"/>
-                </a:xfrm>
-                <a:prstGeom prst="rect">
-                  <a:avLst/>
-                </a:prstGeom>
-                <a:blipFill>
-                  <a:blip r:embed="rId10"/>
-                  <a:stretch>
-                    <a:fillRect l="-2970"/>
-                  </a:stretch>
-                </a:blipFill>
-              </p:spPr>
-              <p:txBody>
-                <a:bodyPr/>
-                <a:lstStyle/>
-                <a:p>
-                  <a:r>
-                    <a:rPr lang="en-US">
-                      <a:noFill/>
-                    </a:rPr>
-                    <a:t> </a:t>
-                  </a:r>
-                </a:p>
-              </p:txBody>
-            </p:sp>
-          </mc:Fallback>
-        </mc:AlternateContent>
-      </p:grpSp>
       <p:sp>
         <p:nvSpPr>
           <p:cNvPr id="25" name="Oval 24">
@@ -8109,7 +6516,7 @@
         </p:nvSpPr>
         <p:spPr>
           <a:xfrm>
-            <a:off x="2496143" y="4647420"/>
+            <a:off x="2496143" y="6040794"/>
             <a:ext cx="220436" cy="220436"/>
           </a:xfrm>
           <a:prstGeom prst="ellipse">
@@ -8161,7 +6568,7 @@
         </p:nvGrpSpPr>
         <p:grpSpPr>
           <a:xfrm>
-            <a:off x="4693687" y="2252398"/>
+            <a:off x="4693687" y="3645773"/>
             <a:ext cx="3020186" cy="1113471"/>
             <a:chOff x="3812246" y="2222843"/>
             <a:chExt cx="3031800" cy="930820"/>
@@ -8352,7 +6759,7 @@
         </p:nvGrpSpPr>
         <p:grpSpPr>
           <a:xfrm>
-            <a:off x="4696591" y="2255773"/>
+            <a:off x="4696592" y="3649148"/>
             <a:ext cx="1759785" cy="722043"/>
             <a:chOff x="3812246" y="2222843"/>
             <a:chExt cx="3031800" cy="1150617"/>
@@ -8543,7 +6950,7 @@
         </p:nvGrpSpPr>
         <p:grpSpPr>
           <a:xfrm>
-            <a:off x="4689332" y="4945173"/>
+            <a:off x="4689332" y="6338548"/>
             <a:ext cx="3031800" cy="1111053"/>
             <a:chOff x="3812246" y="2222843"/>
             <a:chExt cx="3031800" cy="931491"/>
@@ -8734,7 +7141,7 @@
         </p:nvGrpSpPr>
         <p:grpSpPr>
           <a:xfrm>
-            <a:off x="4693687" y="4945174"/>
+            <a:off x="4693688" y="6338549"/>
             <a:ext cx="1505785" cy="722043"/>
             <a:chOff x="3812246" y="2222843"/>
             <a:chExt cx="3031800" cy="1150617"/>
@@ -8925,10 +7332,10 @@
         </p:nvGrpSpPr>
         <p:grpSpPr>
           <a:xfrm rot="16200000">
-            <a:off x="1764441" y="3046197"/>
-            <a:ext cx="2700838" cy="722043"/>
+            <a:off x="1851070" y="4360203"/>
+            <a:ext cx="2700838" cy="895299"/>
             <a:chOff x="3812246" y="2222843"/>
-            <a:chExt cx="3031800" cy="1150617"/>
+            <a:chExt cx="3031800" cy="1100090"/>
           </a:xfrm>
         </p:grpSpPr>
         <p:cxnSp>
@@ -9078,8 +7485,8 @@
           </p:nvSpPr>
           <p:spPr>
             <a:xfrm>
-              <a:off x="3812246" y="2932046"/>
-              <a:ext cx="2997270" cy="441414"/>
+              <a:off x="3812246" y="2982573"/>
+              <a:ext cx="2997270" cy="340360"/>
             </a:xfrm>
             <a:prstGeom prst="rect">
               <a:avLst/>
@@ -9116,7 +7523,7 @@
         </p:nvGrpSpPr>
         <p:grpSpPr>
           <a:xfrm rot="5400000">
-            <a:off x="8082298" y="344920"/>
+            <a:off x="8082299" y="1738294"/>
             <a:ext cx="2267495" cy="722044"/>
             <a:chOff x="3812246" y="2222843"/>
             <a:chExt cx="3031800" cy="1150618"/>
@@ -9307,10 +7714,10 @@
         </p:nvGrpSpPr>
         <p:grpSpPr>
           <a:xfrm rot="16200000">
-            <a:off x="2475006" y="1042022"/>
-            <a:ext cx="1311915" cy="737433"/>
+            <a:off x="2550414" y="2359990"/>
+            <a:ext cx="1311915" cy="888245"/>
             <a:chOff x="3812246" y="2222843"/>
-            <a:chExt cx="3031800" cy="1175141"/>
+            <a:chExt cx="3031800" cy="1124780"/>
           </a:xfrm>
         </p:grpSpPr>
         <p:cxnSp>
@@ -9460,8 +7867,8 @@
           </p:nvSpPr>
           <p:spPr>
             <a:xfrm>
-              <a:off x="3812246" y="2907524"/>
-              <a:ext cx="2997269" cy="490460"/>
+              <a:off x="3812246" y="2957886"/>
+              <a:ext cx="2997269" cy="389737"/>
             </a:xfrm>
             <a:prstGeom prst="rect">
               <a:avLst/>
@@ -9477,7 +7884,7 @@
               <a:pPr algn="ctr"/>
               <a:r>
                 <a:rPr lang="en-US" sz="2000" dirty="0"/>
-                <a:t>0.03903</a:t>
+                <a:t>0.04603</a:t>
               </a:r>
             </a:p>
           </p:txBody>
@@ -9496,11 +7903,11 @@
           <p:nvPr/>
         </p:nvGrpSpPr>
         <p:grpSpPr>
-          <a:xfrm rot="10800000">
-            <a:off x="1303352" y="-91708"/>
-            <a:ext cx="1474729" cy="770065"/>
-            <a:chOff x="3812246" y="2170842"/>
-            <a:chExt cx="3031800" cy="1227143"/>
+          <a:xfrm rot="13500000">
+            <a:off x="1352219" y="2165941"/>
+            <a:ext cx="1855528" cy="641208"/>
+            <a:chOff x="3812245" y="2170842"/>
+            <a:chExt cx="3031801" cy="1291985"/>
           </a:xfrm>
         </p:grpSpPr>
         <p:cxnSp>
@@ -9650,8 +8057,8 @@
           </p:nvSpPr>
           <p:spPr>
             <a:xfrm rot="10800000">
-              <a:off x="3812246" y="2907525"/>
-              <a:ext cx="2997270" cy="490460"/>
+              <a:off x="3812245" y="2842680"/>
+              <a:ext cx="2997270" cy="620147"/>
             </a:xfrm>
             <a:prstGeom prst="rect">
               <a:avLst/>
@@ -9667,7 +8074,7 @@
               <a:pPr algn="ctr"/>
               <a:r>
                 <a:rPr lang="en-US" sz="2000" dirty="0"/>
-                <a:t>0.03903</a:t>
+                <a:t>0.0552</a:t>
               </a:r>
             </a:p>
           </p:txBody>
@@ -9687,7 +8094,7 @@
         </p:nvGrpSpPr>
         <p:grpSpPr>
           <a:xfrm rot="5400000">
-            <a:off x="8162017" y="2532696"/>
+            <a:off x="8162018" y="3926070"/>
             <a:ext cx="2108057" cy="722044"/>
             <a:chOff x="3812246" y="2222843"/>
             <a:chExt cx="3031800" cy="1150618"/>
@@ -9878,7 +8285,7 @@
         </p:nvGrpSpPr>
         <p:grpSpPr>
           <a:xfrm rot="5400000">
-            <a:off x="8579228" y="4222946"/>
+            <a:off x="8579228" y="5616320"/>
             <a:ext cx="1272444" cy="722044"/>
             <a:chOff x="3812246" y="2222843"/>
             <a:chExt cx="3031800" cy="1150618"/>
@@ -10069,7 +8476,7 @@
         </p:nvGrpSpPr>
         <p:grpSpPr>
           <a:xfrm rot="5400000">
-            <a:off x="9156412" y="4424228"/>
+            <a:off x="9156413" y="5817602"/>
             <a:ext cx="1248985" cy="360972"/>
             <a:chOff x="4820547" y="2218726"/>
             <a:chExt cx="2290658" cy="1131406"/>
@@ -10503,7 +8910,7 @@
         </p:nvCxnSpPr>
         <p:spPr>
           <a:xfrm flipV="1">
-            <a:off x="9780904" y="5229207"/>
+            <a:off x="9780904" y="6622581"/>
             <a:ext cx="0" cy="896110"/>
           </a:xfrm>
           <a:prstGeom prst="line">
@@ -10544,7 +8951,7 @@
         </p:nvGrpSpPr>
         <p:grpSpPr>
           <a:xfrm rot="5400000">
-            <a:off x="8768616" y="5301768"/>
+            <a:off x="8768616" y="6695142"/>
             <a:ext cx="893668" cy="722044"/>
             <a:chOff x="3812246" y="2222843"/>
             <a:chExt cx="3031800" cy="1150618"/>
@@ -10735,7 +9142,7 @@
         </p:nvSpPr>
         <p:spPr>
           <a:xfrm>
-            <a:off x="4664984" y="-605856"/>
+            <a:off x="4664985" y="787519"/>
             <a:ext cx="2922681" cy="1384995"/>
           </a:xfrm>
           <a:prstGeom prst="rect">
@@ -10789,7 +9196,7 @@
         </p:nvSpPr>
         <p:spPr>
           <a:xfrm>
-            <a:off x="6055968" y="4117020"/>
+            <a:off x="6055969" y="5510394"/>
             <a:ext cx="1653017" cy="369332"/>
           </a:xfrm>
           <a:prstGeom prst="rect">
@@ -10823,7 +9230,7 @@
         </p:nvSpPr>
         <p:spPr>
           <a:xfrm>
-            <a:off x="6274443" y="1358218"/>
+            <a:off x="6274444" y="2751592"/>
             <a:ext cx="1653017" cy="369332"/>
           </a:xfrm>
           <a:prstGeom prst="rect">
@@ -10857,7 +9264,7 @@
         </p:nvSpPr>
         <p:spPr>
           <a:xfrm>
-            <a:off x="9860119" y="3115028"/>
+            <a:off x="9860120" y="4508402"/>
             <a:ext cx="1653017" cy="369332"/>
           </a:xfrm>
           <a:prstGeom prst="rect">
@@ -10891,7 +9298,7 @@
         </p:nvGrpSpPr>
         <p:grpSpPr>
           <a:xfrm rot="16200000">
-            <a:off x="8718482" y="875867"/>
+            <a:off x="8718482" y="2269242"/>
             <a:ext cx="3502398" cy="923607"/>
             <a:chOff x="3812246" y="2222843"/>
             <a:chExt cx="3031800" cy="1093953"/>
@@ -11082,7 +9489,7 @@
         </p:nvSpPr>
         <p:spPr>
           <a:xfrm rot="5400000">
-            <a:off x="9699750" y="3857211"/>
+            <a:off x="9699751" y="5250586"/>
             <a:ext cx="177953" cy="177953"/>
           </a:xfrm>
           <a:prstGeom prst="ellipse">
@@ -11134,7 +9541,7 @@
         </p:nvSpPr>
         <p:spPr>
           <a:xfrm rot="5400000">
-            <a:off x="9693003" y="5148157"/>
+            <a:off x="9693004" y="6541532"/>
             <a:ext cx="177953" cy="177953"/>
           </a:xfrm>
           <a:prstGeom prst="ellipse">
@@ -11186,7 +9593,7 @@
         </p:nvSpPr>
         <p:spPr>
           <a:xfrm>
-            <a:off x="404385" y="2562303"/>
+            <a:off x="368815" y="5903919"/>
             <a:ext cx="1800493" cy="646331"/>
           </a:xfrm>
           <a:prstGeom prst="rect">
@@ -11212,6 +9619,693 @@
           </a:p>
         </p:txBody>
       </p:sp>
+      <p:sp>
+        <p:nvSpPr>
+          <p:cNvPr id="144" name="Rectangle 143">
+            <a:extLst>
+              <a:ext uri="{FF2B5EF4-FFF2-40B4-BE49-F238E27FC236}">
+                <a16:creationId xmlns:a16="http://schemas.microsoft.com/office/drawing/2014/main" id="{F97C9264-1D41-4295-AD0B-5F79141BF4EA}"/>
+              </a:ext>
+            </a:extLst>
+          </p:cNvPr>
+          <p:cNvSpPr/>
+          <p:nvPr/>
+        </p:nvSpPr>
+        <p:spPr>
+          <a:xfrm>
+            <a:off x="557792" y="3984866"/>
+            <a:ext cx="1824538" cy="369332"/>
+          </a:xfrm>
+          <a:prstGeom prst="rect">
+            <a:avLst/>
+          </a:prstGeom>
+        </p:spPr>
+        <p:txBody>
+          <a:bodyPr wrap="none">
+            <a:spAutoFit/>
+          </a:bodyPr>
+          <a:lstStyle/>
+          <a:p>
+            <a:r>
+              <a:rPr lang="en-US" dirty="0" err="1"/>
+              <a:t>M</a:t>
+            </a:r>
+            <a:r>
+              <a:rPr lang="en-US" baseline="-25000" dirty="0" err="1"/>
+              <a:t>tot</a:t>
+            </a:r>
+            <a:r>
+              <a:rPr lang="en-US" dirty="0"/>
+              <a:t> = 0.5470 kg</a:t>
+            </a:r>
+          </a:p>
+        </p:txBody>
+      </p:sp>
+      <p:grpSp>
+        <p:nvGrpSpPr>
+          <p:cNvPr id="145" name="Group 144">
+            <a:extLst>
+              <a:ext uri="{FF2B5EF4-FFF2-40B4-BE49-F238E27FC236}">
+                <a16:creationId xmlns:a16="http://schemas.microsoft.com/office/drawing/2014/main" id="{9844A4B3-0EBA-46CC-B649-EB610D23E78A}"/>
+              </a:ext>
+            </a:extLst>
+          </p:cNvPr>
+          <p:cNvGrpSpPr/>
+          <p:nvPr/>
+        </p:nvGrpSpPr>
+        <p:grpSpPr>
+          <a:xfrm rot="10800000">
+            <a:off x="1309105" y="1196640"/>
+            <a:ext cx="1353790" cy="849035"/>
+            <a:chOff x="3812246" y="2170842"/>
+            <a:chExt cx="3031800" cy="1227143"/>
+          </a:xfrm>
+        </p:grpSpPr>
+        <p:cxnSp>
+          <p:nvCxnSpPr>
+            <p:cNvPr id="156" name="Straight Connector 155">
+              <a:extLst>
+                <a:ext uri="{FF2B5EF4-FFF2-40B4-BE49-F238E27FC236}">
+                  <a16:creationId xmlns:a16="http://schemas.microsoft.com/office/drawing/2014/main" id="{33516E40-4DE5-4721-83D1-451EB61CFEB5}"/>
+                </a:ext>
+              </a:extLst>
+            </p:cNvPr>
+            <p:cNvCxnSpPr/>
+            <p:nvPr/>
+          </p:nvCxnSpPr>
+          <p:spPr>
+            <a:xfrm>
+              <a:off x="3812246" y="2911928"/>
+              <a:ext cx="3031800" cy="0"/>
+            </a:xfrm>
+            <a:prstGeom prst="line">
+              <a:avLst/>
+            </a:prstGeom>
+            <a:ln w="19050">
+              <a:solidFill>
+                <a:schemeClr val="bg1">
+                  <a:lumMod val="65000"/>
+                </a:schemeClr>
+              </a:solidFill>
+            </a:ln>
+          </p:spPr>
+          <p:style>
+            <a:lnRef idx="1">
+              <a:schemeClr val="accent1"/>
+            </a:lnRef>
+            <a:fillRef idx="0">
+              <a:schemeClr val="accent1"/>
+            </a:fillRef>
+            <a:effectRef idx="0">
+              <a:schemeClr val="accent1"/>
+            </a:effectRef>
+            <a:fontRef idx="minor">
+              <a:schemeClr val="tx1"/>
+            </a:fontRef>
+          </p:style>
+        </p:cxnSp>
+        <p:cxnSp>
+          <p:nvCxnSpPr>
+            <p:cNvPr id="169" name="Straight Connector 168">
+              <a:extLst>
+                <a:ext uri="{FF2B5EF4-FFF2-40B4-BE49-F238E27FC236}">
+                  <a16:creationId xmlns:a16="http://schemas.microsoft.com/office/drawing/2014/main" id="{B9DB055E-707A-455A-86E9-2D2998F48598}"/>
+                </a:ext>
+              </a:extLst>
+            </p:cNvPr>
+            <p:cNvCxnSpPr>
+              <a:cxnSpLocks/>
+            </p:cNvCxnSpPr>
+            <p:nvPr/>
+          </p:nvCxnSpPr>
+          <p:spPr>
+            <a:xfrm rot="10800000">
+              <a:off x="3819505" y="2170842"/>
+              <a:ext cx="0" cy="834750"/>
+            </a:xfrm>
+            <a:prstGeom prst="line">
+              <a:avLst/>
+            </a:prstGeom>
+            <a:ln w="19050">
+              <a:solidFill>
+                <a:schemeClr val="bg1">
+                  <a:lumMod val="65000"/>
+                </a:schemeClr>
+              </a:solidFill>
+            </a:ln>
+          </p:spPr>
+          <p:style>
+            <a:lnRef idx="1">
+              <a:schemeClr val="accent1"/>
+            </a:lnRef>
+            <a:fillRef idx="0">
+              <a:schemeClr val="accent1"/>
+            </a:fillRef>
+            <a:effectRef idx="0">
+              <a:schemeClr val="accent1"/>
+            </a:effectRef>
+            <a:fontRef idx="minor">
+              <a:schemeClr val="tx1"/>
+            </a:fontRef>
+          </p:style>
+        </p:cxnSp>
+        <p:cxnSp>
+          <p:nvCxnSpPr>
+            <p:cNvPr id="171" name="Straight Connector 170">
+              <a:extLst>
+                <a:ext uri="{FF2B5EF4-FFF2-40B4-BE49-F238E27FC236}">
+                  <a16:creationId xmlns:a16="http://schemas.microsoft.com/office/drawing/2014/main" id="{EF91B2AB-D995-4701-A714-FF7770D65B39}"/>
+                </a:ext>
+              </a:extLst>
+            </p:cNvPr>
+            <p:cNvCxnSpPr>
+              <a:cxnSpLocks/>
+            </p:cNvCxnSpPr>
+            <p:nvPr/>
+          </p:nvCxnSpPr>
+          <p:spPr>
+            <a:xfrm flipV="1">
+              <a:off x="6844046" y="2248078"/>
+              <a:ext cx="0" cy="782749"/>
+            </a:xfrm>
+            <a:prstGeom prst="line">
+              <a:avLst/>
+            </a:prstGeom>
+            <a:ln w="19050">
+              <a:solidFill>
+                <a:schemeClr val="bg1">
+                  <a:lumMod val="65000"/>
+                </a:schemeClr>
+              </a:solidFill>
+            </a:ln>
+          </p:spPr>
+          <p:style>
+            <a:lnRef idx="1">
+              <a:schemeClr val="accent1"/>
+            </a:lnRef>
+            <a:fillRef idx="0">
+              <a:schemeClr val="accent1"/>
+            </a:fillRef>
+            <a:effectRef idx="0">
+              <a:schemeClr val="accent1"/>
+            </a:effectRef>
+            <a:fontRef idx="minor">
+              <a:schemeClr val="tx1"/>
+            </a:fontRef>
+          </p:style>
+        </p:cxnSp>
+        <p:sp>
+          <p:nvSpPr>
+            <p:cNvPr id="178" name="TextBox 177">
+              <a:extLst>
+                <a:ext uri="{FF2B5EF4-FFF2-40B4-BE49-F238E27FC236}">
+                  <a16:creationId xmlns:a16="http://schemas.microsoft.com/office/drawing/2014/main" id="{63F217CB-26AF-43A1-8F27-EF8E10799604}"/>
+                </a:ext>
+              </a:extLst>
+            </p:cNvPr>
+            <p:cNvSpPr txBox="1"/>
+            <p:nvPr/>
+          </p:nvSpPr>
+          <p:spPr>
+            <a:xfrm rot="10800000">
+              <a:off x="3812246" y="2953143"/>
+              <a:ext cx="2997269" cy="444842"/>
+            </a:xfrm>
+            <a:prstGeom prst="rect">
+              <a:avLst/>
+            </a:prstGeom>
+            <a:noFill/>
+          </p:spPr>
+          <p:txBody>
+            <a:bodyPr wrap="square" lIns="0" tIns="0" rIns="0" bIns="0" rtlCol="0">
+              <a:spAutoFit/>
+            </a:bodyPr>
+            <a:lstStyle/>
+            <a:p>
+              <a:pPr algn="ctr"/>
+              <a:r>
+                <a:rPr lang="en-US" sz="2000" dirty="0"/>
+                <a:t>0.04603</a:t>
+              </a:r>
+            </a:p>
+          </p:txBody>
+        </p:sp>
+      </p:grpSp>
+      <p:grpSp>
+        <p:nvGrpSpPr>
+          <p:cNvPr id="74" name="Group 73">
+            <a:extLst>
+              <a:ext uri="{FF2B5EF4-FFF2-40B4-BE49-F238E27FC236}">
+                <a16:creationId xmlns:a16="http://schemas.microsoft.com/office/drawing/2014/main" id="{DE8524DC-374B-4A00-977A-7F4BFF9C68E7}"/>
+              </a:ext>
+            </a:extLst>
+          </p:cNvPr>
+          <p:cNvGrpSpPr/>
+          <p:nvPr/>
+        </p:nvGrpSpPr>
+        <p:grpSpPr>
+          <a:xfrm rot="2700000">
+            <a:off x="929225" y="1635365"/>
+            <a:ext cx="1083337" cy="866959"/>
+            <a:chOff x="3253969" y="778072"/>
+            <a:chExt cx="690927" cy="552926"/>
+          </a:xfrm>
+        </p:grpSpPr>
+        <p:cxnSp>
+          <p:nvCxnSpPr>
+            <p:cNvPr id="75" name="Straight Connector 74">
+              <a:extLst>
+                <a:ext uri="{FF2B5EF4-FFF2-40B4-BE49-F238E27FC236}">
+                  <a16:creationId xmlns:a16="http://schemas.microsoft.com/office/drawing/2014/main" id="{B0F73C56-CF85-4BFF-AEEA-BFBC987FA7A7}"/>
+                </a:ext>
+              </a:extLst>
+            </p:cNvPr>
+            <p:cNvCxnSpPr>
+              <a:cxnSpLocks/>
+            </p:cNvCxnSpPr>
+            <p:nvPr/>
+          </p:nvCxnSpPr>
+          <p:spPr>
+            <a:xfrm flipV="1">
+              <a:off x="3563259" y="818695"/>
+              <a:ext cx="0" cy="345087"/>
+            </a:xfrm>
+            <a:prstGeom prst="line">
+              <a:avLst/>
+            </a:prstGeom>
+            <a:ln w="28575">
+              <a:solidFill>
+                <a:schemeClr val="bg1"/>
+              </a:solidFill>
+              <a:tailEnd type="triangle" w="med" len="med"/>
+            </a:ln>
+          </p:spPr>
+          <p:style>
+            <a:lnRef idx="1">
+              <a:schemeClr val="accent1"/>
+            </a:lnRef>
+            <a:fillRef idx="0">
+              <a:schemeClr val="accent1"/>
+            </a:fillRef>
+            <a:effectRef idx="0">
+              <a:schemeClr val="accent1"/>
+            </a:effectRef>
+            <a:fontRef idx="minor">
+              <a:schemeClr val="tx1"/>
+            </a:fontRef>
+          </p:style>
+        </p:cxnSp>
+        <p:cxnSp>
+          <p:nvCxnSpPr>
+            <p:cNvPr id="76" name="Straight Connector 75">
+              <a:extLst>
+                <a:ext uri="{FF2B5EF4-FFF2-40B4-BE49-F238E27FC236}">
+                  <a16:creationId xmlns:a16="http://schemas.microsoft.com/office/drawing/2014/main" id="{FDF42893-C054-4B38-A4BB-E2110E8820EB}"/>
+                </a:ext>
+              </a:extLst>
+            </p:cNvPr>
+            <p:cNvCxnSpPr>
+              <a:cxnSpLocks/>
+            </p:cNvCxnSpPr>
+            <p:nvPr/>
+          </p:nvCxnSpPr>
+          <p:spPr>
+            <a:xfrm flipV="1">
+              <a:off x="3550559" y="1163783"/>
+              <a:ext cx="354098" cy="1"/>
+            </a:xfrm>
+            <a:prstGeom prst="line">
+              <a:avLst/>
+            </a:prstGeom>
+            <a:ln w="28575">
+              <a:solidFill>
+                <a:schemeClr val="bg1"/>
+              </a:solidFill>
+              <a:tailEnd type="triangle" w="med" len="med"/>
+            </a:ln>
+          </p:spPr>
+          <p:style>
+            <a:lnRef idx="1">
+              <a:schemeClr val="accent1"/>
+            </a:lnRef>
+            <a:fillRef idx="0">
+              <a:schemeClr val="accent1"/>
+            </a:fillRef>
+            <a:effectRef idx="0">
+              <a:schemeClr val="accent1"/>
+            </a:effectRef>
+            <a:fontRef idx="minor">
+              <a:schemeClr val="tx1"/>
+            </a:fontRef>
+          </p:style>
+        </p:cxnSp>
+        <mc:AlternateContent xmlns:mc="http://schemas.openxmlformats.org/markup-compatibility/2006" xmlns:a14="http://schemas.microsoft.com/office/drawing/2010/main">
+          <mc:Choice Requires="a14">
+            <p:sp>
+              <p:nvSpPr>
+                <p:cNvPr id="77" name="TextBox 76">
+                  <a:extLst>
+                    <a:ext uri="{FF2B5EF4-FFF2-40B4-BE49-F238E27FC236}">
+                      <a16:creationId xmlns:a16="http://schemas.microsoft.com/office/drawing/2014/main" id="{9AC6BFD9-DF4A-493F-952B-5F3C24500479}"/>
+                    </a:ext>
+                  </a:extLst>
+                </p:cNvPr>
+                <p:cNvSpPr txBox="1"/>
+                <p:nvPr/>
+              </p:nvSpPr>
+              <p:spPr>
+                <a:xfrm>
+                  <a:off x="3590798" y="1134705"/>
+                  <a:ext cx="354098" cy="196293"/>
+                </a:xfrm>
+                <a:prstGeom prst="rect">
+                  <a:avLst/>
+                </a:prstGeom>
+                <a:noFill/>
+              </p:spPr>
+              <p:txBody>
+                <a:bodyPr wrap="square" lIns="0" tIns="0" rIns="0" bIns="0" rtlCol="0">
+                  <a:spAutoFit/>
+                </a:bodyPr>
+                <a:lstStyle/>
+                <a:p>
+                  <a:pPr/>
+                  <a14:m>
+                    <m:oMathPara xmlns:m="http://schemas.openxmlformats.org/officeDocument/2006/math">
+                      <m:oMathParaPr>
+                        <m:jc m:val="centerGroup"/>
+                      </m:oMathParaPr>
+                      <m:oMath xmlns:m="http://schemas.openxmlformats.org/officeDocument/2006/math">
+                        <m:sSub>
+                          <m:sSubPr>
+                            <m:ctrlPr>
+                              <a:rPr lang="en-US" sz="2000" i="1">
+                                <a:solidFill>
+                                  <a:schemeClr val="bg1"/>
+                                </a:solidFill>
+                                <a:latin typeface="Cambria Math" panose="02040503050406030204" pitchFamily="18" charset="0"/>
+                              </a:rPr>
+                            </m:ctrlPr>
+                          </m:sSubPr>
+                          <m:e>
+                            <m:r>
+                              <a:rPr lang="en-US" sz="2000" i="1">
+                                <a:solidFill>
+                                  <a:schemeClr val="bg1"/>
+                                </a:solidFill>
+                                <a:latin typeface="Cambria Math" panose="02040503050406030204" pitchFamily="18" charset="0"/>
+                              </a:rPr>
+                              <m:t>𝑥</m:t>
+                            </m:r>
+                          </m:e>
+                          <m:sub>
+                            <m:r>
+                              <a:rPr lang="en-US" sz="2000" i="1">
+                                <a:solidFill>
+                                  <a:schemeClr val="bg1"/>
+                                </a:solidFill>
+                                <a:latin typeface="Cambria Math" panose="02040503050406030204" pitchFamily="18" charset="0"/>
+                              </a:rPr>
+                              <m:t>1</m:t>
+                            </m:r>
+                          </m:sub>
+                        </m:sSub>
+                      </m:oMath>
+                    </m:oMathPara>
+                  </a14:m>
+                  <a:endParaRPr lang="en-US" sz="2000" dirty="0">
+                    <a:solidFill>
+                      <a:schemeClr val="bg1"/>
+                    </a:solidFill>
+                  </a:endParaRPr>
+                </a:p>
+              </p:txBody>
+            </p:sp>
+          </mc:Choice>
+          <mc:Fallback xmlns="">
+            <p:sp>
+              <p:nvSpPr>
+                <p:cNvPr id="77" name="TextBox 76">
+                  <a:extLst>
+                    <a:ext uri="{FF2B5EF4-FFF2-40B4-BE49-F238E27FC236}">
+                      <a16:creationId xmlns:a16="http://schemas.microsoft.com/office/drawing/2014/main" id="{9AC6BFD9-DF4A-493F-952B-5F3C24500479}"/>
+                    </a:ext>
+                  </a:extLst>
+                </p:cNvPr>
+                <p:cNvSpPr txBox="1">
+                  <a:spLocks noRot="1" noChangeAspect="1" noMove="1" noResize="1" noEditPoints="1" noAdjustHandles="1" noChangeArrowheads="1" noChangeShapeType="1" noTextEdit="1"/>
+                </p:cNvSpPr>
+                <p:nvPr/>
+              </p:nvSpPr>
+              <p:spPr>
+                <a:xfrm>
+                  <a:off x="3590798" y="1134705"/>
+                  <a:ext cx="354098" cy="196293"/>
+                </a:xfrm>
+                <a:prstGeom prst="rect">
+                  <a:avLst/>
+                </a:prstGeom>
+                <a:blipFill>
+                  <a:blip r:embed="rId9"/>
+                  <a:stretch>
+                    <a:fillRect/>
+                  </a:stretch>
+                </a:blipFill>
+              </p:spPr>
+              <p:txBody>
+                <a:bodyPr/>
+                <a:lstStyle/>
+                <a:p>
+                  <a:r>
+                    <a:rPr lang="en-US">
+                      <a:noFill/>
+                    </a:rPr>
+                    <a:t> </a:t>
+                  </a:r>
+                </a:p>
+              </p:txBody>
+            </p:sp>
+          </mc:Fallback>
+        </mc:AlternateContent>
+        <mc:AlternateContent xmlns:mc="http://schemas.openxmlformats.org/markup-compatibility/2006" xmlns:a14="http://schemas.microsoft.com/office/drawing/2010/main">
+          <mc:Choice Requires="a14">
+            <p:sp>
+              <p:nvSpPr>
+                <p:cNvPr id="78" name="TextBox 77">
+                  <a:extLst>
+                    <a:ext uri="{FF2B5EF4-FFF2-40B4-BE49-F238E27FC236}">
+                      <a16:creationId xmlns:a16="http://schemas.microsoft.com/office/drawing/2014/main" id="{B522EE97-89C0-4553-86EC-06F9DA2C2E2F}"/>
+                    </a:ext>
+                  </a:extLst>
+                </p:cNvPr>
+                <p:cNvSpPr txBox="1"/>
+                <p:nvPr/>
+              </p:nvSpPr>
+              <p:spPr>
+                <a:xfrm>
+                  <a:off x="3253969" y="778072"/>
+                  <a:ext cx="354098" cy="196293"/>
+                </a:xfrm>
+                <a:prstGeom prst="rect">
+                  <a:avLst/>
+                </a:prstGeom>
+                <a:noFill/>
+              </p:spPr>
+              <p:txBody>
+                <a:bodyPr wrap="square" lIns="0" tIns="0" rIns="0" bIns="0" rtlCol="0">
+                  <a:spAutoFit/>
+                </a:bodyPr>
+                <a:lstStyle/>
+                <a:p>
+                  <a:pPr/>
+                  <a14:m>
+                    <m:oMathPara xmlns:m="http://schemas.openxmlformats.org/officeDocument/2006/math">
+                      <m:oMathParaPr>
+                        <m:jc m:val="centerGroup"/>
+                      </m:oMathParaPr>
+                      <m:oMath xmlns:m="http://schemas.openxmlformats.org/officeDocument/2006/math">
+                        <m:sSub>
+                          <m:sSubPr>
+                            <m:ctrlPr>
+                              <a:rPr lang="en-US" sz="2000" i="1">
+                                <a:solidFill>
+                                  <a:schemeClr val="bg1"/>
+                                </a:solidFill>
+                                <a:latin typeface="Cambria Math" panose="02040503050406030204" pitchFamily="18" charset="0"/>
+                              </a:rPr>
+                            </m:ctrlPr>
+                          </m:sSubPr>
+                          <m:e>
+                            <m:r>
+                              <a:rPr lang="en-US" sz="2000" i="1">
+                                <a:solidFill>
+                                  <a:schemeClr val="bg1"/>
+                                </a:solidFill>
+                                <a:latin typeface="Cambria Math" panose="02040503050406030204" pitchFamily="18" charset="0"/>
+                              </a:rPr>
+                              <m:t>𝑦</m:t>
+                            </m:r>
+                          </m:e>
+                          <m:sub>
+                            <m:r>
+                              <a:rPr lang="en-US" sz="2000" i="1">
+                                <a:solidFill>
+                                  <a:schemeClr val="bg1"/>
+                                </a:solidFill>
+                                <a:latin typeface="Cambria Math" panose="02040503050406030204" pitchFamily="18" charset="0"/>
+                              </a:rPr>
+                              <m:t>1</m:t>
+                            </m:r>
+                          </m:sub>
+                        </m:sSub>
+                      </m:oMath>
+                    </m:oMathPara>
+                  </a14:m>
+                  <a:endParaRPr lang="en-US" sz="2000" dirty="0">
+                    <a:solidFill>
+                      <a:schemeClr val="bg1"/>
+                    </a:solidFill>
+                  </a:endParaRPr>
+                </a:p>
+              </p:txBody>
+            </p:sp>
+          </mc:Choice>
+          <mc:Fallback xmlns="">
+            <p:sp>
+              <p:nvSpPr>
+                <p:cNvPr id="78" name="TextBox 77">
+                  <a:extLst>
+                    <a:ext uri="{FF2B5EF4-FFF2-40B4-BE49-F238E27FC236}">
+                      <a16:creationId xmlns:a16="http://schemas.microsoft.com/office/drawing/2014/main" id="{B522EE97-89C0-4553-86EC-06F9DA2C2E2F}"/>
+                    </a:ext>
+                  </a:extLst>
+                </p:cNvPr>
+                <p:cNvSpPr txBox="1">
+                  <a:spLocks noRot="1" noChangeAspect="1" noMove="1" noResize="1" noEditPoints="1" noAdjustHandles="1" noChangeArrowheads="1" noChangeShapeType="1" noTextEdit="1"/>
+                </p:cNvSpPr>
+                <p:nvPr/>
+              </p:nvSpPr>
+              <p:spPr>
+                <a:xfrm>
+                  <a:off x="3253969" y="778072"/>
+                  <a:ext cx="354098" cy="196293"/>
+                </a:xfrm>
+                <a:prstGeom prst="rect">
+                  <a:avLst/>
+                </a:prstGeom>
+                <a:blipFill>
+                  <a:blip r:embed="rId10"/>
+                  <a:stretch>
+                    <a:fillRect l="-2970"/>
+                  </a:stretch>
+                </a:blipFill>
+              </p:spPr>
+              <p:txBody>
+                <a:bodyPr/>
+                <a:lstStyle/>
+                <a:p>
+                  <a:r>
+                    <a:rPr lang="en-US">
+                      <a:noFill/>
+                    </a:rPr>
+                    <a:t> </a:t>
+                  </a:r>
+                </a:p>
+              </p:txBody>
+            </p:sp>
+          </mc:Fallback>
+        </mc:AlternateContent>
+      </p:grpSp>
+      <p:sp>
+        <p:nvSpPr>
+          <p:cNvPr id="196" name="TextBox 195">
+            <a:extLst>
+              <a:ext uri="{FF2B5EF4-FFF2-40B4-BE49-F238E27FC236}">
+                <a16:creationId xmlns:a16="http://schemas.microsoft.com/office/drawing/2014/main" id="{5AF65355-9BD7-441C-8149-D9982D840740}"/>
+              </a:ext>
+            </a:extLst>
+          </p:cNvPr>
+          <p:cNvSpPr txBox="1"/>
+          <p:nvPr/>
+        </p:nvSpPr>
+        <p:spPr>
+          <a:xfrm rot="13500000" flipV="1">
+            <a:off x="375636" y="2994779"/>
+            <a:ext cx="1331012" cy="615553"/>
+          </a:xfrm>
+          <a:prstGeom prst="rect">
+            <a:avLst/>
+          </a:prstGeom>
+          <a:noFill/>
+        </p:spPr>
+        <p:txBody>
+          <a:bodyPr wrap="square" lIns="0" tIns="0" rIns="0" bIns="0" rtlCol="0">
+            <a:spAutoFit/>
+          </a:bodyPr>
+          <a:lstStyle/>
+          <a:p>
+            <a:pPr algn="ctr"/>
+            <a:r>
+              <a:rPr lang="en-US" sz="2000" dirty="0"/>
+              <a:t>x=0.0374</a:t>
+            </a:r>
+          </a:p>
+          <a:p>
+            <a:pPr algn="ctr"/>
+            <a:r>
+              <a:rPr lang="en-US" sz="2000" dirty="0"/>
+              <a:t>y=0.0031</a:t>
+            </a:r>
+          </a:p>
+        </p:txBody>
+      </p:sp>
+      <p:cxnSp>
+        <p:nvCxnSpPr>
+          <p:cNvPr id="17" name="Straight Connector 16">
+            <a:extLst>
+              <a:ext uri="{FF2B5EF4-FFF2-40B4-BE49-F238E27FC236}">
+                <a16:creationId xmlns:a16="http://schemas.microsoft.com/office/drawing/2014/main" id="{B719EB6C-D863-45F9-95CE-070B62C924A9}"/>
+              </a:ext>
+            </a:extLst>
+          </p:cNvPr>
+          <p:cNvCxnSpPr>
+            <a:cxnSpLocks/>
+            <a:stCxn id="47" idx="1"/>
+            <a:endCxn id="196" idx="0"/>
+          </p:cNvCxnSpPr>
+          <p:nvPr/>
+        </p:nvCxnSpPr>
+        <p:spPr>
+          <a:xfrm flipH="1">
+            <a:off x="1258773" y="2810187"/>
+            <a:ext cx="770599" cy="274738"/>
+          </a:xfrm>
+          <a:prstGeom prst="line">
+            <a:avLst/>
+          </a:prstGeom>
+          <a:ln w="12700">
+            <a:solidFill>
+              <a:schemeClr val="bg1">
+                <a:lumMod val="65000"/>
+              </a:schemeClr>
+            </a:solidFill>
+          </a:ln>
+        </p:spPr>
+        <p:style>
+          <a:lnRef idx="1">
+            <a:schemeClr val="accent1"/>
+          </a:lnRef>
+          <a:fillRef idx="0">
+            <a:schemeClr val="accent1"/>
+          </a:fillRef>
+          <a:effectRef idx="0">
+            <a:schemeClr val="accent1"/>
+          </a:effectRef>
+          <a:fontRef idx="minor">
+            <a:schemeClr val="tx1"/>
+          </a:fontRef>
+        </p:style>
+      </p:cxnSp>
     </p:spTree>
     <p:extLst>
       <p:ext uri="{BB962C8B-B14F-4D97-AF65-F5344CB8AC3E}">

</xml_diff>

<commit_message>
Finished cauculating the inertias, and put everyting into the "true_parameters.m" file
</commit_message>
<xml_diff>
--- a/physicalRobot/MassSpecs/FBD.pptx
+++ b/physicalRobot/MassSpecs/FBD.pptx
@@ -6144,345 +6144,6 @@
                   <a:blip r:embed="rId6"/>
                   <a:stretch>
                     <a:fillRect b="-30000"/>
-                  </a:stretch>
-                </a:blipFill>
-              </p:spPr>
-              <p:txBody>
-                <a:bodyPr/>
-                <a:lstStyle/>
-                <a:p>
-                  <a:r>
-                    <a:rPr lang="en-US">
-                      <a:noFill/>
-                    </a:rPr>
-                    <a:t> </a:t>
-                  </a:r>
-                </a:p>
-              </p:txBody>
-            </p:sp>
-          </mc:Fallback>
-        </mc:AlternateContent>
-      </p:grpSp>
-      <p:grpSp>
-        <p:nvGrpSpPr>
-          <p:cNvPr id="69" name="Group 68">
-            <a:extLst>
-              <a:ext uri="{FF2B5EF4-FFF2-40B4-BE49-F238E27FC236}">
-                <a16:creationId xmlns:a16="http://schemas.microsoft.com/office/drawing/2014/main" id="{879F33AD-B5E6-4021-9724-CEFD2633FBDD}"/>
-              </a:ext>
-            </a:extLst>
-          </p:cNvPr>
-          <p:cNvGrpSpPr/>
-          <p:nvPr/>
-        </p:nvGrpSpPr>
-        <p:grpSpPr>
-          <a:xfrm rot="5400000">
-            <a:off x="9685529" y="974085"/>
-            <a:ext cx="827886" cy="788259"/>
-            <a:chOff x="3550559" y="712497"/>
-            <a:chExt cx="528006" cy="502733"/>
-          </a:xfrm>
-        </p:grpSpPr>
-        <p:cxnSp>
-          <p:nvCxnSpPr>
-            <p:cNvPr id="70" name="Straight Connector 69">
-              <a:extLst>
-                <a:ext uri="{FF2B5EF4-FFF2-40B4-BE49-F238E27FC236}">
-                  <a16:creationId xmlns:a16="http://schemas.microsoft.com/office/drawing/2014/main" id="{A8146F3A-289C-4AC6-8C6D-CC4A72C78664}"/>
-                </a:ext>
-              </a:extLst>
-            </p:cNvPr>
-            <p:cNvCxnSpPr>
-              <a:cxnSpLocks/>
-            </p:cNvCxnSpPr>
-            <p:nvPr/>
-          </p:nvCxnSpPr>
-          <p:spPr>
-            <a:xfrm flipV="1">
-              <a:off x="3563259" y="818695"/>
-              <a:ext cx="0" cy="345087"/>
-            </a:xfrm>
-            <a:prstGeom prst="line">
-              <a:avLst/>
-            </a:prstGeom>
-            <a:ln w="28575">
-              <a:solidFill>
-                <a:srgbClr val="00B0F0"/>
-              </a:solidFill>
-              <a:tailEnd type="triangle" w="med" len="med"/>
-            </a:ln>
-          </p:spPr>
-          <p:style>
-            <a:lnRef idx="1">
-              <a:schemeClr val="accent1"/>
-            </a:lnRef>
-            <a:fillRef idx="0">
-              <a:schemeClr val="accent1"/>
-            </a:fillRef>
-            <a:effectRef idx="0">
-              <a:schemeClr val="accent1"/>
-            </a:effectRef>
-            <a:fontRef idx="minor">
-              <a:schemeClr val="tx1"/>
-            </a:fontRef>
-          </p:style>
-        </p:cxnSp>
-        <p:cxnSp>
-          <p:nvCxnSpPr>
-            <p:cNvPr id="71" name="Straight Connector 70">
-              <a:extLst>
-                <a:ext uri="{FF2B5EF4-FFF2-40B4-BE49-F238E27FC236}">
-                  <a16:creationId xmlns:a16="http://schemas.microsoft.com/office/drawing/2014/main" id="{C151485B-7C64-4B3D-AB32-4119240EBF43}"/>
-                </a:ext>
-              </a:extLst>
-            </p:cNvPr>
-            <p:cNvCxnSpPr>
-              <a:cxnSpLocks/>
-            </p:cNvCxnSpPr>
-            <p:nvPr/>
-          </p:nvCxnSpPr>
-          <p:spPr>
-            <a:xfrm flipV="1">
-              <a:off x="3550559" y="1163783"/>
-              <a:ext cx="354098" cy="1"/>
-            </a:xfrm>
-            <a:prstGeom prst="line">
-              <a:avLst/>
-            </a:prstGeom>
-            <a:ln w="28575">
-              <a:solidFill>
-                <a:srgbClr val="00B0F0"/>
-              </a:solidFill>
-              <a:tailEnd type="triangle" w="med" len="med"/>
-            </a:ln>
-          </p:spPr>
-          <p:style>
-            <a:lnRef idx="1">
-              <a:schemeClr val="accent1"/>
-            </a:lnRef>
-            <a:fillRef idx="0">
-              <a:schemeClr val="accent1"/>
-            </a:fillRef>
-            <a:effectRef idx="0">
-              <a:schemeClr val="accent1"/>
-            </a:effectRef>
-            <a:fontRef idx="minor">
-              <a:schemeClr val="tx1"/>
-            </a:fontRef>
-          </p:style>
-        </p:cxnSp>
-        <mc:AlternateContent xmlns:mc="http://schemas.openxmlformats.org/markup-compatibility/2006" xmlns:a14="http://schemas.microsoft.com/office/drawing/2010/main">
-          <mc:Choice Requires="a14">
-            <p:sp>
-              <p:nvSpPr>
-                <p:cNvPr id="72" name="TextBox 71">
-                  <a:extLst>
-                    <a:ext uri="{FF2B5EF4-FFF2-40B4-BE49-F238E27FC236}">
-                      <a16:creationId xmlns:a16="http://schemas.microsoft.com/office/drawing/2014/main" id="{5EDA977D-C2C1-4E00-A055-4276E1239516}"/>
-                    </a:ext>
-                  </a:extLst>
-                </p:cNvPr>
-                <p:cNvSpPr txBox="1"/>
-                <p:nvPr/>
-              </p:nvSpPr>
-              <p:spPr>
-                <a:xfrm rot="16200000">
-                  <a:off x="3850511" y="987176"/>
-                  <a:ext cx="259815" cy="196293"/>
-                </a:xfrm>
-                <a:prstGeom prst="rect">
-                  <a:avLst/>
-                </a:prstGeom>
-                <a:noFill/>
-              </p:spPr>
-              <p:txBody>
-                <a:bodyPr wrap="square" lIns="0" tIns="0" rIns="0" bIns="0" rtlCol="0">
-                  <a:spAutoFit/>
-                </a:bodyPr>
-                <a:lstStyle/>
-                <a:p>
-                  <a:pPr/>
-                  <a14:m>
-                    <m:oMathPara xmlns:m="http://schemas.openxmlformats.org/officeDocument/2006/math">
-                      <m:oMathParaPr>
-                        <m:jc m:val="centerGroup"/>
-                      </m:oMathParaPr>
-                      <m:oMath xmlns:m="http://schemas.openxmlformats.org/officeDocument/2006/math">
-                        <m:sSub>
-                          <m:sSubPr>
-                            <m:ctrlPr>
-                              <a:rPr lang="en-US" sz="2000" i="1">
-                                <a:latin typeface="Cambria Math" panose="02040503050406030204" pitchFamily="18" charset="0"/>
-                              </a:rPr>
-                            </m:ctrlPr>
-                          </m:sSubPr>
-                          <m:e>
-                            <m:r>
-                              <a:rPr lang="en-US" sz="2000" i="1">
-                                <a:latin typeface="Cambria Math" panose="02040503050406030204" pitchFamily="18" charset="0"/>
-                              </a:rPr>
-                              <m:t>𝑥</m:t>
-                            </m:r>
-                          </m:e>
-                          <m:sub>
-                            <m:r>
-                              <a:rPr lang="en-US" sz="2000" i="1">
-                                <a:latin typeface="Cambria Math" panose="02040503050406030204" pitchFamily="18" charset="0"/>
-                              </a:rPr>
-                              <m:t>4</m:t>
-                            </m:r>
-                          </m:sub>
-                        </m:sSub>
-                      </m:oMath>
-                    </m:oMathPara>
-                  </a14:m>
-                  <a:endParaRPr lang="en-US" sz="2000" dirty="0"/>
-                </a:p>
-              </p:txBody>
-            </p:sp>
-          </mc:Choice>
-          <mc:Fallback xmlns="">
-            <p:sp>
-              <p:nvSpPr>
-                <p:cNvPr id="72" name="TextBox 71">
-                  <a:extLst>
-                    <a:ext uri="{FF2B5EF4-FFF2-40B4-BE49-F238E27FC236}">
-                      <a16:creationId xmlns:a16="http://schemas.microsoft.com/office/drawing/2014/main" id="{5EDA977D-C2C1-4E00-A055-4276E1239516}"/>
-                    </a:ext>
-                  </a:extLst>
-                </p:cNvPr>
-                <p:cNvSpPr txBox="1">
-                  <a:spLocks noRot="1" noChangeAspect="1" noMove="1" noResize="1" noEditPoints="1" noAdjustHandles="1" noChangeArrowheads="1" noChangeShapeType="1" noTextEdit="1"/>
-                </p:cNvSpPr>
-                <p:nvPr/>
-              </p:nvSpPr>
-              <p:spPr>
-                <a:xfrm rot="16200000">
-                  <a:off x="3850511" y="987176"/>
-                  <a:ext cx="259815" cy="196293"/>
-                </a:xfrm>
-                <a:prstGeom prst="rect">
-                  <a:avLst/>
-                </a:prstGeom>
-                <a:blipFill>
-                  <a:blip r:embed="rId7"/>
-                  <a:stretch>
-                    <a:fillRect b="-17647"/>
-                  </a:stretch>
-                </a:blipFill>
-              </p:spPr>
-              <p:txBody>
-                <a:bodyPr/>
-                <a:lstStyle/>
-                <a:p>
-                  <a:r>
-                    <a:rPr lang="en-US">
-                      <a:noFill/>
-                    </a:rPr>
-                    <a:t> </a:t>
-                  </a:r>
-                </a:p>
-              </p:txBody>
-            </p:sp>
-          </mc:Fallback>
-        </mc:AlternateContent>
-        <mc:AlternateContent xmlns:mc="http://schemas.openxmlformats.org/markup-compatibility/2006" xmlns:a14="http://schemas.microsoft.com/office/drawing/2010/main">
-          <mc:Choice Requires="a14">
-            <p:sp>
-              <p:nvSpPr>
-                <p:cNvPr id="73" name="TextBox 72">
-                  <a:extLst>
-                    <a:ext uri="{FF2B5EF4-FFF2-40B4-BE49-F238E27FC236}">
-                      <a16:creationId xmlns:a16="http://schemas.microsoft.com/office/drawing/2014/main" id="{A146C140-F2E8-43F2-8796-B1633F53E3F0}"/>
-                    </a:ext>
-                  </a:extLst>
-                </p:cNvPr>
-                <p:cNvSpPr txBox="1"/>
-                <p:nvPr/>
-              </p:nvSpPr>
-              <p:spPr>
-                <a:xfrm rot="16200000">
-                  <a:off x="3529538" y="740955"/>
-                  <a:ext cx="253210" cy="196293"/>
-                </a:xfrm>
-                <a:prstGeom prst="rect">
-                  <a:avLst/>
-                </a:prstGeom>
-                <a:noFill/>
-              </p:spPr>
-              <p:txBody>
-                <a:bodyPr wrap="square" lIns="0" tIns="0" rIns="0" bIns="0" rtlCol="0">
-                  <a:spAutoFit/>
-                </a:bodyPr>
-                <a:lstStyle/>
-                <a:p>
-                  <a:pPr/>
-                  <a14:m>
-                    <m:oMathPara xmlns:m="http://schemas.openxmlformats.org/officeDocument/2006/math">
-                      <m:oMathParaPr>
-                        <m:jc m:val="centerGroup"/>
-                      </m:oMathParaPr>
-                      <m:oMath xmlns:m="http://schemas.openxmlformats.org/officeDocument/2006/math">
-                        <m:sSub>
-                          <m:sSubPr>
-                            <m:ctrlPr>
-                              <a:rPr lang="en-US" sz="2000" i="1">
-                                <a:latin typeface="Cambria Math" panose="02040503050406030204" pitchFamily="18" charset="0"/>
-                              </a:rPr>
-                            </m:ctrlPr>
-                          </m:sSubPr>
-                          <m:e>
-                            <m:r>
-                              <a:rPr lang="en-US" sz="2000" i="1">
-                                <a:latin typeface="Cambria Math" panose="02040503050406030204" pitchFamily="18" charset="0"/>
-                              </a:rPr>
-                              <m:t>𝑦</m:t>
-                            </m:r>
-                          </m:e>
-                          <m:sub>
-                            <m:r>
-                              <a:rPr lang="en-US" sz="2000" i="1">
-                                <a:latin typeface="Cambria Math" panose="02040503050406030204" pitchFamily="18" charset="0"/>
-                              </a:rPr>
-                              <m:t>4</m:t>
-                            </m:r>
-                          </m:sub>
-                        </m:sSub>
-                      </m:oMath>
-                    </m:oMathPara>
-                  </a14:m>
-                  <a:endParaRPr lang="en-US" sz="2000" dirty="0"/>
-                </a:p>
-              </p:txBody>
-            </p:sp>
-          </mc:Choice>
-          <mc:Fallback xmlns="">
-            <p:sp>
-              <p:nvSpPr>
-                <p:cNvPr id="73" name="TextBox 72">
-                  <a:extLst>
-                    <a:ext uri="{FF2B5EF4-FFF2-40B4-BE49-F238E27FC236}">
-                      <a16:creationId xmlns:a16="http://schemas.microsoft.com/office/drawing/2014/main" id="{A146C140-F2E8-43F2-8796-B1633F53E3F0}"/>
-                    </a:ext>
-                  </a:extLst>
-                </p:cNvPr>
-                <p:cNvSpPr txBox="1">
-                  <a:spLocks noRot="1" noChangeAspect="1" noMove="1" noResize="1" noEditPoints="1" noAdjustHandles="1" noChangeArrowheads="1" noChangeShapeType="1" noTextEdit="1"/>
-                </p:cNvSpPr>
-                <p:nvPr/>
-              </p:nvSpPr>
-              <p:spPr>
-                <a:xfrm rot="16200000">
-                  <a:off x="3529538" y="740955"/>
-                  <a:ext cx="253210" cy="196293"/>
-                </a:xfrm>
-                <a:prstGeom prst="rect">
-                  <a:avLst/>
-                </a:prstGeom>
-                <a:blipFill>
-                  <a:blip r:embed="rId8"/>
-                  <a:stretch>
-                    <a:fillRect l="-3077" b="-30000"/>
                   </a:stretch>
                 </a:blipFill>
               </p:spPr>
@@ -9607,8 +9268,16 @@
           <a:lstStyle/>
           <a:p>
             <a:r>
+              <a:rPr lang="en-US" dirty="0" err="1"/>
+              <a:t>m</a:t>
+            </a:r>
+            <a:r>
+              <a:rPr lang="en-US" baseline="-25000" dirty="0" err="1"/>
+              <a:t>p</a:t>
+            </a:r>
+            <a:r>
               <a:rPr lang="en-US" dirty="0"/>
-              <a:t>m = 0.1170 kg</a:t>
+              <a:t> = 0.1170 kg</a:t>
             </a:r>
           </a:p>
           <a:p>
@@ -10087,8 +9756,8 @@
             </p:sp>
           </mc:Fallback>
         </mc:AlternateContent>
-        <mc:AlternateContent xmlns:mc="http://schemas.openxmlformats.org/markup-compatibility/2006">
-          <mc:Choice xmlns:a14="http://schemas.microsoft.com/office/drawing/2010/main" Requires="a14">
+        <mc:AlternateContent xmlns:mc="http://schemas.openxmlformats.org/markup-compatibility/2006" xmlns:a14="http://schemas.microsoft.com/office/drawing/2010/main">
+          <mc:Choice Requires="a14">
             <p:sp>
               <p:nvSpPr>
                 <p:cNvPr id="78" name="TextBox 77">
@@ -10170,7 +9839,7 @@
               </p:txBody>
             </p:sp>
           </mc:Choice>
-          <mc:Fallback>
+          <mc:Fallback xmlns="">
             <p:sp>
               <p:nvSpPr>
                 <p:cNvPr id="78" name="TextBox 77">
@@ -10306,6 +9975,658 @@
           </a:fontRef>
         </p:style>
       </p:cxnSp>
+      <p:sp>
+        <p:nvSpPr>
+          <p:cNvPr id="2" name="Rectangle 1">
+            <a:extLst>
+              <a:ext uri="{FF2B5EF4-FFF2-40B4-BE49-F238E27FC236}">
+                <a16:creationId xmlns:a16="http://schemas.microsoft.com/office/drawing/2014/main" id="{C761146C-1D85-40A8-B8CF-1783AA2F0458}"/>
+              </a:ext>
+            </a:extLst>
+          </p:cNvPr>
+          <p:cNvSpPr/>
+          <p:nvPr/>
+        </p:nvSpPr>
+        <p:spPr>
+          <a:xfrm>
+            <a:off x="6242459" y="2423470"/>
+            <a:ext cx="1879041" cy="369332"/>
+          </a:xfrm>
+          <a:prstGeom prst="rect">
+            <a:avLst/>
+          </a:prstGeom>
+        </p:spPr>
+        <p:txBody>
+          <a:bodyPr wrap="none">
+            <a:spAutoFit/>
+          </a:bodyPr>
+          <a:lstStyle/>
+          <a:p>
+            <a:r>
+              <a:rPr lang="en-US" dirty="0" err="1"/>
+              <a:t>I</a:t>
+            </a:r>
+            <a:r>
+              <a:rPr lang="en-US" baseline="-25000" dirty="0" err="1"/>
+              <a:t>zz</a:t>
+            </a:r>
+            <a:r>
+              <a:rPr lang="en-US" dirty="0"/>
+              <a:t> = 5.281 x 10</a:t>
+            </a:r>
+            <a:r>
+              <a:rPr lang="en-US" baseline="30000" dirty="0"/>
+              <a:t>-5</a:t>
+            </a:r>
+            <a:endParaRPr lang="en-US" dirty="0"/>
+          </a:p>
+        </p:txBody>
+      </p:sp>
+      <p:sp>
+        <p:nvSpPr>
+          <p:cNvPr id="3" name="Rectangle 2">
+            <a:extLst>
+              <a:ext uri="{FF2B5EF4-FFF2-40B4-BE49-F238E27FC236}">
+                <a16:creationId xmlns:a16="http://schemas.microsoft.com/office/drawing/2014/main" id="{4AD0A65D-FFAA-4CCD-84DD-27CDE84E8ACD}"/>
+              </a:ext>
+            </a:extLst>
+          </p:cNvPr>
+          <p:cNvSpPr/>
+          <p:nvPr/>
+        </p:nvSpPr>
+        <p:spPr>
+          <a:xfrm>
+            <a:off x="5951462" y="5160367"/>
+            <a:ext cx="1943161" cy="369332"/>
+          </a:xfrm>
+          <a:prstGeom prst="rect">
+            <a:avLst/>
+          </a:prstGeom>
+        </p:spPr>
+        <p:txBody>
+          <a:bodyPr wrap="none">
+            <a:spAutoFit/>
+          </a:bodyPr>
+          <a:lstStyle/>
+          <a:p>
+            <a:r>
+              <a:rPr lang="en-US" dirty="0" err="1"/>
+              <a:t>L</a:t>
+            </a:r>
+            <a:r>
+              <a:rPr lang="en-US" baseline="-25000" dirty="0" err="1"/>
+              <a:t>zz</a:t>
+            </a:r>
+            <a:r>
+              <a:rPr lang="en-US" dirty="0"/>
+              <a:t> = 2.433 x 10</a:t>
+            </a:r>
+            <a:r>
+              <a:rPr lang="en-US" baseline="30000" dirty="0"/>
+              <a:t>-5</a:t>
+            </a:r>
+            <a:endParaRPr lang="en-US" dirty="0"/>
+          </a:p>
+        </p:txBody>
+      </p:sp>
+      <p:sp>
+        <p:nvSpPr>
+          <p:cNvPr id="140" name="Rectangle 139">
+            <a:extLst>
+              <a:ext uri="{FF2B5EF4-FFF2-40B4-BE49-F238E27FC236}">
+                <a16:creationId xmlns:a16="http://schemas.microsoft.com/office/drawing/2014/main" id="{4F3D1E9C-55BF-4B05-B00C-024B8E4A9709}"/>
+              </a:ext>
+            </a:extLst>
+          </p:cNvPr>
+          <p:cNvSpPr/>
+          <p:nvPr/>
+        </p:nvSpPr>
+        <p:spPr>
+          <a:xfrm>
+            <a:off x="9877704" y="4820385"/>
+            <a:ext cx="1879041" cy="369332"/>
+          </a:xfrm>
+          <a:prstGeom prst="rect">
+            <a:avLst/>
+          </a:prstGeom>
+        </p:spPr>
+        <p:txBody>
+          <a:bodyPr wrap="none">
+            <a:spAutoFit/>
+          </a:bodyPr>
+          <a:lstStyle/>
+          <a:p>
+            <a:r>
+              <a:rPr lang="en-US" dirty="0" err="1"/>
+              <a:t>I</a:t>
+            </a:r>
+            <a:r>
+              <a:rPr lang="en-US" baseline="-25000" dirty="0" err="1"/>
+              <a:t>zz</a:t>
+            </a:r>
+            <a:r>
+              <a:rPr lang="en-US" dirty="0"/>
+              <a:t> = 4.503 x 10</a:t>
+            </a:r>
+            <a:r>
+              <a:rPr lang="en-US" baseline="30000" dirty="0"/>
+              <a:t>-4</a:t>
+            </a:r>
+            <a:endParaRPr lang="en-US" dirty="0"/>
+          </a:p>
+        </p:txBody>
+      </p:sp>
+      <p:sp>
+        <p:nvSpPr>
+          <p:cNvPr id="4" name="Rectangle 3">
+            <a:extLst>
+              <a:ext uri="{FF2B5EF4-FFF2-40B4-BE49-F238E27FC236}">
+                <a16:creationId xmlns:a16="http://schemas.microsoft.com/office/drawing/2014/main" id="{8DB823E5-4CA8-43C3-905F-E319272E7FCE}"/>
+              </a:ext>
+            </a:extLst>
+          </p:cNvPr>
+          <p:cNvSpPr/>
+          <p:nvPr/>
+        </p:nvSpPr>
+        <p:spPr>
+          <a:xfrm>
+            <a:off x="434313" y="6598927"/>
+            <a:ext cx="1879041" cy="369332"/>
+          </a:xfrm>
+          <a:prstGeom prst="rect">
+            <a:avLst/>
+          </a:prstGeom>
+        </p:spPr>
+        <p:txBody>
+          <a:bodyPr wrap="none">
+            <a:spAutoFit/>
+          </a:bodyPr>
+          <a:lstStyle/>
+          <a:p>
+            <a:r>
+              <a:rPr lang="en-US" dirty="0" err="1">
+                <a:solidFill>
+                  <a:srgbClr val="000000"/>
+                </a:solidFill>
+                <a:latin typeface="+mj-lt"/>
+              </a:rPr>
+              <a:t>I</a:t>
+            </a:r>
+            <a:r>
+              <a:rPr lang="en-US" baseline="-25000" dirty="0" err="1">
+                <a:solidFill>
+                  <a:srgbClr val="000000"/>
+                </a:solidFill>
+                <a:latin typeface="+mj-lt"/>
+              </a:rPr>
+              <a:t>p</a:t>
+            </a:r>
+            <a:r>
+              <a:rPr lang="en-US" dirty="0">
+                <a:solidFill>
+                  <a:srgbClr val="000000"/>
+                </a:solidFill>
+                <a:latin typeface="+mj-lt"/>
+              </a:rPr>
+              <a:t> = 2.834 x 10</a:t>
+            </a:r>
+            <a:r>
+              <a:rPr lang="en-US" baseline="30000" dirty="0">
+                <a:solidFill>
+                  <a:srgbClr val="000000"/>
+                </a:solidFill>
+                <a:latin typeface="+mj-lt"/>
+              </a:rPr>
+              <a:t>-4</a:t>
+            </a:r>
+          </a:p>
+        </p:txBody>
+      </p:sp>
+      <p:sp>
+        <p:nvSpPr>
+          <p:cNvPr id="141" name="Rectangle 140">
+            <a:extLst>
+              <a:ext uri="{FF2B5EF4-FFF2-40B4-BE49-F238E27FC236}">
+                <a16:creationId xmlns:a16="http://schemas.microsoft.com/office/drawing/2014/main" id="{C454B77B-E1A3-490E-B703-F028D2B67DB8}"/>
+              </a:ext>
+            </a:extLst>
+          </p:cNvPr>
+          <p:cNvSpPr/>
+          <p:nvPr/>
+        </p:nvSpPr>
+        <p:spPr>
+          <a:xfrm>
+            <a:off x="515717" y="4313893"/>
+            <a:ext cx="1938351" cy="369332"/>
+          </a:xfrm>
+          <a:prstGeom prst="rect">
+            <a:avLst/>
+          </a:prstGeom>
+        </p:spPr>
+        <p:txBody>
+          <a:bodyPr wrap="none">
+            <a:spAutoFit/>
+          </a:bodyPr>
+          <a:lstStyle/>
+          <a:p>
+            <a:r>
+              <a:rPr lang="en-US" dirty="0" err="1">
+                <a:solidFill>
+                  <a:srgbClr val="000000"/>
+                </a:solidFill>
+                <a:latin typeface="+mj-lt"/>
+              </a:rPr>
+              <a:t>I</a:t>
+            </a:r>
+            <a:r>
+              <a:rPr lang="en-US" baseline="-25000" dirty="0" err="1">
+                <a:solidFill>
+                  <a:srgbClr val="000000"/>
+                </a:solidFill>
+                <a:latin typeface="+mj-lt"/>
+              </a:rPr>
+              <a:t>p</a:t>
+            </a:r>
+            <a:r>
+              <a:rPr lang="en-US" dirty="0">
+                <a:solidFill>
+                  <a:srgbClr val="000000"/>
+                </a:solidFill>
+                <a:latin typeface="+mj-lt"/>
+              </a:rPr>
+              <a:t> = 9.2587 x 10</a:t>
+            </a:r>
+            <a:r>
+              <a:rPr lang="en-US" baseline="30000" dirty="0">
+                <a:solidFill>
+                  <a:srgbClr val="000000"/>
+                </a:solidFill>
+                <a:latin typeface="+mj-lt"/>
+              </a:rPr>
+              <a:t>-4</a:t>
+            </a:r>
+          </a:p>
+        </p:txBody>
+      </p:sp>
+      <p:sp>
+        <p:nvSpPr>
+          <p:cNvPr id="5" name="Rectangle 4">
+            <a:extLst>
+              <a:ext uri="{FF2B5EF4-FFF2-40B4-BE49-F238E27FC236}">
+                <a16:creationId xmlns:a16="http://schemas.microsoft.com/office/drawing/2014/main" id="{20118FDA-4722-46D9-A6E7-6E3426F068F1}"/>
+              </a:ext>
+            </a:extLst>
+          </p:cNvPr>
+          <p:cNvSpPr/>
+          <p:nvPr/>
+        </p:nvSpPr>
+        <p:spPr>
+          <a:xfrm>
+            <a:off x="9917041" y="6950567"/>
+            <a:ext cx="1345240" cy="369332"/>
+          </a:xfrm>
+          <a:prstGeom prst="rect">
+            <a:avLst/>
+          </a:prstGeom>
+        </p:spPr>
+        <p:txBody>
+          <a:bodyPr wrap="none">
+            <a:spAutoFit/>
+          </a:bodyPr>
+          <a:lstStyle/>
+          <a:p>
+            <a:r>
+              <a:rPr lang="en-US" dirty="0">
+                <a:solidFill>
+                  <a:srgbClr val="222222"/>
+                </a:solidFill>
+                <a:latin typeface="Roboto-Regular"/>
+              </a:rPr>
+              <a:t>m=0.00246</a:t>
+            </a:r>
+            <a:endParaRPr lang="en-US" dirty="0"/>
+          </a:p>
+        </p:txBody>
+      </p:sp>
+      <p:grpSp>
+        <p:nvGrpSpPr>
+          <p:cNvPr id="69" name="Group 68">
+            <a:extLst>
+              <a:ext uri="{FF2B5EF4-FFF2-40B4-BE49-F238E27FC236}">
+                <a16:creationId xmlns:a16="http://schemas.microsoft.com/office/drawing/2014/main" id="{879F33AD-B5E6-4021-9724-CEFD2633FBDD}"/>
+              </a:ext>
+            </a:extLst>
+          </p:cNvPr>
+          <p:cNvGrpSpPr/>
+          <p:nvPr/>
+        </p:nvGrpSpPr>
+        <p:grpSpPr>
+          <a:xfrm>
+            <a:off x="9761788" y="5932400"/>
+            <a:ext cx="917937" cy="693838"/>
+            <a:chOff x="3550559" y="740955"/>
+            <a:chExt cx="585437" cy="442514"/>
+          </a:xfrm>
+        </p:grpSpPr>
+        <p:cxnSp>
+          <p:nvCxnSpPr>
+            <p:cNvPr id="70" name="Straight Connector 69">
+              <a:extLst>
+                <a:ext uri="{FF2B5EF4-FFF2-40B4-BE49-F238E27FC236}">
+                  <a16:creationId xmlns:a16="http://schemas.microsoft.com/office/drawing/2014/main" id="{A8146F3A-289C-4AC6-8C6D-CC4A72C78664}"/>
+                </a:ext>
+              </a:extLst>
+            </p:cNvPr>
+            <p:cNvCxnSpPr>
+              <a:cxnSpLocks/>
+            </p:cNvCxnSpPr>
+            <p:nvPr/>
+          </p:nvCxnSpPr>
+          <p:spPr>
+            <a:xfrm flipV="1">
+              <a:off x="3563259" y="818695"/>
+              <a:ext cx="0" cy="345087"/>
+            </a:xfrm>
+            <a:prstGeom prst="line">
+              <a:avLst/>
+            </a:prstGeom>
+            <a:ln w="28575">
+              <a:solidFill>
+                <a:srgbClr val="00B0F0"/>
+              </a:solidFill>
+              <a:tailEnd type="triangle" w="med" len="med"/>
+            </a:ln>
+          </p:spPr>
+          <p:style>
+            <a:lnRef idx="1">
+              <a:schemeClr val="accent1"/>
+            </a:lnRef>
+            <a:fillRef idx="0">
+              <a:schemeClr val="accent1"/>
+            </a:fillRef>
+            <a:effectRef idx="0">
+              <a:schemeClr val="accent1"/>
+            </a:effectRef>
+            <a:fontRef idx="minor">
+              <a:schemeClr val="tx1"/>
+            </a:fontRef>
+          </p:style>
+        </p:cxnSp>
+        <p:cxnSp>
+          <p:nvCxnSpPr>
+            <p:cNvPr id="71" name="Straight Connector 70">
+              <a:extLst>
+                <a:ext uri="{FF2B5EF4-FFF2-40B4-BE49-F238E27FC236}">
+                  <a16:creationId xmlns:a16="http://schemas.microsoft.com/office/drawing/2014/main" id="{C151485B-7C64-4B3D-AB32-4119240EBF43}"/>
+                </a:ext>
+              </a:extLst>
+            </p:cNvPr>
+            <p:cNvCxnSpPr>
+              <a:cxnSpLocks/>
+            </p:cNvCxnSpPr>
+            <p:nvPr/>
+          </p:nvCxnSpPr>
+          <p:spPr>
+            <a:xfrm flipV="1">
+              <a:off x="3550559" y="1163783"/>
+              <a:ext cx="354098" cy="1"/>
+            </a:xfrm>
+            <a:prstGeom prst="line">
+              <a:avLst/>
+            </a:prstGeom>
+            <a:ln w="28575">
+              <a:solidFill>
+                <a:srgbClr val="00B0F0"/>
+              </a:solidFill>
+              <a:tailEnd type="triangle" w="med" len="med"/>
+            </a:ln>
+          </p:spPr>
+          <p:style>
+            <a:lnRef idx="1">
+              <a:schemeClr val="accent1"/>
+            </a:lnRef>
+            <a:fillRef idx="0">
+              <a:schemeClr val="accent1"/>
+            </a:fillRef>
+            <a:effectRef idx="0">
+              <a:schemeClr val="accent1"/>
+            </a:effectRef>
+            <a:fontRef idx="minor">
+              <a:schemeClr val="tx1"/>
+            </a:fontRef>
+          </p:style>
+        </p:cxnSp>
+        <mc:AlternateContent xmlns:mc="http://schemas.openxmlformats.org/markup-compatibility/2006">
+          <mc:Choice xmlns:a14="http://schemas.microsoft.com/office/drawing/2010/main" Requires="a14">
+            <p:sp>
+              <p:nvSpPr>
+                <p:cNvPr id="72" name="TextBox 71">
+                  <a:extLst>
+                    <a:ext uri="{FF2B5EF4-FFF2-40B4-BE49-F238E27FC236}">
+                      <a16:creationId xmlns:a16="http://schemas.microsoft.com/office/drawing/2014/main" id="{5EDA977D-C2C1-4E00-A055-4276E1239516}"/>
+                    </a:ext>
+                  </a:extLst>
+                </p:cNvPr>
+                <p:cNvSpPr txBox="1"/>
+                <p:nvPr/>
+              </p:nvSpPr>
+              <p:spPr>
+                <a:xfrm>
+                  <a:off x="3876181" y="987176"/>
+                  <a:ext cx="259815" cy="196293"/>
+                </a:xfrm>
+                <a:prstGeom prst="rect">
+                  <a:avLst/>
+                </a:prstGeom>
+                <a:noFill/>
+              </p:spPr>
+              <p:txBody>
+                <a:bodyPr wrap="square" lIns="0" tIns="0" rIns="0" bIns="0" rtlCol="0">
+                  <a:spAutoFit/>
+                </a:bodyPr>
+                <a:lstStyle/>
+                <a:p>
+                  <a:pPr/>
+                  <a14:m>
+                    <m:oMathPara xmlns:m="http://schemas.openxmlformats.org/officeDocument/2006/math">
+                      <m:oMathParaPr>
+                        <m:jc m:val="centerGroup"/>
+                      </m:oMathParaPr>
+                      <m:oMath xmlns:m="http://schemas.openxmlformats.org/officeDocument/2006/math">
+                        <m:sSub>
+                          <m:sSubPr>
+                            <m:ctrlPr>
+                              <a:rPr lang="en-US" sz="2000" i="1">
+                                <a:latin typeface="Cambria Math" panose="02040503050406030204" pitchFamily="18" charset="0"/>
+                              </a:rPr>
+                            </m:ctrlPr>
+                          </m:sSubPr>
+                          <m:e>
+                            <m:r>
+                              <a:rPr lang="en-US" sz="2000" i="1">
+                                <a:latin typeface="Cambria Math" panose="02040503050406030204" pitchFamily="18" charset="0"/>
+                              </a:rPr>
+                              <m:t>𝑥</m:t>
+                            </m:r>
+                          </m:e>
+                          <m:sub>
+                            <m:r>
+                              <a:rPr lang="en-US" sz="2000" i="1">
+                                <a:latin typeface="Cambria Math" panose="02040503050406030204" pitchFamily="18" charset="0"/>
+                              </a:rPr>
+                              <m:t>4</m:t>
+                            </m:r>
+                          </m:sub>
+                        </m:sSub>
+                      </m:oMath>
+                    </m:oMathPara>
+                  </a14:m>
+                  <a:endParaRPr lang="en-US" sz="2000" dirty="0"/>
+                </a:p>
+              </p:txBody>
+            </p:sp>
+          </mc:Choice>
+          <mc:Fallback>
+            <p:sp>
+              <p:nvSpPr>
+                <p:cNvPr id="72" name="TextBox 71">
+                  <a:extLst>
+                    <a:ext uri="{FF2B5EF4-FFF2-40B4-BE49-F238E27FC236}">
+                      <a16:creationId xmlns:a16="http://schemas.microsoft.com/office/drawing/2014/main" id="{5EDA977D-C2C1-4E00-A055-4276E1239516}"/>
+                    </a:ext>
+                  </a:extLst>
+                </p:cNvPr>
+                <p:cNvSpPr txBox="1">
+                  <a:spLocks noRot="1" noChangeAspect="1" noMove="1" noResize="1" noEditPoints="1" noAdjustHandles="1" noChangeArrowheads="1" noChangeShapeType="1" noTextEdit="1"/>
+                </p:cNvSpPr>
+                <p:nvPr/>
+              </p:nvSpPr>
+              <p:spPr>
+                <a:xfrm>
+                  <a:off x="3876181" y="987176"/>
+                  <a:ext cx="259815" cy="196293"/>
+                </a:xfrm>
+                <a:prstGeom prst="rect">
+                  <a:avLst/>
+                </a:prstGeom>
+                <a:blipFill>
+                  <a:blip r:embed="rId11"/>
+                  <a:stretch>
+                    <a:fillRect b="-17647"/>
+                  </a:stretch>
+                </a:blipFill>
+              </p:spPr>
+              <p:txBody>
+                <a:bodyPr/>
+                <a:lstStyle/>
+                <a:p>
+                  <a:r>
+                    <a:rPr lang="en-US">
+                      <a:noFill/>
+                    </a:rPr>
+                    <a:t> </a:t>
+                  </a:r>
+                </a:p>
+              </p:txBody>
+            </p:sp>
+          </mc:Fallback>
+        </mc:AlternateContent>
+        <mc:AlternateContent xmlns:mc="http://schemas.openxmlformats.org/markup-compatibility/2006">
+          <mc:Choice xmlns:a14="http://schemas.microsoft.com/office/drawing/2010/main" Requires="a14">
+            <p:sp>
+              <p:nvSpPr>
+                <p:cNvPr id="73" name="TextBox 72">
+                  <a:extLst>
+                    <a:ext uri="{FF2B5EF4-FFF2-40B4-BE49-F238E27FC236}">
+                      <a16:creationId xmlns:a16="http://schemas.microsoft.com/office/drawing/2014/main" id="{A146C140-F2E8-43F2-8796-B1633F53E3F0}"/>
+                    </a:ext>
+                  </a:extLst>
+                </p:cNvPr>
+                <p:cNvSpPr txBox="1"/>
+                <p:nvPr/>
+              </p:nvSpPr>
+              <p:spPr>
+                <a:xfrm>
+                  <a:off x="3555214" y="740955"/>
+                  <a:ext cx="253210" cy="196293"/>
+                </a:xfrm>
+                <a:prstGeom prst="rect">
+                  <a:avLst/>
+                </a:prstGeom>
+                <a:noFill/>
+              </p:spPr>
+              <p:txBody>
+                <a:bodyPr wrap="square" lIns="0" tIns="0" rIns="0" bIns="0" rtlCol="0">
+                  <a:spAutoFit/>
+                </a:bodyPr>
+                <a:lstStyle/>
+                <a:p>
+                  <a:pPr/>
+                  <a14:m>
+                    <m:oMathPara xmlns:m="http://schemas.openxmlformats.org/officeDocument/2006/math">
+                      <m:oMathParaPr>
+                        <m:jc m:val="centerGroup"/>
+                      </m:oMathParaPr>
+                      <m:oMath xmlns:m="http://schemas.openxmlformats.org/officeDocument/2006/math">
+                        <m:sSub>
+                          <m:sSubPr>
+                            <m:ctrlPr>
+                              <a:rPr lang="en-US" sz="2000" i="1">
+                                <a:latin typeface="Cambria Math" panose="02040503050406030204" pitchFamily="18" charset="0"/>
+                              </a:rPr>
+                            </m:ctrlPr>
+                          </m:sSubPr>
+                          <m:e>
+                            <m:r>
+                              <a:rPr lang="en-US" sz="2000" i="1">
+                                <a:latin typeface="Cambria Math" panose="02040503050406030204" pitchFamily="18" charset="0"/>
+                              </a:rPr>
+                              <m:t>𝑦</m:t>
+                            </m:r>
+                          </m:e>
+                          <m:sub>
+                            <m:r>
+                              <a:rPr lang="en-US" sz="2000" i="1">
+                                <a:latin typeface="Cambria Math" panose="02040503050406030204" pitchFamily="18" charset="0"/>
+                              </a:rPr>
+                              <m:t>4</m:t>
+                            </m:r>
+                          </m:sub>
+                        </m:sSub>
+                      </m:oMath>
+                    </m:oMathPara>
+                  </a14:m>
+                  <a:endParaRPr lang="en-US" sz="2000" dirty="0"/>
+                </a:p>
+              </p:txBody>
+            </p:sp>
+          </mc:Choice>
+          <mc:Fallback>
+            <p:sp>
+              <p:nvSpPr>
+                <p:cNvPr id="73" name="TextBox 72">
+                  <a:extLst>
+                    <a:ext uri="{FF2B5EF4-FFF2-40B4-BE49-F238E27FC236}">
+                      <a16:creationId xmlns:a16="http://schemas.microsoft.com/office/drawing/2014/main" id="{A146C140-F2E8-43F2-8796-B1633F53E3F0}"/>
+                    </a:ext>
+                  </a:extLst>
+                </p:cNvPr>
+                <p:cNvSpPr txBox="1">
+                  <a:spLocks noRot="1" noChangeAspect="1" noMove="1" noResize="1" noEditPoints="1" noAdjustHandles="1" noChangeArrowheads="1" noChangeShapeType="1" noTextEdit="1"/>
+                </p:cNvSpPr>
+                <p:nvPr/>
+              </p:nvSpPr>
+              <p:spPr>
+                <a:xfrm>
+                  <a:off x="3555214" y="740955"/>
+                  <a:ext cx="253210" cy="196293"/>
+                </a:xfrm>
+                <a:prstGeom prst="rect">
+                  <a:avLst/>
+                </a:prstGeom>
+                <a:blipFill>
+                  <a:blip r:embed="rId12"/>
+                  <a:stretch>
+                    <a:fillRect l="-3077" b="-27451"/>
+                  </a:stretch>
+                </a:blipFill>
+              </p:spPr>
+              <p:txBody>
+                <a:bodyPr/>
+                <a:lstStyle/>
+                <a:p>
+                  <a:r>
+                    <a:rPr lang="en-US">
+                      <a:noFill/>
+                    </a:rPr>
+                    <a:t> </a:t>
+                  </a:r>
+                </a:p>
+              </p:txBody>
+            </p:sp>
+          </mc:Fallback>
+        </mc:AlternateContent>
+      </p:grpSp>
     </p:spTree>
     <p:extLst>
       <p:ext uri="{BB962C8B-B14F-4D97-AF65-F5344CB8AC3E}">

</xml_diff>